<commit_message>
Ahora si, vean esto y opinen y/o arreglen. Atte. Aguante Pappo
</commit_message>
<xml_diff>
--- a/Practica-Especial-Presentacion.pptx
+++ b/Practica-Especial-Presentacion.pptx
@@ -3415,8 +3415,8 @@
         </p:nvSpPr>
         <p:spPr>
           <a:xfrm>
-            <a:off x="539552" y="476672"/>
-            <a:ext cx="5688632" cy="909464"/>
+            <a:off x="467544" y="620688"/>
+            <a:ext cx="6264696" cy="1584176"/>
           </a:xfrm>
         </p:spPr>
         <p:txBody>
@@ -3427,10 +3427,10 @@
           <a:p>
             <a:pPr algn="ctr"/>
             <a:r>
-              <a:rPr lang="es-ES" sz="4400" dirty="0" smtClean="0"/>
-              <a:t>Título</a:t>
+              <a:rPr lang="es-ES" sz="4400" i="1" dirty="0" smtClean="0"/>
+              <a:t>Análisis espectral y filtrado de batidos</a:t>
             </a:r>
-            <a:endParaRPr lang="es-ES" sz="4400" dirty="0"/>
+            <a:endParaRPr lang="es-ES" sz="4400" i="1" dirty="0"/>
           </a:p>
         </p:txBody>
       </p:sp>
@@ -3479,7 +3479,7 @@
           </p:cNvPicPr>
           <p:nvPr/>
         </p:nvPicPr>
-        <p:blipFill>
+        <p:blipFill rotWithShape="1">
           <a:blip r:embed="rId2" cstate="print">
             <a:extLst>
               <a:ext uri="{28A0092B-C50C-407E-A947-70E740481C1C}">
@@ -3487,15 +3487,13 @@
               </a:ext>
             </a:extLst>
           </a:blip>
-          <a:srcRect/>
-          <a:stretch>
-            <a:fillRect/>
-          </a:stretch>
+          <a:srcRect l="9063" r="8446" b="5102"/>
+          <a:stretch/>
         </p:blipFill>
         <p:spPr bwMode="auto">
           <a:xfrm>
-            <a:off x="1269149" y="476672"/>
-            <a:ext cx="6035040" cy="4663440"/>
+            <a:off x="107504" y="980728"/>
+            <a:ext cx="4231610" cy="3761684"/>
           </a:xfrm>
           <a:prstGeom prst="rect">
             <a:avLst/>
@@ -3521,6 +3519,201 @@
           </a:extLst>
         </p:spPr>
       </p:pic>
+      <p:pic>
+        <p:nvPicPr>
+          <p:cNvPr id="5122" name="Picture 2" descr="C:\Users\movil\Desktop\Labo-3\Practica-Especial\5600hz_Filtrado.jpg"/>
+          <p:cNvPicPr>
+            <a:picLocks noChangeAspect="1" noChangeArrowheads="1"/>
+          </p:cNvPicPr>
+          <p:nvPr/>
+        </p:nvPicPr>
+        <p:blipFill rotWithShape="1">
+          <a:blip r:embed="rId3" cstate="print">
+            <a:extLst>
+              <a:ext uri="{28A0092B-C50C-407E-A947-70E740481C1C}">
+                <a14:useLocalDpi xmlns:a14="http://schemas.microsoft.com/office/drawing/2010/main" val="0"/>
+              </a:ext>
+            </a:extLst>
+          </a:blip>
+          <a:srcRect l="7954" t="4599" r="9274" b="3642"/>
+          <a:stretch/>
+        </p:blipFill>
+        <p:spPr bwMode="auto">
+          <a:xfrm>
+            <a:off x="4572000" y="1168459"/>
+            <a:ext cx="4162770" cy="3565941"/>
+          </a:xfrm>
+          <a:prstGeom prst="rect">
+            <a:avLst/>
+          </a:prstGeom>
+          <a:ln>
+            <a:noFill/>
+          </a:ln>
+          <a:effectLst>
+            <a:outerShdw blurRad="292100" dist="139700" dir="2700000" algn="tl" rotWithShape="0">
+              <a:srgbClr val="333333">
+                <a:alpha val="65000"/>
+              </a:srgbClr>
+            </a:outerShdw>
+          </a:effectLst>
+          <a:extLst>
+            <a:ext uri="{909E8E84-426E-40DD-AFC4-6F175D3DCCD1}">
+              <a14:hiddenFill xmlns:a14="http://schemas.microsoft.com/office/drawing/2010/main">
+                <a:solidFill>
+                  <a:srgbClr val="FFFFFF"/>
+                </a:solidFill>
+              </a14:hiddenFill>
+            </a:ext>
+          </a:extLst>
+        </p:spPr>
+      </p:pic>
+      <mc:AlternateContent xmlns:mc="http://schemas.openxmlformats.org/markup-compatibility/2006">
+        <mc:Choice xmlns:a14="http://schemas.microsoft.com/office/drawing/2010/main" Requires="a14">
+          <p:sp>
+            <p:nvSpPr>
+              <p:cNvPr id="4" name="3 CuadroTexto"/>
+              <p:cNvSpPr txBox="1"/>
+              <p:nvPr/>
+            </p:nvSpPr>
+            <p:spPr>
+              <a:xfrm>
+                <a:off x="539552" y="5157192"/>
+                <a:ext cx="7056784" cy="584775"/>
+              </a:xfrm>
+              <a:prstGeom prst="rect">
+                <a:avLst/>
+              </a:prstGeom>
+              <a:noFill/>
+            </p:spPr>
+            <p:txBody>
+              <a:bodyPr wrap="square" rtlCol="0">
+                <a:spAutoFit/>
+              </a:bodyPr>
+              <a:lstStyle/>
+              <a:p>
+                <a:pPr algn="ctr"/>
+                <a:r>
+                  <a:rPr lang="es-ES" sz="1600" dirty="0" smtClean="0"/>
+                  <a:t>V de entrada y salida  vs t, del RLC </a:t>
+                </a:r>
+                <a:r>
+                  <a:rPr lang="es-ES" sz="1600" dirty="0" err="1" smtClean="0"/>
+                  <a:t>antiresonane</a:t>
+                </a:r>
+                <a:r>
+                  <a:rPr lang="es-ES" sz="1600" dirty="0" smtClean="0"/>
+                  <a:t>, de dos señales sinusoidales con frecuencias </a:t>
+                </a:r>
+                <a14:m>
+                  <m:oMath xmlns:m="http://schemas.openxmlformats.org/officeDocument/2006/math">
+                    <m:sSub>
+                      <m:sSubPr>
+                        <m:ctrlPr>
+                          <a:rPr lang="es-ES" sz="1600" b="0" i="1" smtClean="0">
+                            <a:latin typeface="Cambria Math"/>
+                          </a:rPr>
+                        </m:ctrlPr>
+                      </m:sSubPr>
+                      <m:e>
+                        <m:r>
+                          <a:rPr lang="es-ES" sz="1600" b="0" i="1" smtClean="0">
+                            <a:latin typeface="Cambria Math"/>
+                          </a:rPr>
+                          <m:t>𝑓</m:t>
+                        </m:r>
+                      </m:e>
+                      <m:sub>
+                        <m:r>
+                          <a:rPr lang="es-ES" sz="1600" b="0" i="1" smtClean="0">
+                            <a:latin typeface="Cambria Math"/>
+                          </a:rPr>
+                          <m:t>1</m:t>
+                        </m:r>
+                      </m:sub>
+                    </m:sSub>
+                  </m:oMath>
+                </a14:m>
+                <a:r>
+                  <a:rPr lang="es-ES" sz="1600" dirty="0" smtClean="0"/>
+                  <a:t>=(10844 ±1)Hz y </a:t>
+                </a:r>
+                <a14:m>
+                  <m:oMath xmlns:m="http://schemas.openxmlformats.org/officeDocument/2006/math">
+                    <m:sSub>
+                      <m:sSubPr>
+                        <m:ctrlPr>
+                          <a:rPr lang="es-ES" sz="1600" b="0" i="1" smtClean="0">
+                            <a:latin typeface="Cambria Math"/>
+                          </a:rPr>
+                        </m:ctrlPr>
+                      </m:sSubPr>
+                      <m:e>
+                        <m:r>
+                          <a:rPr lang="es-ES" sz="1600" b="0" i="1" smtClean="0">
+                            <a:latin typeface="Cambria Math"/>
+                          </a:rPr>
+                          <m:t>𝑓</m:t>
+                        </m:r>
+                      </m:e>
+                      <m:sub>
+                        <m:r>
+                          <a:rPr lang="es-ES" sz="1600" b="0" i="1" smtClean="0">
+                            <a:latin typeface="Cambria Math"/>
+                          </a:rPr>
+                          <m:t>2</m:t>
+                        </m:r>
+                      </m:sub>
+                    </m:sSub>
+                  </m:oMath>
+                </a14:m>
+                <a:r>
+                  <a:rPr lang="es-ES" sz="1600" dirty="0" smtClean="0"/>
+                  <a:t>=(5600,5 ± 0,5)Hz</a:t>
+                </a:r>
+                <a:endParaRPr lang="es-ES" sz="1600" dirty="0"/>
+              </a:p>
+            </p:txBody>
+          </p:sp>
+        </mc:Choice>
+        <mc:Fallback>
+          <p:sp>
+            <p:nvSpPr>
+              <p:cNvPr id="4" name="3 CuadroTexto"/>
+              <p:cNvSpPr txBox="1">
+                <a:spLocks noRot="1" noChangeAspect="1" noMove="1" noResize="1" noEditPoints="1" noAdjustHandles="1" noChangeArrowheads="1" noChangeShapeType="1" noTextEdit="1"/>
+              </p:cNvSpPr>
+              <p:nvPr/>
+            </p:nvSpPr>
+            <p:spPr>
+              <a:xfrm>
+                <a:off x="539552" y="5157192"/>
+                <a:ext cx="7056784" cy="584775"/>
+              </a:xfrm>
+              <a:prstGeom prst="rect">
+                <a:avLst/>
+              </a:prstGeom>
+              <a:blipFill rotWithShape="1">
+                <a:blip r:embed="rId4"/>
+                <a:stretch>
+                  <a:fillRect t="-3125" b="-12500"/>
+                </a:stretch>
+              </a:blipFill>
+            </p:spPr>
+            <p:txBody>
+              <a:bodyPr/>
+              <a:lstStyle/>
+              <a:p>
+                <a:r>
+                  <a:rPr lang="es-ES">
+                    <a:noFill/>
+                  </a:rPr>
+                  <a:t> </a:t>
+                </a:r>
+              </a:p>
+            </p:txBody>
+          </p:sp>
+        </mc:Fallback>
+      </mc:AlternateContent>
     </p:spTree>
     <p:extLst>
       <p:ext uri="{BB962C8B-B14F-4D97-AF65-F5344CB8AC3E}">
@@ -3581,7 +3774,7 @@
         </p:blipFill>
         <p:spPr bwMode="auto">
           <a:xfrm>
-            <a:off x="107504" y="3573016"/>
+            <a:off x="33412" y="3883152"/>
             <a:ext cx="4018483" cy="2974848"/>
           </a:xfrm>
           <a:prstGeom prst="rect">
@@ -3631,7 +3824,7 @@
         </p:blipFill>
         <p:spPr bwMode="auto">
           <a:xfrm>
-            <a:off x="4784529" y="3562673"/>
+            <a:off x="4956559" y="3865556"/>
             <a:ext cx="3823411" cy="2935834"/>
           </a:xfrm>
           <a:prstGeom prst="rect">
@@ -3666,7 +3859,7 @@
           </p:cNvPicPr>
           <p:nvPr/>
         </p:nvPicPr>
-        <p:blipFill>
+        <p:blipFill rotWithShape="1">
           <a:blip r:embed="rId4" cstate="print">
             <a:extLst>
               <a:ext uri="{28A0092B-C50C-407E-A947-70E740481C1C}">
@@ -3674,15 +3867,13 @@
               </a:ext>
             </a:extLst>
           </a:blip>
-          <a:srcRect/>
-          <a:stretch>
-            <a:fillRect/>
-          </a:stretch>
+          <a:srcRect l="6430" r="7395"/>
+          <a:stretch/>
         </p:blipFill>
         <p:spPr bwMode="auto">
           <a:xfrm>
-            <a:off x="107504" y="277813"/>
-            <a:ext cx="4023360" cy="3108960"/>
+            <a:off x="292100" y="476672"/>
+            <a:ext cx="3467100" cy="3108960"/>
           </a:xfrm>
           <a:prstGeom prst="rect">
             <a:avLst/>
@@ -3729,7 +3920,7 @@
         </p:blipFill>
         <p:spPr bwMode="auto">
           <a:xfrm>
-            <a:off x="4956560" y="260770"/>
+            <a:off x="5346337" y="444942"/>
             <a:ext cx="3384135" cy="3108960"/>
           </a:xfrm>
           <a:prstGeom prst="rect">
@@ -3756,6 +3947,375 @@
           </a:extLst>
         </p:spPr>
       </p:pic>
+      <p:cxnSp>
+        <p:nvCxnSpPr>
+          <p:cNvPr id="3" name="2 Conector recto de flecha"/>
+          <p:cNvCxnSpPr/>
+          <p:nvPr/>
+        </p:nvCxnSpPr>
+        <p:spPr>
+          <a:xfrm>
+            <a:off x="1115616" y="3554274"/>
+            <a:ext cx="0" cy="432048"/>
+          </a:xfrm>
+          <a:prstGeom prst="straightConnector1">
+            <a:avLst/>
+          </a:prstGeom>
+          <a:ln w="28575">
+            <a:solidFill>
+              <a:schemeClr val="tx1"/>
+            </a:solidFill>
+            <a:tailEnd type="arrow"/>
+          </a:ln>
+        </p:spPr>
+        <p:style>
+          <a:lnRef idx="1">
+            <a:schemeClr val="accent1"/>
+          </a:lnRef>
+          <a:fillRef idx="0">
+            <a:schemeClr val="accent1"/>
+          </a:fillRef>
+          <a:effectRef idx="0">
+            <a:schemeClr val="accent1"/>
+          </a:effectRef>
+          <a:fontRef idx="minor">
+            <a:schemeClr val="tx1"/>
+          </a:fontRef>
+        </p:style>
+      </p:cxnSp>
+      <p:sp>
+        <p:nvSpPr>
+          <p:cNvPr id="4" name="3 CuadroTexto"/>
+          <p:cNvSpPr txBox="1"/>
+          <p:nvPr/>
+        </p:nvSpPr>
+        <p:spPr>
+          <a:xfrm>
+            <a:off x="1115616" y="3585632"/>
+            <a:ext cx="528575" cy="369332"/>
+          </a:xfrm>
+          <a:prstGeom prst="rect">
+            <a:avLst/>
+          </a:prstGeom>
+          <a:noFill/>
+        </p:spPr>
+        <p:txBody>
+          <a:bodyPr wrap="square" rtlCol="0">
+            <a:spAutoFit/>
+          </a:bodyPr>
+          <a:lstStyle/>
+          <a:p>
+            <a:r>
+              <a:rPr lang="es-ES" i="1" dirty="0" smtClean="0"/>
+              <a:t>FFT</a:t>
+            </a:r>
+            <a:endParaRPr lang="es-ES" i="1" dirty="0"/>
+          </a:p>
+        </p:txBody>
+      </p:sp>
+      <p:cxnSp>
+        <p:nvCxnSpPr>
+          <p:cNvPr id="9" name="8 Conector recto de flecha"/>
+          <p:cNvCxnSpPr/>
+          <p:nvPr/>
+        </p:nvCxnSpPr>
+        <p:spPr>
+          <a:xfrm>
+            <a:off x="6339689" y="3585632"/>
+            <a:ext cx="0" cy="432048"/>
+          </a:xfrm>
+          <a:prstGeom prst="straightConnector1">
+            <a:avLst/>
+          </a:prstGeom>
+          <a:ln w="28575">
+            <a:solidFill>
+              <a:schemeClr val="tx1"/>
+            </a:solidFill>
+            <a:tailEnd type="arrow"/>
+          </a:ln>
+        </p:spPr>
+        <p:style>
+          <a:lnRef idx="1">
+            <a:schemeClr val="accent1"/>
+          </a:lnRef>
+          <a:fillRef idx="0">
+            <a:schemeClr val="accent1"/>
+          </a:fillRef>
+          <a:effectRef idx="0">
+            <a:schemeClr val="accent1"/>
+          </a:effectRef>
+          <a:fontRef idx="minor">
+            <a:schemeClr val="tx1"/>
+          </a:fontRef>
+        </p:style>
+      </p:cxnSp>
+      <p:sp>
+        <p:nvSpPr>
+          <p:cNvPr id="10" name="9 CuadroTexto"/>
+          <p:cNvSpPr txBox="1"/>
+          <p:nvPr/>
+        </p:nvSpPr>
+        <p:spPr>
+          <a:xfrm>
+            <a:off x="6339689" y="3616990"/>
+            <a:ext cx="528575" cy="369332"/>
+          </a:xfrm>
+          <a:prstGeom prst="rect">
+            <a:avLst/>
+          </a:prstGeom>
+          <a:noFill/>
+        </p:spPr>
+        <p:txBody>
+          <a:bodyPr wrap="square" rtlCol="0">
+            <a:spAutoFit/>
+          </a:bodyPr>
+          <a:lstStyle/>
+          <a:p>
+            <a:r>
+              <a:rPr lang="es-ES" i="1" dirty="0" smtClean="0"/>
+              <a:t>FFT</a:t>
+            </a:r>
+            <a:endParaRPr lang="es-ES" i="1" dirty="0"/>
+          </a:p>
+        </p:txBody>
+      </p:sp>
+      <p:cxnSp>
+        <p:nvCxnSpPr>
+          <p:cNvPr id="6" name="5 Conector recto de flecha"/>
+          <p:cNvCxnSpPr/>
+          <p:nvPr/>
+        </p:nvCxnSpPr>
+        <p:spPr>
+          <a:xfrm>
+            <a:off x="4056211" y="1986682"/>
+            <a:ext cx="904664" cy="0"/>
+          </a:xfrm>
+          <a:prstGeom prst="straightConnector1">
+            <a:avLst/>
+          </a:prstGeom>
+          <a:ln w="28575">
+            <a:solidFill>
+              <a:schemeClr val="tx1"/>
+            </a:solidFill>
+            <a:tailEnd type="arrow"/>
+          </a:ln>
+        </p:spPr>
+        <p:style>
+          <a:lnRef idx="1">
+            <a:schemeClr val="accent1"/>
+          </a:lnRef>
+          <a:fillRef idx="0">
+            <a:schemeClr val="accent1"/>
+          </a:fillRef>
+          <a:effectRef idx="0">
+            <a:schemeClr val="accent1"/>
+          </a:effectRef>
+          <a:fontRef idx="minor">
+            <a:schemeClr val="tx1"/>
+          </a:fontRef>
+        </p:style>
+      </p:cxnSp>
+      <p:sp>
+        <p:nvSpPr>
+          <p:cNvPr id="7" name="6 CuadroTexto"/>
+          <p:cNvSpPr txBox="1"/>
+          <p:nvPr/>
+        </p:nvSpPr>
+        <p:spPr>
+          <a:xfrm>
+            <a:off x="4056211" y="1648272"/>
+            <a:ext cx="904664" cy="369332"/>
+          </a:xfrm>
+          <a:prstGeom prst="rect">
+            <a:avLst/>
+          </a:prstGeom>
+          <a:noFill/>
+        </p:spPr>
+        <p:txBody>
+          <a:bodyPr wrap="square" rtlCol="0">
+            <a:spAutoFit/>
+          </a:bodyPr>
+          <a:lstStyle/>
+          <a:p>
+            <a:r>
+              <a:rPr lang="es-ES" i="1" dirty="0" smtClean="0"/>
+              <a:t>Filtrado</a:t>
+            </a:r>
+            <a:endParaRPr lang="es-ES" i="1" dirty="0"/>
+          </a:p>
+        </p:txBody>
+      </p:sp>
+      <p:cxnSp>
+        <p:nvCxnSpPr>
+          <p:cNvPr id="14" name="13 Conector recto de flecha"/>
+          <p:cNvCxnSpPr/>
+          <p:nvPr/>
+        </p:nvCxnSpPr>
+        <p:spPr>
+          <a:xfrm>
+            <a:off x="4051895" y="5339654"/>
+            <a:ext cx="904664" cy="0"/>
+          </a:xfrm>
+          <a:prstGeom prst="straightConnector1">
+            <a:avLst/>
+          </a:prstGeom>
+          <a:ln w="28575">
+            <a:solidFill>
+              <a:schemeClr val="tx1"/>
+            </a:solidFill>
+            <a:tailEnd type="arrow"/>
+          </a:ln>
+        </p:spPr>
+        <p:style>
+          <a:lnRef idx="1">
+            <a:schemeClr val="accent1"/>
+          </a:lnRef>
+          <a:fillRef idx="0">
+            <a:schemeClr val="accent1"/>
+          </a:fillRef>
+          <a:effectRef idx="0">
+            <a:schemeClr val="accent1"/>
+          </a:effectRef>
+          <a:fontRef idx="minor">
+            <a:schemeClr val="tx1"/>
+          </a:fontRef>
+        </p:style>
+      </p:cxnSp>
+      <p:sp>
+        <p:nvSpPr>
+          <p:cNvPr id="15" name="14 CuadroTexto"/>
+          <p:cNvSpPr txBox="1"/>
+          <p:nvPr/>
+        </p:nvSpPr>
+        <p:spPr>
+          <a:xfrm>
+            <a:off x="4051895" y="5001244"/>
+            <a:ext cx="904664" cy="369332"/>
+          </a:xfrm>
+          <a:prstGeom prst="rect">
+            <a:avLst/>
+          </a:prstGeom>
+          <a:noFill/>
+        </p:spPr>
+        <p:txBody>
+          <a:bodyPr wrap="square" rtlCol="0">
+            <a:spAutoFit/>
+          </a:bodyPr>
+          <a:lstStyle/>
+          <a:p>
+            <a:r>
+              <a:rPr lang="es-ES" i="1" dirty="0" smtClean="0"/>
+              <a:t>Filtrado</a:t>
+            </a:r>
+            <a:endParaRPr lang="es-ES" i="1" dirty="0"/>
+          </a:p>
+        </p:txBody>
+      </p:sp>
+      <mc:AlternateContent xmlns:mc="http://schemas.openxmlformats.org/markup-compatibility/2006">
+        <mc:Choice xmlns:a14="http://schemas.microsoft.com/office/drawing/2010/main" Requires="a14">
+          <p:sp>
+            <p:nvSpPr>
+              <p:cNvPr id="8" name="7 CuadroTexto"/>
+              <p:cNvSpPr txBox="1"/>
+              <p:nvPr/>
+            </p:nvSpPr>
+            <p:spPr>
+              <a:xfrm>
+                <a:off x="2890480" y="94050"/>
+                <a:ext cx="3236125" cy="369332"/>
+              </a:xfrm>
+              <a:prstGeom prst="rect">
+                <a:avLst/>
+              </a:prstGeom>
+              <a:noFill/>
+            </p:spPr>
+            <p:txBody>
+              <a:bodyPr wrap="square" rtlCol="0">
+                <a:spAutoFit/>
+              </a:bodyPr>
+              <a:lstStyle/>
+              <a:p>
+                <a:r>
+                  <a:rPr lang="es-ES" dirty="0" smtClean="0"/>
+                  <a:t>En este caso </a:t>
+                </a:r>
+                <a14:m>
+                  <m:oMath xmlns:m="http://schemas.openxmlformats.org/officeDocument/2006/math">
+                    <m:sSub>
+                      <m:sSubPr>
+                        <m:ctrlPr>
+                          <a:rPr lang="es-ES" b="0" i="1" smtClean="0">
+                            <a:latin typeface="Cambria Math"/>
+                          </a:rPr>
+                        </m:ctrlPr>
+                      </m:sSubPr>
+                      <m:e>
+                        <m:r>
+                          <a:rPr lang="es-ES" b="0" i="1" smtClean="0">
+                            <a:latin typeface="Cambria Math"/>
+                          </a:rPr>
+                          <m:t>𝑓</m:t>
+                        </m:r>
+                      </m:e>
+                      <m:sub>
+                        <m:r>
+                          <a:rPr lang="es-ES" b="0" i="1" smtClean="0">
+                            <a:latin typeface="Cambria Math"/>
+                          </a:rPr>
+                          <m:t>2</m:t>
+                        </m:r>
+                      </m:sub>
+                    </m:sSub>
+                  </m:oMath>
+                </a14:m>
+                <a:r>
+                  <a:rPr lang="es-ES" dirty="0" smtClean="0"/>
+                  <a:t>=(5005,0 ± 0,1)Hz</a:t>
+                </a:r>
+                <a:endParaRPr lang="es-ES" dirty="0"/>
+              </a:p>
+            </p:txBody>
+          </p:sp>
+        </mc:Choice>
+        <mc:Fallback>
+          <p:sp>
+            <p:nvSpPr>
+              <p:cNvPr id="8" name="7 CuadroTexto"/>
+              <p:cNvSpPr txBox="1">
+                <a:spLocks noRot="1" noChangeAspect="1" noMove="1" noResize="1" noEditPoints="1" noAdjustHandles="1" noChangeArrowheads="1" noChangeShapeType="1" noTextEdit="1"/>
+              </p:cNvSpPr>
+              <p:nvPr/>
+            </p:nvSpPr>
+            <p:spPr>
+              <a:xfrm>
+                <a:off x="2890480" y="94050"/>
+                <a:ext cx="3236125" cy="369332"/>
+              </a:xfrm>
+              <a:prstGeom prst="rect">
+                <a:avLst/>
+              </a:prstGeom>
+              <a:blipFill rotWithShape="1">
+                <a:blip r:embed="rId6"/>
+                <a:stretch>
+                  <a:fillRect l="-1507" t="-8197" r="-753" b="-24590"/>
+                </a:stretch>
+              </a:blipFill>
+            </p:spPr>
+            <p:txBody>
+              <a:bodyPr/>
+              <a:lstStyle/>
+              <a:p>
+                <a:r>
+                  <a:rPr lang="es-ES">
+                    <a:noFill/>
+                  </a:rPr>
+                  <a:t> </a:t>
+                </a:r>
+              </a:p>
+            </p:txBody>
+          </p:sp>
+        </mc:Fallback>
+      </mc:AlternateContent>
     </p:spTree>
     <p:extLst>
       <p:ext uri="{BB962C8B-B14F-4D97-AF65-F5344CB8AC3E}">
@@ -3843,6 +4403,149 @@
           </a:extLst>
         </p:spPr>
       </p:pic>
+      <mc:AlternateContent xmlns:mc="http://schemas.openxmlformats.org/markup-compatibility/2006">
+        <mc:Choice xmlns:a14="http://schemas.microsoft.com/office/drawing/2010/main" Requires="a14">
+          <p:sp>
+            <p:nvSpPr>
+              <p:cNvPr id="2" name="1 CuadroTexto"/>
+              <p:cNvSpPr txBox="1"/>
+              <p:nvPr/>
+            </p:nvSpPr>
+            <p:spPr>
+              <a:xfrm>
+                <a:off x="971600" y="5301208"/>
+                <a:ext cx="7056784" cy="584775"/>
+              </a:xfrm>
+              <a:prstGeom prst="rect">
+                <a:avLst/>
+              </a:prstGeom>
+              <a:noFill/>
+            </p:spPr>
+            <p:txBody>
+              <a:bodyPr wrap="square" rtlCol="0">
+                <a:spAutoFit/>
+              </a:bodyPr>
+              <a:lstStyle/>
+              <a:p>
+                <a:pPr algn="ctr"/>
+                <a:r>
+                  <a:rPr lang="es-ES" sz="1600" dirty="0" smtClean="0"/>
+                  <a:t>Análisis </a:t>
+                </a:r>
+                <a:r>
+                  <a:rPr lang="es-ES" sz="1600" i="1" dirty="0" smtClean="0"/>
+                  <a:t>FFT </a:t>
+                </a:r>
+                <a:r>
+                  <a:rPr lang="es-ES" sz="1600" dirty="0" smtClean="0"/>
+                  <a:t>utilizando el osciloscopio, manteniendo fija </a:t>
+                </a:r>
+                <a14:m>
+                  <m:oMath xmlns:m="http://schemas.openxmlformats.org/officeDocument/2006/math">
+                    <m:sSub>
+                      <m:sSubPr>
+                        <m:ctrlPr>
+                          <a:rPr lang="es-ES" sz="1600" b="0" i="1" smtClean="0">
+                            <a:latin typeface="Cambria Math"/>
+                          </a:rPr>
+                        </m:ctrlPr>
+                      </m:sSubPr>
+                      <m:e>
+                        <m:r>
+                          <a:rPr lang="es-ES" sz="1600" b="0" i="1" smtClean="0">
+                            <a:latin typeface="Cambria Math"/>
+                          </a:rPr>
+                          <m:t>𝑓</m:t>
+                        </m:r>
+                      </m:e>
+                      <m:sub>
+                        <m:r>
+                          <a:rPr lang="es-ES" sz="1600" b="0" i="1" smtClean="0">
+                            <a:latin typeface="Cambria Math"/>
+                          </a:rPr>
+                          <m:t>1</m:t>
+                        </m:r>
+                      </m:sub>
+                    </m:sSub>
+                  </m:oMath>
+                </a14:m>
+                <a:r>
+                  <a:rPr lang="es-ES" sz="1600" dirty="0" smtClean="0"/>
+                  <a:t> y variando la frecuencia baja </a:t>
+                </a:r>
+                <a14:m>
+                  <m:oMath xmlns:m="http://schemas.openxmlformats.org/officeDocument/2006/math">
+                    <m:sSub>
+                      <m:sSubPr>
+                        <m:ctrlPr>
+                          <a:rPr lang="es-ES" sz="1600" b="0" i="1" smtClean="0">
+                            <a:latin typeface="Cambria Math"/>
+                          </a:rPr>
+                        </m:ctrlPr>
+                      </m:sSubPr>
+                      <m:e>
+                        <m:r>
+                          <a:rPr lang="es-ES" sz="1600" b="0" i="1" smtClean="0">
+                            <a:latin typeface="Cambria Math"/>
+                          </a:rPr>
+                          <m:t>𝑓</m:t>
+                        </m:r>
+                      </m:e>
+                      <m:sub>
+                        <m:r>
+                          <a:rPr lang="es-ES" sz="1600" b="0" i="1" smtClean="0">
+                            <a:latin typeface="Cambria Math"/>
+                          </a:rPr>
+                          <m:t>2</m:t>
+                        </m:r>
+                      </m:sub>
+                    </m:sSub>
+                  </m:oMath>
+                </a14:m>
+                <a:endParaRPr lang="es-ES" dirty="0"/>
+              </a:p>
+            </p:txBody>
+          </p:sp>
+        </mc:Choice>
+        <mc:Fallback>
+          <p:sp>
+            <p:nvSpPr>
+              <p:cNvPr id="2" name="1 CuadroTexto"/>
+              <p:cNvSpPr txBox="1">
+                <a:spLocks noRot="1" noChangeAspect="1" noMove="1" noResize="1" noEditPoints="1" noAdjustHandles="1" noChangeArrowheads="1" noChangeShapeType="1" noTextEdit="1"/>
+              </p:cNvSpPr>
+              <p:nvPr/>
+            </p:nvSpPr>
+            <p:spPr>
+              <a:xfrm>
+                <a:off x="971600" y="5301208"/>
+                <a:ext cx="7056784" cy="584775"/>
+              </a:xfrm>
+              <a:prstGeom prst="rect">
+                <a:avLst/>
+              </a:prstGeom>
+              <a:blipFill rotWithShape="1">
+                <a:blip r:embed="rId3"/>
+                <a:stretch>
+                  <a:fillRect t="-3125" r="-432" b="-12500"/>
+                </a:stretch>
+              </a:blipFill>
+            </p:spPr>
+            <p:txBody>
+              <a:bodyPr/>
+              <a:lstStyle/>
+              <a:p>
+                <a:r>
+                  <a:rPr lang="es-ES">
+                    <a:noFill/>
+                  </a:rPr>
+                  <a:t> </a:t>
+                </a:r>
+              </a:p>
+            </p:txBody>
+          </p:sp>
+        </mc:Fallback>
+      </mc:AlternateContent>
     </p:spTree>
     <p:extLst>
       <p:ext uri="{BB962C8B-B14F-4D97-AF65-F5344CB8AC3E}">
@@ -3880,8 +4583,8 @@
           <a:chExt cx="0" cy="0"/>
         </a:xfrm>
       </p:grpSpPr>
-      <mc:AlternateContent xmlns:mc="http://schemas.openxmlformats.org/markup-compatibility/2006">
-        <mc:Choice xmlns:a14="http://schemas.microsoft.com/office/drawing/2010/main" Requires="a14">
+      <mc:AlternateContent xmlns:mc="http://schemas.openxmlformats.org/markup-compatibility/2006" xmlns:a14="http://schemas.microsoft.com/office/drawing/2010/main">
+        <mc:Choice Requires="a14">
           <p:sp>
             <p:nvSpPr>
               <p:cNvPr id="2" name="1 CuadroTexto"/>
@@ -4211,7 +4914,7 @@
             </p:txBody>
           </p:sp>
         </mc:Choice>
-        <mc:Fallback>
+        <mc:Fallback xmlns="">
           <p:sp>
             <p:nvSpPr>
               <p:cNvPr id="2" name="1 CuadroTexto"/>
@@ -5314,13 +6017,13 @@
         <p:grpSpPr>
           <a:xfrm>
             <a:off x="683568" y="2615579"/>
-            <a:ext cx="2587631" cy="1807099"/>
+            <a:ext cx="2760756" cy="1807099"/>
             <a:chOff x="508205" y="4143808"/>
-            <a:chExt cx="2587631" cy="1807099"/>
+            <a:chExt cx="2760756" cy="1807099"/>
           </a:xfrm>
         </p:grpSpPr>
-        <mc:AlternateContent xmlns:mc="http://schemas.openxmlformats.org/markup-compatibility/2006" xmlns:a14="http://schemas.microsoft.com/office/drawing/2010/main">
-          <mc:Choice Requires="a14">
+        <mc:AlternateContent xmlns:mc="http://schemas.openxmlformats.org/markup-compatibility/2006">
+          <mc:Choice xmlns:a14="http://schemas.microsoft.com/office/drawing/2010/main" Requires="a14">
             <p:sp>
               <p:nvSpPr>
                 <p:cNvPr id="13" name="12 CuadroTexto"/>
@@ -5330,7 +6033,7 @@
               <p:spPr>
                 <a:xfrm>
                   <a:off x="508205" y="4605426"/>
-                  <a:ext cx="2587631" cy="629596"/>
+                  <a:ext cx="2760756" cy="629596"/>
                 </a:xfrm>
                 <a:prstGeom prst="rect">
                   <a:avLst/>
@@ -5419,6 +6122,12 @@
                                       <a:rPr lang="es-ES" b="0" i="1" smtClean="0">
                                         <a:latin typeface="Cambria Math"/>
                                       </a:rPr>
+                                      <m:t>−</m:t>
+                                    </m:r>
+                                    <m:r>
+                                      <a:rPr lang="es-ES" b="0" i="1" smtClean="0">
+                                        <a:latin typeface="Cambria Math"/>
+                                      </a:rPr>
                                       <m:t>𝑉</m:t>
                                     </m:r>
                                   </m:e>
@@ -5475,12 +6184,6 @@
                                     </m:ctrlPr>
                                   </m:sSubPr>
                                   <m:e>
-                                    <m:r>
-                                      <a:rPr lang="es-ES" b="0" i="1" smtClean="0">
-                                        <a:latin typeface="Cambria Math"/>
-                                      </a:rPr>
-                                      <m:t>−</m:t>
-                                    </m:r>
                                     <m:r>
                                       <a:rPr lang="es-ES" b="0" i="1" smtClean="0">
                                         <a:latin typeface="Cambria Math"/>
@@ -5542,7 +6245,7 @@
               </p:txBody>
             </p:sp>
           </mc:Choice>
-          <mc:Fallback xmlns="">
+          <mc:Fallback>
             <p:sp>
               <p:nvSpPr>
                 <p:cNvPr id="13" name="12 CuadroTexto"/>
@@ -5554,13 +6257,13 @@
               <p:spPr>
                 <a:xfrm>
                   <a:off x="508205" y="4605426"/>
-                  <a:ext cx="2587631" cy="629596"/>
+                  <a:ext cx="2760756" cy="629596"/>
                 </a:xfrm>
                 <a:prstGeom prst="rect">
                   <a:avLst/>
                 </a:prstGeom>
                 <a:blipFill rotWithShape="1">
-                  <a:blip r:embed="rId7"/>
+                  <a:blip r:embed="rId6"/>
                   <a:stretch>
                     <a:fillRect/>
                   </a:stretch>
@@ -6744,6 +7447,106 @@
           </mc:Fallback>
         </mc:AlternateContent>
       </p:grpSp>
+      <p:pic>
+        <p:nvPicPr>
+          <p:cNvPr id="3075" name="Picture 3" descr="C:\Users\movil\Downloads\12773196_946730005376130_84677749_o.jpg"/>
+          <p:cNvPicPr>
+            <a:picLocks noChangeAspect="1" noChangeArrowheads="1"/>
+          </p:cNvPicPr>
+          <p:nvPr/>
+        </p:nvPicPr>
+        <p:blipFill>
+          <a:blip r:embed="rId13" cstate="print">
+            <a:extLst>
+              <a:ext uri="{28A0092B-C50C-407E-A947-70E740481C1C}">
+                <a14:useLocalDpi xmlns:a14="http://schemas.microsoft.com/office/drawing/2010/main" val="0"/>
+              </a:ext>
+            </a:extLst>
+          </a:blip>
+          <a:srcRect/>
+          <a:stretch>
+            <a:fillRect/>
+          </a:stretch>
+        </p:blipFill>
+        <p:spPr bwMode="auto">
+          <a:xfrm>
+            <a:off x="184968" y="4512543"/>
+            <a:ext cx="4091940" cy="2294573"/>
+          </a:xfrm>
+          <a:prstGeom prst="rect">
+            <a:avLst/>
+          </a:prstGeom>
+          <a:ln>
+            <a:noFill/>
+          </a:ln>
+          <a:effectLst>
+            <a:outerShdw blurRad="292100" dist="139700" dir="2700000" algn="tl" rotWithShape="0">
+              <a:srgbClr val="333333">
+                <a:alpha val="65000"/>
+              </a:srgbClr>
+            </a:outerShdw>
+          </a:effectLst>
+          <a:extLst>
+            <a:ext uri="{909E8E84-426E-40DD-AFC4-6F175D3DCCD1}">
+              <a14:hiddenFill xmlns:a14="http://schemas.microsoft.com/office/drawing/2010/main">
+                <a:solidFill>
+                  <a:srgbClr val="FFFFFF"/>
+                </a:solidFill>
+              </a14:hiddenFill>
+            </a:ext>
+          </a:extLst>
+        </p:spPr>
+      </p:pic>
+      <p:pic>
+        <p:nvPicPr>
+          <p:cNvPr id="3076" name="Picture 4" descr="C:\Users\movil\Downloads\12810086_946730035376127_178660937_o.jpg"/>
+          <p:cNvPicPr>
+            <a:picLocks noChangeAspect="1" noChangeArrowheads="1"/>
+          </p:cNvPicPr>
+          <p:nvPr/>
+        </p:nvPicPr>
+        <p:blipFill>
+          <a:blip r:embed="rId14" cstate="print">
+            <a:extLst>
+              <a:ext uri="{28A0092B-C50C-407E-A947-70E740481C1C}">
+                <a14:useLocalDpi xmlns:a14="http://schemas.microsoft.com/office/drawing/2010/main" val="0"/>
+              </a:ext>
+            </a:extLst>
+          </a:blip>
+          <a:srcRect/>
+          <a:stretch>
+            <a:fillRect/>
+          </a:stretch>
+        </p:blipFill>
+        <p:spPr bwMode="auto">
+          <a:xfrm>
+            <a:off x="5065406" y="4482136"/>
+            <a:ext cx="3440430" cy="2180273"/>
+          </a:xfrm>
+          <a:prstGeom prst="rect">
+            <a:avLst/>
+          </a:prstGeom>
+          <a:ln>
+            <a:noFill/>
+          </a:ln>
+          <a:effectLst>
+            <a:outerShdw blurRad="292100" dist="139700" dir="2700000" algn="tl" rotWithShape="0">
+              <a:srgbClr val="333333">
+                <a:alpha val="65000"/>
+              </a:srgbClr>
+            </a:outerShdw>
+          </a:effectLst>
+          <a:extLst>
+            <a:ext uri="{909E8E84-426E-40DD-AFC4-6F175D3DCCD1}">
+              <a14:hiddenFill xmlns:a14="http://schemas.microsoft.com/office/drawing/2010/main">
+                <a:solidFill>
+                  <a:srgbClr val="FFFFFF"/>
+                </a:solidFill>
+              </a14:hiddenFill>
+            </a:ext>
+          </a:extLst>
+        </p:spPr>
+      </p:pic>
     </p:spTree>
     <p:extLst>
       <p:ext uri="{BB962C8B-B14F-4D97-AF65-F5344CB8AC3E}">
@@ -6781,88 +7584,6 @@
           <a:chExt cx="0" cy="0"/>
         </a:xfrm>
       </p:grpSpPr>
-      <p:pic>
-        <p:nvPicPr>
-          <p:cNvPr id="1027" name="Picture 3" descr="F:\Practica-Especial - copia\RLC resonante.jpg"/>
-          <p:cNvPicPr>
-            <a:picLocks noChangeAspect="1" noChangeArrowheads="1"/>
-          </p:cNvPicPr>
-          <p:nvPr/>
-        </p:nvPicPr>
-        <p:blipFill>
-          <a:blip r:embed="rId2">
-            <a:extLst>
-              <a:ext uri="{28A0092B-C50C-407E-A947-70E740481C1C}">
-                <a14:useLocalDpi xmlns:a14="http://schemas.microsoft.com/office/drawing/2010/main" val="0"/>
-              </a:ext>
-            </a:extLst>
-          </a:blip>
-          <a:srcRect/>
-          <a:stretch>
-            <a:fillRect/>
-          </a:stretch>
-        </p:blipFill>
-        <p:spPr bwMode="auto">
-          <a:xfrm>
-            <a:off x="5004048" y="629980"/>
-            <a:ext cx="3867150" cy="3276600"/>
-          </a:xfrm>
-          <a:prstGeom prst="rect">
-            <a:avLst/>
-          </a:prstGeom>
-          <a:noFill/>
-          <a:extLst>
-            <a:ext uri="{909E8E84-426E-40DD-AFC4-6F175D3DCCD1}">
-              <a14:hiddenFill xmlns:a14="http://schemas.microsoft.com/office/drawing/2010/main">
-                <a:solidFill>
-                  <a:srgbClr val="FFFFFF"/>
-                </a:solidFill>
-              </a14:hiddenFill>
-            </a:ext>
-          </a:extLst>
-        </p:spPr>
-      </p:pic>
-      <p:pic>
-        <p:nvPicPr>
-          <p:cNvPr id="1028" name="Picture 4" descr="F:\Practica-Especial - copia\RLC anti resonante.jpg"/>
-          <p:cNvPicPr>
-            <a:picLocks noChangeAspect="1" noChangeArrowheads="1"/>
-          </p:cNvPicPr>
-          <p:nvPr/>
-        </p:nvPicPr>
-        <p:blipFill>
-          <a:blip r:embed="rId3">
-            <a:extLst>
-              <a:ext uri="{28A0092B-C50C-407E-A947-70E740481C1C}">
-                <a14:useLocalDpi xmlns:a14="http://schemas.microsoft.com/office/drawing/2010/main" val="0"/>
-              </a:ext>
-            </a:extLst>
-          </a:blip>
-          <a:srcRect/>
-          <a:stretch>
-            <a:fillRect/>
-          </a:stretch>
-        </p:blipFill>
-        <p:spPr bwMode="auto">
-          <a:xfrm>
-            <a:off x="0" y="1040938"/>
-            <a:ext cx="3943350" cy="2762250"/>
-          </a:xfrm>
-          <a:prstGeom prst="rect">
-            <a:avLst/>
-          </a:prstGeom>
-          <a:noFill/>
-          <a:extLst>
-            <a:ext uri="{909E8E84-426E-40DD-AFC4-6F175D3DCCD1}">
-              <a14:hiddenFill xmlns:a14="http://schemas.microsoft.com/office/drawing/2010/main">
-                <a:solidFill>
-                  <a:srgbClr val="FFFFFF"/>
-                </a:solidFill>
-              </a14:hiddenFill>
-            </a:ext>
-          </a:extLst>
-        </p:spPr>
-      </p:pic>
       <p:sp>
         <p:nvSpPr>
           <p:cNvPr id="2" name="1 CuadroTexto"/>
@@ -6872,7 +7593,7 @@
         <p:spPr>
           <a:xfrm>
             <a:off x="3635896" y="260648"/>
-            <a:ext cx="1678543" cy="369332"/>
+            <a:ext cx="1678543" cy="461665"/>
           </a:xfrm>
           <a:prstGeom prst="rect">
             <a:avLst/>
@@ -6886,10 +7607,10 @@
           <a:lstStyle/>
           <a:p>
             <a:r>
-              <a:rPr lang="es-AR" dirty="0" smtClean="0"/>
+              <a:rPr lang="es-AR" sz="2400" dirty="0" smtClean="0"/>
               <a:t>Circuito RLC</a:t>
             </a:r>
-            <a:endParaRPr lang="es-AR" dirty="0"/>
+            <a:endParaRPr lang="es-AR" sz="2400" dirty="0"/>
           </a:p>
         </p:txBody>
       </p:sp>
@@ -6901,7 +7622,7 @@
         </p:nvSpPr>
         <p:spPr>
           <a:xfrm>
-            <a:off x="1691680" y="3814986"/>
+            <a:off x="1045717" y="3532935"/>
             <a:ext cx="1584176" cy="369332"/>
           </a:xfrm>
           <a:prstGeom prst="rect">
@@ -6931,7 +7652,7 @@
         </p:nvSpPr>
         <p:spPr>
           <a:xfrm>
-            <a:off x="5940152" y="3805664"/>
+            <a:off x="6372200" y="3532935"/>
             <a:ext cx="1584176" cy="369332"/>
           </a:xfrm>
           <a:prstGeom prst="rect">
@@ -6957,8 +7678,8 @@
           </a:p>
         </p:txBody>
       </p:sp>
-      <mc:AlternateContent xmlns:mc="http://schemas.openxmlformats.org/markup-compatibility/2006" xmlns:a14="http://schemas.microsoft.com/office/drawing/2010/main">
-        <mc:Choice Requires="a14">
+      <mc:AlternateContent xmlns:mc="http://schemas.openxmlformats.org/markup-compatibility/2006">
+        <mc:Choice xmlns:a14="http://schemas.microsoft.com/office/drawing/2010/main" Requires="a14">
           <p:sp>
             <p:nvSpPr>
               <p:cNvPr id="4" name="3 CuadroTexto"/>
@@ -6967,7 +7688,7 @@
             </p:nvSpPr>
             <p:spPr>
               <a:xfrm>
-                <a:off x="6372200" y="4303409"/>
+                <a:off x="6012160" y="3869527"/>
                 <a:ext cx="1488997" cy="610936"/>
               </a:xfrm>
               <a:prstGeom prst="rect">
@@ -7100,7 +7821,7 @@
             </p:txBody>
           </p:sp>
         </mc:Choice>
-        <mc:Fallback xmlns="">
+        <mc:Fallback>
           <p:sp>
             <p:nvSpPr>
               <p:cNvPr id="4" name="3 CuadroTexto"/>
@@ -7111,14 +7832,14 @@
             </p:nvSpPr>
             <p:spPr>
               <a:xfrm>
-                <a:off x="6372200" y="4303409"/>
+                <a:off x="6012160" y="3869527"/>
                 <a:ext cx="1488997" cy="610936"/>
               </a:xfrm>
               <a:prstGeom prst="rect">
                 <a:avLst/>
               </a:prstGeom>
               <a:blipFill rotWithShape="1">
-                <a:blip r:embed="rId4"/>
+                <a:blip r:embed="rId2"/>
                 <a:stretch>
                   <a:fillRect/>
                 </a:stretch>
@@ -7129,7 +7850,7 @@
               <a:lstStyle/>
               <a:p>
                 <a:r>
-                  <a:rPr lang="es-AR">
+                  <a:rPr lang="es-ES">
                     <a:noFill/>
                   </a:rPr>
                   <a:t> </a:t>
@@ -7139,8 +7860,8 @@
           </p:sp>
         </mc:Fallback>
       </mc:AlternateContent>
-      <mc:AlternateContent xmlns:mc="http://schemas.openxmlformats.org/markup-compatibility/2006" xmlns:a14="http://schemas.microsoft.com/office/drawing/2010/main">
-        <mc:Choice Requires="a14">
+      <mc:AlternateContent xmlns:mc="http://schemas.openxmlformats.org/markup-compatibility/2006">
+        <mc:Choice xmlns:a14="http://schemas.microsoft.com/office/drawing/2010/main" Requires="a14">
           <p:sp>
             <p:nvSpPr>
               <p:cNvPr id="10" name="9 CuadroTexto"/>
@@ -7149,7 +7870,7 @@
             </p:nvSpPr>
             <p:spPr>
               <a:xfrm>
-                <a:off x="3709220" y="2764394"/>
+                <a:off x="3709220" y="3473361"/>
                 <a:ext cx="1531893" cy="664606"/>
               </a:xfrm>
               <a:prstGeom prst="rect">
@@ -7271,7 +7992,7 @@
             </p:txBody>
           </p:sp>
         </mc:Choice>
-        <mc:Fallback xmlns="">
+        <mc:Fallback>
           <p:sp>
             <p:nvSpPr>
               <p:cNvPr id="10" name="9 CuadroTexto"/>
@@ -7282,14 +8003,14 @@
             </p:nvSpPr>
             <p:spPr>
               <a:xfrm>
-                <a:off x="3709220" y="2764394"/>
+                <a:off x="3709220" y="3473361"/>
                 <a:ext cx="1531893" cy="664606"/>
               </a:xfrm>
               <a:prstGeom prst="rect">
                 <a:avLst/>
               </a:prstGeom>
               <a:blipFill rotWithShape="1">
-                <a:blip r:embed="rId5"/>
+                <a:blip r:embed="rId3"/>
                 <a:stretch>
                   <a:fillRect/>
                 </a:stretch>
@@ -7300,7 +8021,7 @@
               <a:lstStyle/>
               <a:p>
                 <a:r>
-                  <a:rPr lang="es-AR">
+                  <a:rPr lang="es-ES">
                     <a:noFill/>
                   </a:rPr>
                   <a:t> </a:t>
@@ -7310,8 +8031,8 @@
           </p:sp>
         </mc:Fallback>
       </mc:AlternateContent>
-      <mc:AlternateContent xmlns:mc="http://schemas.openxmlformats.org/markup-compatibility/2006" xmlns:a14="http://schemas.microsoft.com/office/drawing/2010/main">
-        <mc:Choice Requires="a14">
+      <mc:AlternateContent xmlns:mc="http://schemas.openxmlformats.org/markup-compatibility/2006">
+        <mc:Choice xmlns:a14="http://schemas.microsoft.com/office/drawing/2010/main" Requires="a14">
           <p:sp>
             <p:nvSpPr>
               <p:cNvPr id="11" name="10 CuadroTexto"/>
@@ -7320,7 +8041,7 @@
             </p:nvSpPr>
             <p:spPr>
               <a:xfrm>
-                <a:off x="1075254" y="4303409"/>
+                <a:off x="737504" y="3845963"/>
                 <a:ext cx="2200602" cy="658065"/>
               </a:xfrm>
               <a:prstGeom prst="rect">
@@ -7470,7 +8191,7 @@
             </p:txBody>
           </p:sp>
         </mc:Choice>
-        <mc:Fallback xmlns="">
+        <mc:Fallback>
           <p:sp>
             <p:nvSpPr>
               <p:cNvPr id="11" name="10 CuadroTexto"/>
@@ -7481,14 +8202,14 @@
             </p:nvSpPr>
             <p:spPr>
               <a:xfrm>
-                <a:off x="1075254" y="4303409"/>
+                <a:off x="737504" y="3845963"/>
                 <a:ext cx="2200602" cy="658065"/>
               </a:xfrm>
               <a:prstGeom prst="rect">
                 <a:avLst/>
               </a:prstGeom>
               <a:blipFill rotWithShape="1">
-                <a:blip r:embed="rId6"/>
+                <a:blip r:embed="rId4"/>
                 <a:stretch>
                   <a:fillRect/>
                 </a:stretch>
@@ -7499,7 +8220,281 @@
               <a:lstStyle/>
               <a:p>
                 <a:r>
-                  <a:rPr lang="es-AR">
+                  <a:rPr lang="es-ES">
+                    <a:noFill/>
+                  </a:rPr>
+                  <a:t> </a:t>
+                </a:r>
+              </a:p>
+            </p:txBody>
+          </p:sp>
+        </mc:Fallback>
+      </mc:AlternateContent>
+      <p:pic>
+        <p:nvPicPr>
+          <p:cNvPr id="5" name="Picture 3" descr="F:\Resonancia.jpg"/>
+          <p:cNvPicPr>
+            <a:picLocks noChangeAspect="1" noChangeArrowheads="1"/>
+          </p:cNvPicPr>
+          <p:nvPr/>
+        </p:nvPicPr>
+        <p:blipFill>
+          <a:blip r:embed="rId5" cstate="print">
+            <a:extLst>
+              <a:ext uri="{28A0092B-C50C-407E-A947-70E740481C1C}">
+                <a14:useLocalDpi xmlns:a14="http://schemas.microsoft.com/office/drawing/2010/main" val="0"/>
+              </a:ext>
+            </a:extLst>
+          </a:blip>
+          <a:srcRect/>
+          <a:stretch>
+            <a:fillRect/>
+          </a:stretch>
+        </p:blipFill>
+        <p:spPr bwMode="auto">
+          <a:xfrm>
+            <a:off x="62097" y="915352"/>
+            <a:ext cx="3647123" cy="2513648"/>
+          </a:xfrm>
+          <a:prstGeom prst="rect">
+            <a:avLst/>
+          </a:prstGeom>
+          <a:ln>
+            <a:noFill/>
+          </a:ln>
+          <a:effectLst>
+            <a:outerShdw blurRad="292100" dist="139700" dir="2700000" algn="tl" rotWithShape="0">
+              <a:srgbClr val="333333">
+                <a:alpha val="65000"/>
+              </a:srgbClr>
+            </a:outerShdw>
+          </a:effectLst>
+          <a:extLst>
+            <a:ext uri="{909E8E84-426E-40DD-AFC4-6F175D3DCCD1}">
+              <a14:hiddenFill xmlns:a14="http://schemas.microsoft.com/office/drawing/2010/main">
+                <a:solidFill>
+                  <a:srgbClr val="FFFFFF"/>
+                </a:solidFill>
+              </a14:hiddenFill>
+            </a:ext>
+          </a:extLst>
+        </p:spPr>
+      </p:pic>
+      <p:pic>
+        <p:nvPicPr>
+          <p:cNvPr id="1029" name="Picture 5" descr="F:\Antiresonancia.jpg"/>
+          <p:cNvPicPr>
+            <a:picLocks noChangeAspect="1" noChangeArrowheads="1"/>
+          </p:cNvPicPr>
+          <p:nvPr/>
+        </p:nvPicPr>
+        <p:blipFill>
+          <a:blip r:embed="rId6" cstate="print">
+            <a:extLst>
+              <a:ext uri="{28A0092B-C50C-407E-A947-70E740481C1C}">
+                <a14:useLocalDpi xmlns:a14="http://schemas.microsoft.com/office/drawing/2010/main" val="0"/>
+              </a:ext>
+            </a:extLst>
+          </a:blip>
+          <a:srcRect/>
+          <a:stretch>
+            <a:fillRect/>
+          </a:stretch>
+        </p:blipFill>
+        <p:spPr bwMode="auto">
+          <a:xfrm>
+            <a:off x="5076056" y="883643"/>
+            <a:ext cx="3747135" cy="2526983"/>
+          </a:xfrm>
+          <a:prstGeom prst="rect">
+            <a:avLst/>
+          </a:prstGeom>
+          <a:ln>
+            <a:noFill/>
+          </a:ln>
+          <a:effectLst>
+            <a:outerShdw blurRad="292100" dist="139700" dir="2700000" algn="tl" rotWithShape="0">
+              <a:srgbClr val="333333">
+                <a:alpha val="65000"/>
+              </a:srgbClr>
+            </a:outerShdw>
+          </a:effectLst>
+          <a:extLst>
+            <a:ext uri="{909E8E84-426E-40DD-AFC4-6F175D3DCCD1}">
+              <a14:hiddenFill xmlns:a14="http://schemas.microsoft.com/office/drawing/2010/main">
+                <a:solidFill>
+                  <a:srgbClr val="FFFFFF"/>
+                </a:solidFill>
+              </a14:hiddenFill>
+            </a:ext>
+          </a:extLst>
+        </p:spPr>
+      </p:pic>
+      <p:sp>
+        <p:nvSpPr>
+          <p:cNvPr id="8" name="7 CuadroTexto"/>
+          <p:cNvSpPr txBox="1"/>
+          <p:nvPr/>
+        </p:nvSpPr>
+        <p:spPr>
+          <a:xfrm>
+            <a:off x="255463" y="4603713"/>
+            <a:ext cx="1656184" cy="369332"/>
+          </a:xfrm>
+          <a:prstGeom prst="rect">
+            <a:avLst/>
+          </a:prstGeom>
+          <a:noFill/>
+        </p:spPr>
+        <p:txBody>
+          <a:bodyPr wrap="square" rtlCol="0">
+            <a:spAutoFit/>
+          </a:bodyPr>
+          <a:lstStyle/>
+          <a:p>
+            <a:r>
+              <a:rPr lang="es-ES" dirty="0" smtClean="0"/>
+              <a:t>Transmisión</a:t>
+            </a:r>
+            <a:endParaRPr lang="es-ES" dirty="0"/>
+          </a:p>
+        </p:txBody>
+      </p:sp>
+      <mc:AlternateContent xmlns:mc="http://schemas.openxmlformats.org/markup-compatibility/2006">
+        <mc:Choice xmlns:a14="http://schemas.microsoft.com/office/drawing/2010/main" Requires="a14">
+          <p:sp>
+            <p:nvSpPr>
+              <p:cNvPr id="9" name="8 CuadroTexto"/>
+              <p:cNvSpPr txBox="1"/>
+              <p:nvPr/>
+            </p:nvSpPr>
+            <p:spPr>
+              <a:xfrm>
+                <a:off x="255463" y="4973045"/>
+                <a:ext cx="1307473" cy="673774"/>
+              </a:xfrm>
+              <a:prstGeom prst="rect">
+                <a:avLst/>
+              </a:prstGeom>
+              <a:noFill/>
+            </p:spPr>
+            <p:txBody>
+              <a:bodyPr wrap="none" rtlCol="0">
+                <a:spAutoFit/>
+              </a:bodyPr>
+              <a:lstStyle/>
+              <a:p>
+                <a14:m>
+                  <m:oMathPara xmlns:m="http://schemas.openxmlformats.org/officeDocument/2006/math">
+                    <m:oMathParaPr>
+                      <m:jc m:val="centerGroup"/>
+                    </m:oMathParaPr>
+                    <m:oMath xmlns:m="http://schemas.openxmlformats.org/officeDocument/2006/math">
+                      <m:r>
+                        <a:rPr lang="es-ES" b="0" i="1" smtClean="0">
+                          <a:latin typeface="Cambria Math"/>
+                        </a:rPr>
+                        <m:t>𝑇</m:t>
+                      </m:r>
+                      <m:d>
+                        <m:dPr>
+                          <m:ctrlPr>
+                            <a:rPr lang="es-ES" b="0" i="1" smtClean="0">
+                              <a:latin typeface="Cambria Math"/>
+                            </a:rPr>
+                          </m:ctrlPr>
+                        </m:dPr>
+                        <m:e>
+                          <m:r>
+                            <a:rPr lang="es-ES" b="0" i="1" smtClean="0">
+                              <a:latin typeface="Cambria Math"/>
+                            </a:rPr>
+                            <m:t>𝜔</m:t>
+                          </m:r>
+                        </m:e>
+                      </m:d>
+                      <m:r>
+                        <a:rPr lang="es-ES" b="0" i="1" smtClean="0">
+                          <a:latin typeface="Cambria Math"/>
+                        </a:rPr>
+                        <m:t>=</m:t>
+                      </m:r>
+                      <m:f>
+                        <m:fPr>
+                          <m:ctrlPr>
+                            <a:rPr lang="es-ES" b="0" i="1" smtClean="0">
+                              <a:latin typeface="Cambria Math"/>
+                            </a:rPr>
+                          </m:ctrlPr>
+                        </m:fPr>
+                        <m:num>
+                          <m:r>
+                            <a:rPr lang="es-ES" b="0" i="1" smtClean="0">
+                              <a:latin typeface="Cambria Math"/>
+                            </a:rPr>
+                            <m:t>𝑅</m:t>
+                          </m:r>
+                        </m:num>
+                        <m:den>
+                          <m:d>
+                            <m:dPr>
+                              <m:begChr m:val="|"/>
+                              <m:endChr m:val="|"/>
+                              <m:ctrlPr>
+                                <a:rPr lang="es-ES" b="0" i="1" smtClean="0">
+                                  <a:latin typeface="Cambria Math"/>
+                                </a:rPr>
+                              </m:ctrlPr>
+                            </m:dPr>
+                            <m:e>
+                              <m:r>
+                                <a:rPr lang="es-ES" b="0" i="1" smtClean="0">
+                                  <a:latin typeface="Cambria Math"/>
+                                </a:rPr>
+                                <m:t>𝑧</m:t>
+                              </m:r>
+                            </m:e>
+                          </m:d>
+                        </m:den>
+                      </m:f>
+                    </m:oMath>
+                  </m:oMathPara>
+                </a14:m>
+                <a:endParaRPr lang="es-ES" dirty="0"/>
+              </a:p>
+            </p:txBody>
+          </p:sp>
+        </mc:Choice>
+        <mc:Fallback>
+          <p:sp>
+            <p:nvSpPr>
+              <p:cNvPr id="9" name="8 CuadroTexto"/>
+              <p:cNvSpPr txBox="1">
+                <a:spLocks noRot="1" noChangeAspect="1" noMove="1" noResize="1" noEditPoints="1" noAdjustHandles="1" noChangeArrowheads="1" noChangeShapeType="1" noTextEdit="1"/>
+              </p:cNvSpPr>
+              <p:nvPr/>
+            </p:nvSpPr>
+            <p:spPr>
+              <a:xfrm>
+                <a:off x="255463" y="4973045"/>
+                <a:ext cx="1307473" cy="673774"/>
+              </a:xfrm>
+              <a:prstGeom prst="rect">
+                <a:avLst/>
+              </a:prstGeom>
+              <a:blipFill rotWithShape="1">
+                <a:blip r:embed="rId7"/>
+                <a:stretch>
+                  <a:fillRect/>
+                </a:stretch>
+              </a:blipFill>
+            </p:spPr>
+            <p:txBody>
+              <a:bodyPr/>
+              <a:lstStyle/>
+              <a:p>
+                <a:r>
+                  <a:rPr lang="es-ES">
                     <a:noFill/>
                   </a:rPr>
                   <a:t> </a:t>
@@ -7592,8 +8587,8 @@
           </a:p>
         </p:txBody>
       </p:sp>
-      <mc:AlternateContent xmlns:mc="http://schemas.openxmlformats.org/markup-compatibility/2006" xmlns:a14="http://schemas.microsoft.com/office/drawing/2010/main">
-        <mc:Choice Requires="a14">
+      <mc:AlternateContent xmlns:mc="http://schemas.openxmlformats.org/markup-compatibility/2006">
+        <mc:Choice xmlns:a14="http://schemas.microsoft.com/office/drawing/2010/main" Requires="a14">
           <p:sp>
             <p:nvSpPr>
               <p:cNvPr id="3" name="2 CuadroTexto"/>
@@ -7602,7 +8597,7 @@
             </p:nvSpPr>
             <p:spPr>
               <a:xfrm>
-                <a:off x="0" y="877362"/>
+                <a:off x="181905" y="1062028"/>
                 <a:ext cx="5889048" cy="369332"/>
               </a:xfrm>
               <a:prstGeom prst="rect">
@@ -7890,7 +8885,7 @@
             </p:txBody>
           </p:sp>
         </mc:Choice>
-        <mc:Fallback xmlns="">
+        <mc:Fallback>
           <p:sp>
             <p:nvSpPr>
               <p:cNvPr id="3" name="2 CuadroTexto"/>
@@ -7901,7 +8896,7 @@
             </p:nvSpPr>
             <p:spPr>
               <a:xfrm>
-                <a:off x="0" y="877362"/>
+                <a:off x="181905" y="1062028"/>
                 <a:ext cx="5889048" cy="369332"/>
               </a:xfrm>
               <a:prstGeom prst="rect">
@@ -7919,7 +8914,7 @@
               <a:lstStyle/>
               <a:p>
                 <a:r>
-                  <a:rPr lang="es-AR">
+                  <a:rPr lang="es-ES">
                     <a:noFill/>
                   </a:rPr>
                   <a:t> </a:t>
@@ -8294,8 +9289,8 @@
         </p:nvSpPr>
         <p:spPr>
           <a:xfrm>
-            <a:off x="3707904" y="28860"/>
-            <a:ext cx="1542410" cy="369332"/>
+            <a:off x="3922546" y="300174"/>
+            <a:ext cx="1113125" cy="461665"/>
           </a:xfrm>
           <a:prstGeom prst="rect">
             <a:avLst/>
@@ -8309,13 +9304,63 @@
           <a:lstStyle/>
           <a:p>
             <a:r>
-              <a:rPr lang="es-AR" dirty="0" err="1" smtClean="0"/>
-              <a:t>BaTiDoSsSsSsS</a:t>
+              <a:rPr lang="es-AR" sz="2400" dirty="0" smtClean="0"/>
+              <a:t>Batidos</a:t>
             </a:r>
-            <a:endParaRPr lang="es-AR" dirty="0"/>
+            <a:endParaRPr lang="es-AR" sz="2400" dirty="0"/>
           </a:p>
         </p:txBody>
       </p:sp>
+      <p:pic>
+        <p:nvPicPr>
+          <p:cNvPr id="2050" name="Picture 2" descr="F:\Batido.jpg"/>
+          <p:cNvPicPr>
+            <a:picLocks noChangeAspect="1" noChangeArrowheads="1"/>
+          </p:cNvPicPr>
+          <p:nvPr/>
+        </p:nvPicPr>
+        <p:blipFill>
+          <a:blip r:embed="rId5">
+            <a:extLst>
+              <a:ext uri="{28A0092B-C50C-407E-A947-70E740481C1C}">
+                <a14:useLocalDpi xmlns:a14="http://schemas.microsoft.com/office/drawing/2010/main" val="0"/>
+              </a:ext>
+            </a:extLst>
+          </a:blip>
+          <a:srcRect/>
+          <a:stretch>
+            <a:fillRect/>
+          </a:stretch>
+        </p:blipFill>
+        <p:spPr bwMode="auto">
+          <a:xfrm>
+            <a:off x="181905" y="1916832"/>
+            <a:ext cx="8594408" cy="4407218"/>
+          </a:xfrm>
+          <a:prstGeom prst="rect">
+            <a:avLst/>
+          </a:prstGeom>
+          <a:ln>
+            <a:noFill/>
+          </a:ln>
+          <a:effectLst>
+            <a:outerShdw blurRad="292100" dist="139700" dir="2700000" algn="tl" rotWithShape="0">
+              <a:srgbClr val="333333">
+                <a:alpha val="65000"/>
+              </a:srgbClr>
+            </a:outerShdw>
+          </a:effectLst>
+          <a:extLst>
+            <a:ext uri="{909E8E84-426E-40DD-AFC4-6F175D3DCCD1}">
+              <a14:hiddenFill xmlns:a14="http://schemas.microsoft.com/office/drawing/2010/main">
+                <a:solidFill>
+                  <a:srgbClr val="FFFFFF"/>
+                </a:solidFill>
+              </a14:hiddenFill>
+            </a:ext>
+          </a:extLst>
+        </p:spPr>
+      </p:pic>
     </p:spTree>
     <p:extLst>
       <p:ext uri="{BB962C8B-B14F-4D97-AF65-F5344CB8AC3E}">
@@ -8353,56 +9398,882 @@
           <a:chExt cx="0" cy="0"/>
         </a:xfrm>
       </p:grpSpPr>
-      <p:pic>
-        <p:nvPicPr>
-          <p:cNvPr id="2051" name="Picture 3" descr="F:\Practica-Especial - copia\RLC-espectro.jpg"/>
-          <p:cNvPicPr>
-            <a:picLocks noChangeAspect="1" noChangeArrowheads="1"/>
-          </p:cNvPicPr>
+      <p:graphicFrame>
+        <p:nvGraphicFramePr>
+          <p:cNvPr id="3" name="2 Tabla"/>
+          <p:cNvGraphicFramePr>
+            <a:graphicFrameLocks noGrp="1"/>
+          </p:cNvGraphicFramePr>
+          <p:nvPr>
+            <p:extLst>
+              <p:ext uri="{D42A27DB-BD31-4B8C-83A1-F6EECF244321}">
+                <p14:modId xmlns:p14="http://schemas.microsoft.com/office/powerpoint/2010/main" val="1212264946"/>
+              </p:ext>
+            </p:extLst>
+          </p:nvPr>
+        </p:nvGraphicFramePr>
+        <p:xfrm>
+          <a:off x="1799692" y="3465998"/>
+          <a:ext cx="5544616" cy="2712720"/>
+        </p:xfrm>
+        <a:graphic>
+          <a:graphicData uri="http://schemas.openxmlformats.org/drawingml/2006/table">
+            <a:tbl>
+              <a:tblPr firstRow="1" bandRow="1">
+                <a:tableStyleId>{9D7B26C5-4107-4FEC-AEDC-1716B250A1EF}</a:tableStyleId>
+              </a:tblPr>
+              <a:tblGrid>
+                <a:gridCol w="1224136"/>
+                <a:gridCol w="1872208"/>
+                <a:gridCol w="2448272"/>
+              </a:tblGrid>
+              <a:tr h="364045">
+                <a:tc>
+                  <a:txBody>
+                    <a:bodyPr/>
+                    <a:lstStyle/>
+                    <a:p>
+                      <a:r>
+                        <a:rPr lang="es-ES" dirty="0" smtClean="0"/>
+                        <a:t>Armónico</a:t>
+                      </a:r>
+                      <a:endParaRPr lang="es-ES" dirty="0"/>
+                    </a:p>
+                  </a:txBody>
+                  <a:tcPr/>
+                </a:tc>
+                <a:tc>
+                  <a:txBody>
+                    <a:bodyPr/>
+                    <a:lstStyle/>
+                    <a:p>
+                      <a:r>
+                        <a:rPr lang="es-ES" dirty="0" smtClean="0"/>
+                        <a:t>Capacitancia (</a:t>
+                      </a:r>
+                      <a:r>
+                        <a:rPr lang="es-ES" dirty="0" err="1" smtClean="0"/>
+                        <a:t>nF</a:t>
+                      </a:r>
+                      <a:r>
+                        <a:rPr lang="es-ES" dirty="0" smtClean="0"/>
+                        <a:t>)</a:t>
+                      </a:r>
+                      <a:endParaRPr lang="es-ES" dirty="0"/>
+                    </a:p>
+                  </a:txBody>
+                  <a:tcPr/>
+                </a:tc>
+                <a:tc>
+                  <a:txBody>
+                    <a:bodyPr/>
+                    <a:lstStyle/>
+                    <a:p>
+                      <a:r>
+                        <a:rPr lang="es-ES" dirty="0" smtClean="0"/>
+                        <a:t>Frecuencia de Res.(HZ)</a:t>
+                      </a:r>
+                      <a:endParaRPr lang="es-ES" dirty="0"/>
+                    </a:p>
+                  </a:txBody>
+                  <a:tcPr/>
+                </a:tc>
+              </a:tr>
+              <a:tr h="333708">
+                <a:tc>
+                  <a:txBody>
+                    <a:bodyPr/>
+                    <a:lstStyle/>
+                    <a:p>
+                      <a:pPr algn="ctr"/>
+                      <a:r>
+                        <a:rPr lang="es-ES" sz="1600" dirty="0" smtClean="0"/>
+                        <a:t>1</a:t>
+                      </a:r>
+                      <a:endParaRPr lang="es-ES" sz="1600" dirty="0"/>
+                    </a:p>
+                  </a:txBody>
+                  <a:tcPr/>
+                </a:tc>
+                <a:tc>
+                  <a:txBody>
+                    <a:bodyPr/>
+                    <a:lstStyle/>
+                    <a:p>
+                      <a:pPr algn="ctr"/>
+                      <a:r>
+                        <a:rPr lang="es-ES" sz="1600" dirty="0" smtClean="0"/>
+                        <a:t>101±4</a:t>
+                      </a:r>
+                      <a:endParaRPr lang="es-ES" sz="1600" dirty="0"/>
+                    </a:p>
+                  </a:txBody>
+                  <a:tcPr/>
+                </a:tc>
+                <a:tc>
+                  <a:txBody>
+                    <a:bodyPr/>
+                    <a:lstStyle/>
+                    <a:p>
+                      <a:pPr algn="ctr"/>
+                      <a:r>
+                        <a:rPr lang="es-ES" sz="1600" dirty="0" smtClean="0"/>
+                        <a:t>500±11</a:t>
+                      </a:r>
+                      <a:endParaRPr lang="es-ES" sz="1600" dirty="0"/>
+                    </a:p>
+                  </a:txBody>
+                  <a:tcPr/>
+                </a:tc>
+              </a:tr>
+              <a:tr h="333708">
+                <a:tc>
+                  <a:txBody>
+                    <a:bodyPr/>
+                    <a:lstStyle/>
+                    <a:p>
+                      <a:pPr algn="ctr"/>
+                      <a:r>
+                        <a:rPr lang="es-ES" sz="1600" dirty="0" smtClean="0"/>
+                        <a:t>2</a:t>
+                      </a:r>
+                      <a:endParaRPr lang="es-ES" sz="1600" dirty="0"/>
+                    </a:p>
+                  </a:txBody>
+                  <a:tcPr/>
+                </a:tc>
+                <a:tc>
+                  <a:txBody>
+                    <a:bodyPr/>
+                    <a:lstStyle/>
+                    <a:p>
+                      <a:pPr algn="ctr"/>
+                      <a:r>
+                        <a:rPr lang="es-ES" sz="1600" dirty="0" smtClean="0"/>
+                        <a:t>25,0±1,3</a:t>
+                      </a:r>
+                      <a:endParaRPr lang="es-ES" sz="1600" dirty="0"/>
+                    </a:p>
+                  </a:txBody>
+                  <a:tcPr/>
+                </a:tc>
+                <a:tc>
+                  <a:txBody>
+                    <a:bodyPr/>
+                    <a:lstStyle/>
+                    <a:p>
+                      <a:pPr algn="ctr"/>
+                      <a:r>
+                        <a:rPr lang="es-ES" sz="1600" dirty="0" smtClean="0"/>
+                        <a:t>1005±29</a:t>
+                      </a:r>
+                      <a:endParaRPr lang="es-ES" sz="1600" dirty="0"/>
+                    </a:p>
+                  </a:txBody>
+                  <a:tcPr/>
+                </a:tc>
+              </a:tr>
+              <a:tr h="333708">
+                <a:tc>
+                  <a:txBody>
+                    <a:bodyPr/>
+                    <a:lstStyle/>
+                    <a:p>
+                      <a:pPr algn="ctr"/>
+                      <a:r>
+                        <a:rPr lang="es-ES" sz="1600" dirty="0" smtClean="0"/>
+                        <a:t>3</a:t>
+                      </a:r>
+                      <a:endParaRPr lang="es-ES" sz="1600" dirty="0"/>
+                    </a:p>
+                  </a:txBody>
+                  <a:tcPr/>
+                </a:tc>
+                <a:tc>
+                  <a:txBody>
+                    <a:bodyPr/>
+                    <a:lstStyle/>
+                    <a:p>
+                      <a:pPr algn="ctr"/>
+                      <a:r>
+                        <a:rPr lang="es-ES" sz="1600" dirty="0" smtClean="0"/>
+                        <a:t>10,7±0,7</a:t>
+                      </a:r>
+                      <a:endParaRPr lang="es-ES" sz="1600" dirty="0"/>
+                    </a:p>
+                  </a:txBody>
+                  <a:tcPr/>
+                </a:tc>
+                <a:tc>
+                  <a:txBody>
+                    <a:bodyPr/>
+                    <a:lstStyle/>
+                    <a:p>
+                      <a:pPr algn="ctr"/>
+                      <a:r>
+                        <a:rPr lang="es-ES" sz="1600" dirty="0" smtClean="0"/>
+                        <a:t>1536±54</a:t>
+                      </a:r>
+                      <a:endParaRPr lang="es-ES" sz="1600" dirty="0"/>
+                    </a:p>
+                  </a:txBody>
+                  <a:tcPr/>
+                </a:tc>
+              </a:tr>
+              <a:tr h="333708">
+                <a:tc>
+                  <a:txBody>
+                    <a:bodyPr/>
+                    <a:lstStyle/>
+                    <a:p>
+                      <a:pPr algn="ctr"/>
+                      <a:r>
+                        <a:rPr lang="es-ES" sz="1600" dirty="0" smtClean="0"/>
+                        <a:t>4</a:t>
+                      </a:r>
+                      <a:endParaRPr lang="es-ES" sz="1600" dirty="0"/>
+                    </a:p>
+                  </a:txBody>
+                  <a:tcPr/>
+                </a:tc>
+                <a:tc>
+                  <a:txBody>
+                    <a:bodyPr/>
+                    <a:lstStyle/>
+                    <a:p>
+                      <a:pPr algn="ctr"/>
+                      <a:r>
+                        <a:rPr lang="es-ES" sz="1600" dirty="0" smtClean="0"/>
+                        <a:t>6,00±0,03</a:t>
+                      </a:r>
+                      <a:endParaRPr lang="es-ES" sz="1600" dirty="0"/>
+                    </a:p>
+                  </a:txBody>
+                  <a:tcPr/>
+                </a:tc>
+                <a:tc>
+                  <a:txBody>
+                    <a:bodyPr/>
+                    <a:lstStyle/>
+                    <a:p>
+                      <a:pPr algn="ctr"/>
+                      <a:r>
+                        <a:rPr lang="es-ES" sz="1600" dirty="0" smtClean="0"/>
+                        <a:t>2046±56</a:t>
+                      </a:r>
+                      <a:endParaRPr lang="es-ES" sz="1600" dirty="0"/>
+                    </a:p>
+                  </a:txBody>
+                  <a:tcPr/>
+                </a:tc>
+              </a:tr>
+              <a:tr h="333708">
+                <a:tc>
+                  <a:txBody>
+                    <a:bodyPr/>
+                    <a:lstStyle/>
+                    <a:p>
+                      <a:pPr algn="ctr"/>
+                      <a:r>
+                        <a:rPr lang="es-ES" sz="1600" dirty="0" smtClean="0"/>
+                        <a:t>5</a:t>
+                      </a:r>
+                      <a:endParaRPr lang="es-ES" sz="1600" dirty="0"/>
+                    </a:p>
+                  </a:txBody>
+                  <a:tcPr/>
+                </a:tc>
+                <a:tc>
+                  <a:txBody>
+                    <a:bodyPr/>
+                    <a:lstStyle/>
+                    <a:p>
+                      <a:pPr algn="ctr"/>
+                      <a:r>
+                        <a:rPr lang="es-ES" sz="1600" dirty="0" smtClean="0"/>
+                        <a:t>4,02±0,19</a:t>
+                      </a:r>
+                      <a:endParaRPr lang="es-ES" sz="1600" dirty="0"/>
+                    </a:p>
+                  </a:txBody>
+                  <a:tcPr/>
+                </a:tc>
+                <a:tc>
+                  <a:txBody>
+                    <a:bodyPr/>
+                    <a:lstStyle/>
+                    <a:p>
+                      <a:pPr algn="ctr"/>
+                      <a:r>
+                        <a:rPr lang="es-ES" sz="1600" dirty="0" smtClean="0"/>
+                        <a:t>2506±65</a:t>
+                      </a:r>
+                      <a:endParaRPr lang="es-ES" sz="1600" dirty="0"/>
+                    </a:p>
+                  </a:txBody>
+                  <a:tcPr/>
+                </a:tc>
+              </a:tr>
+              <a:tr h="333708">
+                <a:tc>
+                  <a:txBody>
+                    <a:bodyPr/>
+                    <a:lstStyle/>
+                    <a:p>
+                      <a:pPr algn="ctr"/>
+                      <a:r>
+                        <a:rPr lang="es-ES" sz="1600" dirty="0" smtClean="0"/>
+                        <a:t>6</a:t>
+                      </a:r>
+                      <a:endParaRPr lang="es-ES" sz="1600" dirty="0"/>
+                    </a:p>
+                  </a:txBody>
+                  <a:tcPr/>
+                </a:tc>
+                <a:tc>
+                  <a:txBody>
+                    <a:bodyPr/>
+                    <a:lstStyle/>
+                    <a:p>
+                      <a:pPr algn="ctr"/>
+                      <a:r>
+                        <a:rPr lang="es-ES" sz="1600" dirty="0" smtClean="0"/>
+                        <a:t>2,98±0,14</a:t>
+                      </a:r>
+                      <a:endParaRPr lang="es-ES" sz="1600" dirty="0"/>
+                    </a:p>
+                  </a:txBody>
+                  <a:tcPr/>
+                </a:tc>
+                <a:tc>
+                  <a:txBody>
+                    <a:bodyPr/>
+                    <a:lstStyle/>
+                    <a:p>
+                      <a:pPr algn="ctr"/>
+                      <a:r>
+                        <a:rPr lang="es-ES" sz="1600" dirty="0" smtClean="0"/>
+                        <a:t>2911±76</a:t>
+                      </a:r>
+                      <a:endParaRPr lang="es-ES" sz="1600" dirty="0"/>
+                    </a:p>
+                  </a:txBody>
+                  <a:tcPr/>
+                </a:tc>
+              </a:tr>
+              <a:tr h="333708">
+                <a:tc>
+                  <a:txBody>
+                    <a:bodyPr/>
+                    <a:lstStyle/>
+                    <a:p>
+                      <a:pPr algn="ctr"/>
+                      <a:r>
+                        <a:rPr lang="es-ES" sz="1600" dirty="0" smtClean="0"/>
+                        <a:t>7</a:t>
+                      </a:r>
+                      <a:endParaRPr lang="es-ES" sz="1600" dirty="0"/>
+                    </a:p>
+                  </a:txBody>
+                  <a:tcPr/>
+                </a:tc>
+                <a:tc>
+                  <a:txBody>
+                    <a:bodyPr/>
+                    <a:lstStyle/>
+                    <a:p>
+                      <a:pPr algn="ctr"/>
+                      <a:r>
+                        <a:rPr lang="es-ES" sz="1600" dirty="0" smtClean="0"/>
+                        <a:t>1,99±14</a:t>
+                      </a:r>
+                      <a:endParaRPr lang="es-ES" sz="1600" dirty="0"/>
+                    </a:p>
+                  </a:txBody>
+                  <a:tcPr/>
+                </a:tc>
+                <a:tc>
+                  <a:txBody>
+                    <a:bodyPr/>
+                    <a:lstStyle/>
+                    <a:p>
+                      <a:pPr algn="ctr"/>
+                      <a:r>
+                        <a:rPr lang="es-ES" sz="1600" dirty="0" smtClean="0"/>
+                        <a:t>3562±107</a:t>
+                      </a:r>
+                      <a:endParaRPr lang="es-ES" sz="1600" dirty="0"/>
+                    </a:p>
+                  </a:txBody>
+                  <a:tcPr/>
+                </a:tc>
+              </a:tr>
+            </a:tbl>
+          </a:graphicData>
+        </a:graphic>
+      </p:graphicFrame>
+      <p:grpSp>
+        <p:nvGrpSpPr>
+          <p:cNvPr id="7" name="6 Grupo"/>
+          <p:cNvGrpSpPr/>
           <p:nvPr/>
-        </p:nvPicPr>
-        <p:blipFill>
-          <a:blip r:embed="rId2">
+        </p:nvGrpSpPr>
+        <p:grpSpPr>
+          <a:xfrm>
+            <a:off x="840618" y="210241"/>
+            <a:ext cx="7056784" cy="2778730"/>
+            <a:chOff x="827584" y="579573"/>
+            <a:chExt cx="7056784" cy="2778730"/>
+          </a:xfrm>
+        </p:grpSpPr>
+        <p:pic>
+          <p:nvPicPr>
+            <p:cNvPr id="2051" name="Picture 3" descr="F:\Practica-Especial - copia\RLC-espectro.jpg"/>
+            <p:cNvPicPr>
+              <a:picLocks noChangeAspect="1" noChangeArrowheads="1"/>
+            </p:cNvPicPr>
+            <p:nvPr/>
+          </p:nvPicPr>
+          <p:blipFill>
+            <a:blip r:embed="rId2">
+              <a:extLst>
+                <a:ext uri="{28A0092B-C50C-407E-A947-70E740481C1C}">
+                  <a14:useLocalDpi xmlns:a14="http://schemas.microsoft.com/office/drawing/2010/main" val="0"/>
+                </a:ext>
+              </a:extLst>
+            </a:blip>
+            <a:srcRect/>
+            <a:stretch>
+              <a:fillRect/>
+            </a:stretch>
+          </p:blipFill>
+          <p:spPr bwMode="auto">
+            <a:xfrm>
+              <a:off x="827584" y="579573"/>
+              <a:ext cx="2750820" cy="2385060"/>
+            </a:xfrm>
+            <a:prstGeom prst="rect">
+              <a:avLst/>
+            </a:prstGeom>
+            <a:ln>
+              <a:noFill/>
+            </a:ln>
+            <a:effectLst>
+              <a:outerShdw blurRad="292100" dist="139700" dir="2700000" algn="tl" rotWithShape="0">
+                <a:srgbClr val="333333">
+                  <a:alpha val="65000"/>
+                </a:srgbClr>
+              </a:outerShdw>
+            </a:effectLst>
             <a:extLst>
-              <a:ext uri="{28A0092B-C50C-407E-A947-70E740481C1C}">
-                <a14:useLocalDpi xmlns:a14="http://schemas.microsoft.com/office/drawing/2010/main" val="0"/>
+              <a:ext uri="{909E8E84-426E-40DD-AFC4-6F175D3DCCD1}">
+                <a14:hiddenFill xmlns:a14="http://schemas.microsoft.com/office/drawing/2010/main">
+                  <a:solidFill>
+                    <a:srgbClr val="FFFFFF"/>
+                  </a:solidFill>
+                </a14:hiddenFill>
               </a:ext>
             </a:extLst>
-          </a:blip>
-          <a:srcRect/>
-          <a:stretch>
-            <a:fillRect/>
-          </a:stretch>
-        </p:blipFill>
-        <p:spPr bwMode="auto">
-          <a:xfrm>
-            <a:off x="755576" y="1412776"/>
-            <a:ext cx="3438525" cy="2981325"/>
-          </a:xfrm>
-          <a:prstGeom prst="rect">
-            <a:avLst/>
-          </a:prstGeom>
-          <a:ln>
+          </p:spPr>
+        </p:pic>
+        <mc:AlternateContent xmlns:mc="http://schemas.openxmlformats.org/markup-compatibility/2006">
+          <mc:Choice xmlns:a14="http://schemas.microsoft.com/office/drawing/2010/main" Requires="a14">
+            <p:sp>
+              <p:nvSpPr>
+                <p:cNvPr id="4" name="3 CuadroTexto"/>
+                <p:cNvSpPr txBox="1"/>
+                <p:nvPr/>
+              </p:nvSpPr>
+              <p:spPr>
+                <a:xfrm>
+                  <a:off x="4572000" y="579573"/>
+                  <a:ext cx="3312368" cy="2585323"/>
+                </a:xfrm>
+                <a:prstGeom prst="rect">
+                  <a:avLst/>
+                </a:prstGeom>
+                <a:noFill/>
+              </p:spPr>
+              <p:txBody>
+                <a:bodyPr wrap="square" rtlCol="0">
+                  <a:spAutoFit/>
+                </a:bodyPr>
+                <a:lstStyle/>
+                <a:p>
+                  <a:r>
+                    <a:rPr lang="es-ES" dirty="0" smtClean="0"/>
+                    <a:t>Parámetros del RLC resonante:</a:t>
+                  </a:r>
+                </a:p>
+                <a:p>
+                  <a:endParaRPr lang="es-ES" dirty="0"/>
+                </a:p>
+                <a:p>
+                  <a:pPr marL="285750" indent="-285750">
+                    <a:buFont typeface="Arial" panose="020B0604020202020204" pitchFamily="34" charset="0"/>
+                    <a:buChar char="•"/>
+                  </a:pPr>
+                  <a:r>
+                    <a:rPr lang="es-ES" dirty="0" smtClean="0"/>
+                    <a:t>R=(750±7)</a:t>
+                  </a:r>
+                  <a:r>
+                    <a:rPr lang="el-GR" dirty="0" smtClean="0"/>
+                    <a:t>Ω</a:t>
+                  </a:r>
+                  <a:endParaRPr lang="es-ES" dirty="0" smtClean="0"/>
+                </a:p>
+                <a:p>
+                  <a:pPr marL="285750" indent="-285750">
+                    <a:buFont typeface="Arial" panose="020B0604020202020204" pitchFamily="34" charset="0"/>
+                    <a:buChar char="•"/>
+                  </a:pPr>
+                  <a:r>
+                    <a:rPr lang="es-ES" dirty="0" smtClean="0"/>
+                    <a:t>L=(1003 ±5)</a:t>
+                  </a:r>
+                  <a:r>
+                    <a:rPr lang="es-ES" dirty="0" err="1" smtClean="0"/>
+                    <a:t>mH</a:t>
+                  </a:r>
+                  <a:r>
+                    <a:rPr lang="es-ES" dirty="0" smtClean="0"/>
+                    <a:t> </a:t>
+                  </a:r>
+                </a:p>
+                <a:p>
+                  <a:pPr marL="742950" lvl="1" indent="-285750">
+                    <a:buFont typeface="Arial" panose="020B0604020202020204" pitchFamily="34" charset="0"/>
+                    <a:buChar char="•"/>
+                  </a:pPr>
+                  <a14:m>
+                    <m:oMath xmlns:m="http://schemas.openxmlformats.org/officeDocument/2006/math">
+                      <m:sSub>
+                        <m:sSubPr>
+                          <m:ctrlPr>
+                            <a:rPr lang="es-ES" b="0" i="1" smtClean="0">
+                              <a:latin typeface="Cambria Math"/>
+                            </a:rPr>
+                          </m:ctrlPr>
+                        </m:sSubPr>
+                        <m:e>
+                          <m:r>
+                            <a:rPr lang="es-ES" b="0" i="1" smtClean="0">
+                              <a:latin typeface="Cambria Math"/>
+                            </a:rPr>
+                            <m:t>𝑅</m:t>
+                          </m:r>
+                        </m:e>
+                        <m:sub>
+                          <m:r>
+                            <a:rPr lang="es-ES" b="0" i="1" smtClean="0">
+                              <a:latin typeface="Cambria Math"/>
+                            </a:rPr>
+                            <m:t>𝐿</m:t>
+                          </m:r>
+                        </m:sub>
+                      </m:sSub>
+                    </m:oMath>
+                  </a14:m>
+                  <a:r>
+                    <a:rPr lang="es-ES" dirty="0" smtClean="0"/>
+                    <a:t>=(243 ±2)</a:t>
+                  </a:r>
+                  <a:r>
+                    <a:rPr lang="el-GR" dirty="0"/>
+                    <a:t> </a:t>
+                  </a:r>
+                  <a:r>
+                    <a:rPr lang="el-GR" dirty="0" smtClean="0"/>
+                    <a:t>Ω</a:t>
+                  </a:r>
+                  <a:endParaRPr lang="es-ES" dirty="0" smtClean="0"/>
+                </a:p>
+                <a:p>
+                  <a:pPr marL="285750" indent="-285750">
+                    <a:buFont typeface="Arial" panose="020B0604020202020204" pitchFamily="34" charset="0"/>
+                    <a:buChar char="•"/>
+                  </a:pPr>
+                  <a14:m>
+                    <m:oMath xmlns:m="http://schemas.openxmlformats.org/officeDocument/2006/math">
+                      <m:sSub>
+                        <m:sSubPr>
+                          <m:ctrlPr>
+                            <a:rPr lang="es-ES" b="0" i="1" smtClean="0">
+                              <a:latin typeface="Cambria Math"/>
+                            </a:rPr>
+                          </m:ctrlPr>
+                        </m:sSubPr>
+                        <m:e>
+                          <m:r>
+                            <a:rPr lang="es-ES" b="0" i="1" smtClean="0">
+                              <a:latin typeface="Cambria Math"/>
+                            </a:rPr>
+                            <m:t>𝑓</m:t>
+                          </m:r>
+                        </m:e>
+                        <m:sub>
+                          <m:r>
+                            <a:rPr lang="es-ES" b="0" i="1" smtClean="0">
+                              <a:latin typeface="Cambria Math"/>
+                            </a:rPr>
+                            <m:t>𝑠</m:t>
+                          </m:r>
+                        </m:sub>
+                      </m:sSub>
+                    </m:oMath>
+                  </a14:m>
+                  <a:r>
+                    <a:rPr lang="es-ES" dirty="0" smtClean="0"/>
+                    <a:t>=(500,00 ±0,05)Hz</a:t>
+                  </a:r>
+                </a:p>
+                <a:p>
+                  <a:pPr marL="285750" indent="-285750">
+                    <a:buFont typeface="Arial" panose="020B0604020202020204" pitchFamily="34" charset="0"/>
+                    <a:buChar char="•"/>
+                  </a:pPr>
+                  <a14:m>
+                    <m:oMath xmlns:m="http://schemas.openxmlformats.org/officeDocument/2006/math">
+                      <m:r>
+                        <m:rPr>
+                          <m:sty m:val="p"/>
+                        </m:rPr>
+                        <a:rPr lang="es-ES" b="0" i="0" smtClean="0">
+                          <a:latin typeface="Cambria Math"/>
+                        </a:rPr>
+                        <m:t>Δ</m:t>
+                      </m:r>
+                      <m:r>
+                        <a:rPr lang="es-ES" b="0" i="1" smtClean="0">
+                          <a:latin typeface="Cambria Math"/>
+                        </a:rPr>
+                        <m:t>𝑓</m:t>
+                      </m:r>
+                    </m:oMath>
+                  </a14:m>
+                  <a:r>
+                    <a:rPr lang="es-ES" dirty="0" smtClean="0"/>
+                    <a:t>=(158±3)Hz</a:t>
+                  </a:r>
+                </a:p>
+                <a:p>
+                  <a:pPr marL="285750" indent="-285750">
+                    <a:buFont typeface="Arial" panose="020B0604020202020204" pitchFamily="34" charset="0"/>
+                    <a:buChar char="•"/>
+                  </a:pPr>
+                  <a14:m>
+                    <m:oMath xmlns:m="http://schemas.openxmlformats.org/officeDocument/2006/math">
+                      <m:sSub>
+                        <m:sSubPr>
+                          <m:ctrlPr>
+                            <a:rPr lang="es-ES" b="0" i="1" smtClean="0">
+                              <a:latin typeface="Cambria Math"/>
+                            </a:rPr>
+                          </m:ctrlPr>
+                        </m:sSubPr>
+                        <m:e>
+                          <m:r>
+                            <a:rPr lang="es-ES" b="0" i="1" smtClean="0">
+                              <a:latin typeface="Cambria Math"/>
+                            </a:rPr>
+                            <m:t>𝑇</m:t>
+                          </m:r>
+                        </m:e>
+                        <m:sub>
+                          <m:r>
+                            <a:rPr lang="es-ES" b="0" i="1" smtClean="0">
+                              <a:latin typeface="Cambria Math"/>
+                            </a:rPr>
+                            <m:t>𝑚𝑎𝑥</m:t>
+                          </m:r>
+                        </m:sub>
+                      </m:sSub>
+                    </m:oMath>
+                  </a14:m>
+                  <a:r>
+                    <a:rPr lang="es-ES" dirty="0" smtClean="0"/>
+                    <a:t>=(0,75±0,01)</a:t>
+                  </a:r>
+                </a:p>
+                <a:p>
+                  <a:endParaRPr lang="es-ES" dirty="0"/>
+                </a:p>
+              </p:txBody>
+            </p:sp>
+          </mc:Choice>
+          <mc:Fallback>
+            <p:sp>
+              <p:nvSpPr>
+                <p:cNvPr id="4" name="3 CuadroTexto"/>
+                <p:cNvSpPr txBox="1">
+                  <a:spLocks noRot="1" noChangeAspect="1" noMove="1" noResize="1" noEditPoints="1" noAdjustHandles="1" noChangeArrowheads="1" noChangeShapeType="1" noTextEdit="1"/>
+                </p:cNvSpPr>
+                <p:nvPr/>
+              </p:nvSpPr>
+              <p:spPr>
+                <a:xfrm>
+                  <a:off x="4572000" y="579573"/>
+                  <a:ext cx="3312368" cy="2585323"/>
+                </a:xfrm>
+                <a:prstGeom prst="rect">
+                  <a:avLst/>
+                </a:prstGeom>
+                <a:blipFill rotWithShape="1">
+                  <a:blip r:embed="rId3"/>
+                  <a:stretch>
+                    <a:fillRect l="-1471" t="-1176"/>
+                  </a:stretch>
+                </a:blipFill>
+              </p:spPr>
+              <p:txBody>
+                <a:bodyPr/>
+                <a:lstStyle/>
+                <a:p>
+                  <a:r>
+                    <a:rPr lang="es-ES">
+                      <a:noFill/>
+                    </a:rPr>
+                    <a:t> </a:t>
+                  </a:r>
+                </a:p>
+              </p:txBody>
+            </p:sp>
+          </mc:Fallback>
+        </mc:AlternateContent>
+        <p:sp>
+          <p:nvSpPr>
+            <p:cNvPr id="5" name="4 CuadroTexto"/>
+            <p:cNvSpPr txBox="1"/>
+            <p:nvPr/>
+          </p:nvSpPr>
+          <p:spPr>
+            <a:xfrm>
+              <a:off x="935596" y="2988971"/>
+              <a:ext cx="2534796" cy="369332"/>
+            </a:xfrm>
+            <a:prstGeom prst="rect">
+              <a:avLst/>
+            </a:prstGeom>
             <a:noFill/>
-          </a:ln>
-          <a:effectLst>
-            <a:outerShdw blurRad="292100" dist="139700" dir="2700000" algn="tl" rotWithShape="0">
-              <a:srgbClr val="333333">
-                <a:alpha val="65000"/>
-              </a:srgbClr>
-            </a:outerShdw>
-          </a:effectLst>
-          <a:extLst>
-            <a:ext uri="{909E8E84-426E-40DD-AFC4-6F175D3DCCD1}">
-              <a14:hiddenFill xmlns:a14="http://schemas.microsoft.com/office/drawing/2010/main">
-                <a:solidFill>
-                  <a:srgbClr val="FFFFFF"/>
-                </a:solidFill>
-              </a14:hiddenFill>
-            </a:ext>
-          </a:extLst>
-        </p:spPr>
-      </p:pic>
+          </p:spPr>
+          <p:txBody>
+            <a:bodyPr wrap="square" rtlCol="0">
+              <a:spAutoFit/>
+            </a:bodyPr>
+            <a:lstStyle/>
+            <a:p>
+              <a:r>
+                <a:rPr lang="es-ES" dirty="0" smtClean="0"/>
+                <a:t>Circuito RLC resonante</a:t>
+              </a:r>
+              <a:endParaRPr lang="es-ES" dirty="0"/>
+            </a:p>
+          </p:txBody>
+        </p:sp>
+      </p:grpSp>
+      <mc:AlternateContent xmlns:mc="http://schemas.openxmlformats.org/markup-compatibility/2006">
+        <mc:Choice xmlns:a14="http://schemas.microsoft.com/office/drawing/2010/main" Requires="a14">
+          <p:sp>
+            <p:nvSpPr>
+              <p:cNvPr id="6" name="5 CuadroTexto"/>
+              <p:cNvSpPr txBox="1"/>
+              <p:nvPr/>
+            </p:nvSpPr>
+            <p:spPr>
+              <a:xfrm>
+                <a:off x="1629318" y="6210268"/>
+                <a:ext cx="6264696" cy="369332"/>
+              </a:xfrm>
+              <a:prstGeom prst="rect">
+                <a:avLst/>
+              </a:prstGeom>
+              <a:noFill/>
+            </p:spPr>
+            <p:txBody>
+              <a:bodyPr wrap="square" rtlCol="0">
+                <a:spAutoFit/>
+              </a:bodyPr>
+              <a:lstStyle/>
+              <a:p>
+                <a:pPr algn="ctr"/>
+                <a:r>
+                  <a:rPr lang="es-ES" dirty="0" smtClean="0"/>
+                  <a:t>Tabla de capacitancias usadas para filtrar cada armónico de </a:t>
+                </a:r>
+                <a14:m>
+                  <m:oMath xmlns:m="http://schemas.openxmlformats.org/officeDocument/2006/math">
+                    <m:sSub>
+                      <m:sSubPr>
+                        <m:ctrlPr>
+                          <a:rPr lang="es-ES" b="0" i="1" smtClean="0">
+                            <a:latin typeface="Cambria Math"/>
+                          </a:rPr>
+                        </m:ctrlPr>
+                      </m:sSubPr>
+                      <m:e>
+                        <m:r>
+                          <a:rPr lang="es-ES" b="0" i="1" smtClean="0">
+                            <a:latin typeface="Cambria Math"/>
+                          </a:rPr>
+                          <m:t>𝑓</m:t>
+                        </m:r>
+                      </m:e>
+                      <m:sub>
+                        <m:r>
+                          <a:rPr lang="es-ES" b="0" i="1" smtClean="0">
+                            <a:latin typeface="Cambria Math"/>
+                          </a:rPr>
+                          <m:t>𝑠</m:t>
+                        </m:r>
+                      </m:sub>
+                    </m:sSub>
+                  </m:oMath>
+                </a14:m>
+                <a:endParaRPr lang="es-ES" dirty="0"/>
+              </a:p>
+            </p:txBody>
+          </p:sp>
+        </mc:Choice>
+        <mc:Fallback>
+          <p:sp>
+            <p:nvSpPr>
+              <p:cNvPr id="6" name="5 CuadroTexto"/>
+              <p:cNvSpPr txBox="1">
+                <a:spLocks noRot="1" noChangeAspect="1" noMove="1" noResize="1" noEditPoints="1" noAdjustHandles="1" noChangeArrowheads="1" noChangeShapeType="1" noTextEdit="1"/>
+              </p:cNvSpPr>
+              <p:nvPr/>
+            </p:nvSpPr>
+            <p:spPr>
+              <a:xfrm>
+                <a:off x="1629318" y="6210268"/>
+                <a:ext cx="6264696" cy="369332"/>
+              </a:xfrm>
+              <a:prstGeom prst="rect">
+                <a:avLst/>
+              </a:prstGeom>
+              <a:blipFill rotWithShape="1">
+                <a:blip r:embed="rId4"/>
+                <a:stretch>
+                  <a:fillRect t="-8333" b="-26667"/>
+                </a:stretch>
+              </a:blipFill>
+            </p:spPr>
+            <p:txBody>
+              <a:bodyPr/>
+              <a:lstStyle/>
+              <a:p>
+                <a:r>
+                  <a:rPr lang="es-ES">
+                    <a:noFill/>
+                  </a:rPr>
+                  <a:t> </a:t>
+                </a:r>
+              </a:p>
+            </p:txBody>
+          </p:sp>
+        </mc:Fallback>
+      </mc:AlternateContent>
     </p:spTree>
     <p:extLst>
       <p:ext uri="{BB962C8B-B14F-4D97-AF65-F5344CB8AC3E}">
@@ -8442,7 +10313,7 @@
       </p:grpSpPr>
       <p:pic>
         <p:nvPicPr>
-          <p:cNvPr id="2" name="Picture 2" descr="F:\Practica-Especial - copia\Sumador.jpg"/>
+          <p:cNvPr id="3" name="Picture 4" descr="F:\Practica-Especial - copia\filtro.jpg"/>
           <p:cNvPicPr>
             <a:picLocks noChangeAspect="1" noChangeArrowheads="1"/>
           </p:cNvPicPr>
@@ -8463,57 +10334,7 @@
         </p:blipFill>
         <p:spPr bwMode="auto">
           <a:xfrm>
-            <a:off x="251520" y="1628800"/>
-            <a:ext cx="3438525" cy="3143250"/>
-          </a:xfrm>
-          <a:prstGeom prst="rect">
-            <a:avLst/>
-          </a:prstGeom>
-          <a:ln>
-            <a:noFill/>
-          </a:ln>
-          <a:effectLst>
-            <a:outerShdw blurRad="292100" dist="139700" dir="2700000" algn="tl" rotWithShape="0">
-              <a:srgbClr val="333333">
-                <a:alpha val="65000"/>
-              </a:srgbClr>
-            </a:outerShdw>
-          </a:effectLst>
-          <a:extLst>
-            <a:ext uri="{909E8E84-426E-40DD-AFC4-6F175D3DCCD1}">
-              <a14:hiddenFill xmlns:a14="http://schemas.microsoft.com/office/drawing/2010/main">
-                <a:solidFill>
-                  <a:srgbClr val="FFFFFF"/>
-                </a:solidFill>
-              </a14:hiddenFill>
-            </a:ext>
-          </a:extLst>
-        </p:spPr>
-      </p:pic>
-      <p:pic>
-        <p:nvPicPr>
-          <p:cNvPr id="3" name="Picture 4" descr="F:\Practica-Especial - copia\filtro.jpg"/>
-          <p:cNvPicPr>
-            <a:picLocks noChangeAspect="1" noChangeArrowheads="1"/>
-          </p:cNvPicPr>
-          <p:nvPr/>
-        </p:nvPicPr>
-        <p:blipFill>
-          <a:blip r:embed="rId3">
-            <a:extLst>
-              <a:ext uri="{28A0092B-C50C-407E-A947-70E740481C1C}">
-                <a14:useLocalDpi xmlns:a14="http://schemas.microsoft.com/office/drawing/2010/main" val="0"/>
-              </a:ext>
-            </a:extLst>
-          </a:blip>
-          <a:srcRect/>
-          <a:stretch>
-            <a:fillRect/>
-          </a:stretch>
-        </p:blipFill>
-        <p:spPr bwMode="auto">
-          <a:xfrm>
-            <a:off x="4572000" y="1916832"/>
+            <a:off x="4640143" y="1285875"/>
             <a:ext cx="4095750" cy="2143125"/>
           </a:xfrm>
           <a:prstGeom prst="rect">
@@ -8540,6 +10361,556 @@
           </a:extLst>
         </p:spPr>
       </p:pic>
+      <p:sp>
+        <p:nvSpPr>
+          <p:cNvPr id="6" name="5 CuadroTexto"/>
+          <p:cNvSpPr txBox="1"/>
+          <p:nvPr/>
+        </p:nvSpPr>
+        <p:spPr>
+          <a:xfrm>
+            <a:off x="5247858" y="823329"/>
+            <a:ext cx="2880320" cy="369332"/>
+          </a:xfrm>
+          <a:prstGeom prst="rect">
+            <a:avLst/>
+          </a:prstGeom>
+          <a:noFill/>
+        </p:spPr>
+        <p:txBody>
+          <a:bodyPr wrap="square" rtlCol="0">
+            <a:spAutoFit/>
+          </a:bodyPr>
+          <a:lstStyle/>
+          <a:p>
+            <a:r>
+              <a:rPr lang="es-ES" dirty="0" smtClean="0"/>
+              <a:t>Circuito RLC anti-resonante</a:t>
+            </a:r>
+            <a:endParaRPr lang="es-ES" dirty="0"/>
+          </a:p>
+        </p:txBody>
+      </p:sp>
+      <p:grpSp>
+        <p:nvGrpSpPr>
+          <p:cNvPr id="8" name="7 Grupo"/>
+          <p:cNvGrpSpPr/>
+          <p:nvPr/>
+        </p:nvGrpSpPr>
+        <p:grpSpPr>
+          <a:xfrm>
+            <a:off x="240118" y="823329"/>
+            <a:ext cx="3438525" cy="4875087"/>
+            <a:chOff x="240118" y="823329"/>
+            <a:chExt cx="3438525" cy="4875087"/>
+          </a:xfrm>
+        </p:grpSpPr>
+        <p:pic>
+          <p:nvPicPr>
+            <p:cNvPr id="2" name="Picture 2" descr="F:\Practica-Especial - copia\Sumador.jpg"/>
+            <p:cNvPicPr>
+              <a:picLocks noChangeAspect="1" noChangeArrowheads="1"/>
+            </p:cNvPicPr>
+            <p:nvPr/>
+          </p:nvPicPr>
+          <p:blipFill>
+            <a:blip r:embed="rId3">
+              <a:extLst>
+                <a:ext uri="{28A0092B-C50C-407E-A947-70E740481C1C}">
+                  <a14:useLocalDpi xmlns:a14="http://schemas.microsoft.com/office/drawing/2010/main" val="0"/>
+                </a:ext>
+              </a:extLst>
+            </a:blip>
+            <a:srcRect/>
+            <a:stretch>
+              <a:fillRect/>
+            </a:stretch>
+          </p:blipFill>
+          <p:spPr bwMode="auto">
+            <a:xfrm>
+              <a:off x="240118" y="1239325"/>
+              <a:ext cx="3438525" cy="3143250"/>
+            </a:xfrm>
+            <a:prstGeom prst="rect">
+              <a:avLst/>
+            </a:prstGeom>
+            <a:ln>
+              <a:noFill/>
+            </a:ln>
+            <a:effectLst>
+              <a:outerShdw blurRad="292100" dist="139700" dir="2700000" algn="tl" rotWithShape="0">
+                <a:srgbClr val="333333">
+                  <a:alpha val="65000"/>
+                </a:srgbClr>
+              </a:outerShdw>
+            </a:effectLst>
+            <a:extLst>
+              <a:ext uri="{909E8E84-426E-40DD-AFC4-6F175D3DCCD1}">
+                <a14:hiddenFill xmlns:a14="http://schemas.microsoft.com/office/drawing/2010/main">
+                  <a:solidFill>
+                    <a:srgbClr val="FFFFFF"/>
+                  </a:solidFill>
+                </a14:hiddenFill>
+              </a:ext>
+            </a:extLst>
+          </p:spPr>
+        </p:pic>
+        <mc:AlternateContent xmlns:mc="http://schemas.openxmlformats.org/markup-compatibility/2006">
+          <mc:Choice xmlns:a14="http://schemas.microsoft.com/office/drawing/2010/main" Requires="a14">
+            <p:sp>
+              <p:nvSpPr>
+                <p:cNvPr id="4" name="3 CuadroTexto"/>
+                <p:cNvSpPr txBox="1"/>
+                <p:nvPr/>
+              </p:nvSpPr>
+              <p:spPr>
+                <a:xfrm>
+                  <a:off x="735245" y="4221088"/>
+                  <a:ext cx="2448272" cy="1477328"/>
+                </a:xfrm>
+                <a:prstGeom prst="rect">
+                  <a:avLst/>
+                </a:prstGeom>
+                <a:noFill/>
+              </p:spPr>
+              <p:txBody>
+                <a:bodyPr wrap="square" rtlCol="0">
+                  <a:spAutoFit/>
+                </a:bodyPr>
+                <a:lstStyle/>
+                <a:p>
+                  <a:endParaRPr lang="es-ES" dirty="0" smtClean="0"/>
+                </a:p>
+                <a:p>
+                  <a:pPr marL="285750" indent="-285750">
+                    <a:buFont typeface="Arial" panose="020B0604020202020204" pitchFamily="34" charset="0"/>
+                    <a:buChar char="•"/>
+                  </a:pPr>
+                  <a14:m>
+                    <m:oMath xmlns:m="http://schemas.openxmlformats.org/officeDocument/2006/math">
+                      <m:sSub>
+                        <m:sSubPr>
+                          <m:ctrlPr>
+                            <a:rPr lang="es-ES" b="0" i="1" smtClean="0">
+                              <a:latin typeface="Cambria Math"/>
+                            </a:rPr>
+                          </m:ctrlPr>
+                        </m:sSubPr>
+                        <m:e>
+                          <m:r>
+                            <a:rPr lang="es-ES" b="0" i="1" smtClean="0">
+                              <a:latin typeface="Cambria Math"/>
+                            </a:rPr>
+                            <m:t>𝑟</m:t>
+                          </m:r>
+                        </m:e>
+                        <m:sub>
+                          <m:r>
+                            <a:rPr lang="es-ES" b="0" i="1" smtClean="0">
+                              <a:latin typeface="Cambria Math"/>
+                            </a:rPr>
+                            <m:t>1</m:t>
+                          </m:r>
+                        </m:sub>
+                      </m:sSub>
+                      <m:r>
+                        <a:rPr lang="es-ES" b="0" i="1" smtClean="0">
+                          <a:latin typeface="Cambria Math"/>
+                        </a:rPr>
+                        <m:t>=</m:t>
+                      </m:r>
+                      <m:sSub>
+                        <m:sSubPr>
+                          <m:ctrlPr>
+                            <a:rPr lang="es-ES" b="0" i="1" smtClean="0">
+                              <a:latin typeface="Cambria Math"/>
+                            </a:rPr>
+                          </m:ctrlPr>
+                        </m:sSubPr>
+                        <m:e>
+                          <m:r>
+                            <a:rPr lang="es-ES" b="0" i="1" smtClean="0">
+                              <a:latin typeface="Cambria Math"/>
+                            </a:rPr>
+                            <m:t>𝑟</m:t>
+                          </m:r>
+                        </m:e>
+                        <m:sub>
+                          <m:r>
+                            <a:rPr lang="es-ES" b="0" i="1" smtClean="0">
+                              <a:latin typeface="Cambria Math"/>
+                            </a:rPr>
+                            <m:t>2</m:t>
+                          </m:r>
+                        </m:sub>
+                      </m:sSub>
+                    </m:oMath>
+                  </a14:m>
+                  <a:r>
+                    <a:rPr lang="es-ES" dirty="0" smtClean="0"/>
+                    <a:t>=(10,5 ±0,4)</a:t>
+                  </a:r>
+                </a:p>
+                <a:p>
+                  <a:pPr marL="285750" indent="-285750">
+                    <a:buFont typeface="Arial" panose="020B0604020202020204" pitchFamily="34" charset="0"/>
+                    <a:buChar char="•"/>
+                  </a:pPr>
+                  <a:r>
+                    <a:rPr lang="es-ES" dirty="0" smtClean="0"/>
+                    <a:t>R=(200±3)</a:t>
+                  </a:r>
+                </a:p>
+                <a:p>
+                  <a:pPr marL="285750" indent="-285750">
+                    <a:buFont typeface="Arial" panose="020B0604020202020204" pitchFamily="34" charset="0"/>
+                    <a:buChar char="•"/>
+                  </a:pPr>
+                  <a:endParaRPr lang="es-ES" dirty="0"/>
+                </a:p>
+                <a:p>
+                  <a:pPr marL="285750" indent="-285750">
+                    <a:buFont typeface="Arial" panose="020B0604020202020204" pitchFamily="34" charset="0"/>
+                    <a:buChar char="•"/>
+                  </a:pPr>
+                  <a14:m>
+                    <m:oMath xmlns:m="http://schemas.openxmlformats.org/officeDocument/2006/math">
+                      <m:sSub>
+                        <m:sSubPr>
+                          <m:ctrlPr>
+                            <a:rPr lang="es-ES" b="0" i="1" smtClean="0">
+                              <a:latin typeface="Cambria Math"/>
+                            </a:rPr>
+                          </m:ctrlPr>
+                        </m:sSubPr>
+                        <m:e>
+                          <m:r>
+                            <a:rPr lang="es-ES" b="0" i="1" smtClean="0">
+                              <a:latin typeface="Cambria Math"/>
+                            </a:rPr>
+                            <m:t>𝑓</m:t>
+                          </m:r>
+                        </m:e>
+                        <m:sub>
+                          <m:r>
+                            <a:rPr lang="es-ES" b="0" i="1" smtClean="0">
+                              <a:latin typeface="Cambria Math"/>
+                            </a:rPr>
+                            <m:t>1</m:t>
+                          </m:r>
+                        </m:sub>
+                      </m:sSub>
+                    </m:oMath>
+                  </a14:m>
+                  <a:r>
+                    <a:rPr lang="es-ES" dirty="0" smtClean="0"/>
+                    <a:t>=(10844±1)Hz</a:t>
+                  </a:r>
+                  <a:endParaRPr lang="es-ES" dirty="0"/>
+                </a:p>
+              </p:txBody>
+            </p:sp>
+          </mc:Choice>
+          <mc:Fallback>
+            <p:sp>
+              <p:nvSpPr>
+                <p:cNvPr id="4" name="3 CuadroTexto"/>
+                <p:cNvSpPr txBox="1">
+                  <a:spLocks noRot="1" noChangeAspect="1" noMove="1" noResize="1" noEditPoints="1" noAdjustHandles="1" noChangeArrowheads="1" noChangeShapeType="1" noTextEdit="1"/>
+                </p:cNvSpPr>
+                <p:nvPr/>
+              </p:nvSpPr>
+              <p:spPr>
+                <a:xfrm>
+                  <a:off x="735245" y="4221088"/>
+                  <a:ext cx="2448272" cy="1477328"/>
+                </a:xfrm>
+                <a:prstGeom prst="rect">
+                  <a:avLst/>
+                </a:prstGeom>
+                <a:blipFill rotWithShape="1">
+                  <a:blip r:embed="rId4"/>
+                  <a:stretch>
+                    <a:fillRect l="-1746" b="-5350"/>
+                  </a:stretch>
+                </a:blipFill>
+              </p:spPr>
+              <p:txBody>
+                <a:bodyPr/>
+                <a:lstStyle/>
+                <a:p>
+                  <a:r>
+                    <a:rPr lang="es-ES">
+                      <a:noFill/>
+                    </a:rPr>
+                    <a:t> </a:t>
+                  </a:r>
+                </a:p>
+              </p:txBody>
+            </p:sp>
+          </mc:Fallback>
+        </mc:AlternateContent>
+        <p:sp>
+          <p:nvSpPr>
+            <p:cNvPr id="7" name="6 CuadroTexto"/>
+            <p:cNvSpPr txBox="1"/>
+            <p:nvPr/>
+          </p:nvSpPr>
+          <p:spPr>
+            <a:xfrm>
+              <a:off x="1088689" y="823329"/>
+              <a:ext cx="2067902" cy="369332"/>
+            </a:xfrm>
+            <a:prstGeom prst="rect">
+              <a:avLst/>
+            </a:prstGeom>
+            <a:noFill/>
+          </p:spPr>
+          <p:txBody>
+            <a:bodyPr wrap="square" rtlCol="0">
+              <a:spAutoFit/>
+            </a:bodyPr>
+            <a:lstStyle/>
+            <a:p>
+              <a:r>
+                <a:rPr lang="es-ES" dirty="0"/>
+                <a:t>Circuito </a:t>
+              </a:r>
+              <a:r>
+                <a:rPr lang="es-ES" dirty="0" smtClean="0"/>
+                <a:t>sumador</a:t>
+              </a:r>
+              <a:endParaRPr lang="es-ES" dirty="0"/>
+            </a:p>
+          </p:txBody>
+        </p:sp>
+      </p:grpSp>
+      <mc:AlternateContent xmlns:mc="http://schemas.openxmlformats.org/markup-compatibility/2006">
+        <mc:Choice xmlns:a14="http://schemas.microsoft.com/office/drawing/2010/main" Requires="a14">
+          <p:sp>
+            <p:nvSpPr>
+              <p:cNvPr id="9" name="8 CuadroTexto"/>
+              <p:cNvSpPr txBox="1"/>
+              <p:nvPr/>
+            </p:nvSpPr>
+            <p:spPr>
+              <a:xfrm>
+                <a:off x="5220072" y="3789040"/>
+                <a:ext cx="3140566" cy="2308324"/>
+              </a:xfrm>
+              <a:prstGeom prst="rect">
+                <a:avLst/>
+              </a:prstGeom>
+              <a:noFill/>
+            </p:spPr>
+            <p:txBody>
+              <a:bodyPr wrap="square" rtlCol="0">
+                <a:spAutoFit/>
+              </a:bodyPr>
+              <a:lstStyle/>
+              <a:p>
+                <a:r>
+                  <a:rPr lang="es-ES" dirty="0" smtClean="0"/>
+                  <a:t>Parámetros:</a:t>
+                </a:r>
+              </a:p>
+              <a:p>
+                <a:pPr marL="285750" indent="-285750">
+                  <a:buFont typeface="Arial" panose="020B0604020202020204" pitchFamily="34" charset="0"/>
+                  <a:buChar char="•"/>
+                </a:pPr>
+                <a:endParaRPr lang="es-ES" dirty="0"/>
+              </a:p>
+              <a:p>
+                <a:pPr marL="285750" indent="-285750">
+                  <a:buFont typeface="Arial" panose="020B0604020202020204" pitchFamily="34" charset="0"/>
+                  <a:buChar char="•"/>
+                </a:pPr>
+                <a:r>
+                  <a:rPr lang="es-ES" dirty="0" smtClean="0"/>
+                  <a:t>R=(7500±70)</a:t>
+                </a:r>
+              </a:p>
+              <a:p>
+                <a:pPr marL="285750" indent="-285750">
+                  <a:buFont typeface="Arial" panose="020B0604020202020204" pitchFamily="34" charset="0"/>
+                  <a:buChar char="•"/>
+                </a:pPr>
+                <a:r>
+                  <a:rPr lang="es-ES" dirty="0" smtClean="0"/>
+                  <a:t>L=(10,0±0,3)</a:t>
+                </a:r>
+                <a:r>
+                  <a:rPr lang="es-ES" dirty="0" err="1" smtClean="0"/>
+                  <a:t>mH</a:t>
+                </a:r>
+                <a:endParaRPr lang="es-ES" dirty="0" smtClean="0"/>
+              </a:p>
+              <a:p>
+                <a:pPr marL="742950" lvl="1" indent="-285750">
+                  <a:buFont typeface="Arial" panose="020B0604020202020204" pitchFamily="34" charset="0"/>
+                  <a:buChar char="•"/>
+                </a:pPr>
+                <a14:m>
+                  <m:oMath xmlns:m="http://schemas.openxmlformats.org/officeDocument/2006/math">
+                    <m:sSub>
+                      <m:sSubPr>
+                        <m:ctrlPr>
+                          <a:rPr lang="es-ES" b="0" i="1" smtClean="0">
+                            <a:latin typeface="Cambria Math"/>
+                          </a:rPr>
+                        </m:ctrlPr>
+                      </m:sSubPr>
+                      <m:e>
+                        <m:r>
+                          <a:rPr lang="es-ES" b="0" i="1" smtClean="0">
+                            <a:latin typeface="Cambria Math"/>
+                          </a:rPr>
+                          <m:t>𝑅</m:t>
+                        </m:r>
+                      </m:e>
+                      <m:sub>
+                        <m:r>
+                          <a:rPr lang="es-ES" b="0" i="1" smtClean="0">
+                            <a:latin typeface="Cambria Math"/>
+                          </a:rPr>
+                          <m:t>𝐿</m:t>
+                        </m:r>
+                      </m:sub>
+                    </m:sSub>
+                  </m:oMath>
+                </a14:m>
+                <a:r>
+                  <a:rPr lang="es-ES" dirty="0" smtClean="0"/>
+                  <a:t>=(5,8±0,1)</a:t>
+                </a:r>
+              </a:p>
+              <a:p>
+                <a:pPr marL="285750" indent="-285750">
+                  <a:buFont typeface="Arial" panose="020B0604020202020204" pitchFamily="34" charset="0"/>
+                  <a:buChar char="•"/>
+                </a:pPr>
+                <a:r>
+                  <a:rPr lang="es-ES" dirty="0" smtClean="0"/>
+                  <a:t>C=(101,2±0,8)</a:t>
+                </a:r>
+                <a:r>
+                  <a:rPr lang="es-ES" dirty="0" err="1" smtClean="0"/>
+                  <a:t>nF</a:t>
+                </a:r>
+                <a:endParaRPr lang="es-ES" dirty="0" smtClean="0"/>
+              </a:p>
+              <a:p>
+                <a:pPr marL="285750" indent="-285750">
+                  <a:buFont typeface="Arial" panose="020B0604020202020204" pitchFamily="34" charset="0"/>
+                  <a:buChar char="•"/>
+                </a:pPr>
+                <a14:m>
+                  <m:oMath xmlns:m="http://schemas.openxmlformats.org/officeDocument/2006/math">
+                    <m:sSub>
+                      <m:sSubPr>
+                        <m:ctrlPr>
+                          <a:rPr lang="es-ES" b="0" i="1" smtClean="0">
+                            <a:latin typeface="Cambria Math"/>
+                          </a:rPr>
+                        </m:ctrlPr>
+                      </m:sSubPr>
+                      <m:e>
+                        <m:r>
+                          <a:rPr lang="es-ES" b="0" i="1" smtClean="0">
+                            <a:latin typeface="Cambria Math"/>
+                          </a:rPr>
+                          <m:t>𝑓</m:t>
+                        </m:r>
+                      </m:e>
+                      <m:sub>
+                        <m:r>
+                          <a:rPr lang="es-ES" b="0" i="1" smtClean="0">
+                            <a:latin typeface="Cambria Math"/>
+                          </a:rPr>
+                          <m:t>0</m:t>
+                        </m:r>
+                      </m:sub>
+                    </m:sSub>
+                  </m:oMath>
+                </a14:m>
+                <a:r>
+                  <a:rPr lang="es-ES" dirty="0" smtClean="0"/>
+                  <a:t>=(5003±95)Hz</a:t>
+                </a:r>
+              </a:p>
+              <a:p>
+                <a:pPr marL="285750" indent="-285750">
+                  <a:buFont typeface="Arial" panose="020B0604020202020204" pitchFamily="34" charset="0"/>
+                  <a:buChar char="•"/>
+                </a:pPr>
+                <a14:m>
+                  <m:oMath xmlns:m="http://schemas.openxmlformats.org/officeDocument/2006/math">
+                    <m:r>
+                      <m:rPr>
+                        <m:sty m:val="p"/>
+                      </m:rPr>
+                      <a:rPr lang="es-ES" b="0" i="0" smtClean="0">
+                        <a:latin typeface="Cambria Math"/>
+                      </a:rPr>
+                      <m:t>Δ</m:t>
+                    </m:r>
+                    <m:r>
+                      <a:rPr lang="es-ES" b="0" i="1" smtClean="0">
+                        <a:latin typeface="Cambria Math"/>
+                      </a:rPr>
+                      <m:t>𝑓</m:t>
+                    </m:r>
+                  </m:oMath>
+                </a14:m>
+                <a:r>
+                  <a:rPr lang="es-ES" dirty="0" smtClean="0"/>
+                  <a:t>=(210±4)Hz</a:t>
+                </a:r>
+                <a:endParaRPr lang="es-ES" dirty="0"/>
+              </a:p>
+            </p:txBody>
+          </p:sp>
+        </mc:Choice>
+        <mc:Fallback>
+          <p:sp>
+            <p:nvSpPr>
+              <p:cNvPr id="9" name="8 CuadroTexto"/>
+              <p:cNvSpPr txBox="1">
+                <a:spLocks noRot="1" noChangeAspect="1" noMove="1" noResize="1" noEditPoints="1" noAdjustHandles="1" noChangeArrowheads="1" noChangeShapeType="1" noTextEdit="1"/>
+              </p:cNvSpPr>
+              <p:nvPr/>
+            </p:nvSpPr>
+            <p:spPr>
+              <a:xfrm>
+                <a:off x="5220072" y="3789040"/>
+                <a:ext cx="3140566" cy="2308324"/>
+              </a:xfrm>
+              <a:prstGeom prst="rect">
+                <a:avLst/>
+              </a:prstGeom>
+              <a:blipFill rotWithShape="1">
+                <a:blip r:embed="rId5"/>
+                <a:stretch>
+                  <a:fillRect l="-1553" t="-1323" b="-3439"/>
+                </a:stretch>
+              </a:blipFill>
+            </p:spPr>
+            <p:txBody>
+              <a:bodyPr/>
+              <a:lstStyle/>
+              <a:p>
+                <a:r>
+                  <a:rPr lang="es-ES">
+                    <a:noFill/>
+                  </a:rPr>
+                  <a:t> </a:t>
+                </a:r>
+              </a:p>
+            </p:txBody>
+          </p:sp>
+        </mc:Fallback>
+      </mc:AlternateContent>
     </p:spTree>
     <p:extLst>
       <p:ext uri="{BB962C8B-B14F-4D97-AF65-F5344CB8AC3E}">
@@ -8600,8 +10971,8 @@
         </p:blipFill>
         <p:spPr bwMode="auto">
           <a:xfrm>
-            <a:off x="475119" y="332656"/>
-            <a:ext cx="4547616" cy="3535680"/>
+            <a:off x="323528" y="116633"/>
+            <a:ext cx="4092356" cy="3183359"/>
           </a:xfrm>
           <a:prstGeom prst="rect">
             <a:avLst/>
@@ -8618,62 +10989,8 @@
           </a:extLst>
         </p:spPr>
       </p:pic>
-      <p:pic>
-        <p:nvPicPr>
-          <p:cNvPr id="4100" name="Picture 4"/>
-          <p:cNvPicPr>
-            <a:picLocks noChangeAspect="1" noChangeArrowheads="1"/>
-          </p:cNvPicPr>
-          <p:nvPr/>
-        </p:nvPicPr>
-        <p:blipFill>
-          <a:blip r:embed="rId3">
-            <a:extLst>
-              <a:ext uri="{28A0092B-C50C-407E-A947-70E740481C1C}">
-                <a14:useLocalDpi xmlns:a14="http://schemas.microsoft.com/office/drawing/2010/main" val="0"/>
-              </a:ext>
-            </a:extLst>
-          </a:blip>
-          <a:srcRect/>
-          <a:stretch>
-            <a:fillRect/>
-          </a:stretch>
-        </p:blipFill>
-        <p:spPr bwMode="auto">
-          <a:xfrm>
-            <a:off x="1403648" y="4653136"/>
-            <a:ext cx="5600700" cy="1813560"/>
-          </a:xfrm>
-          <a:prstGeom prst="rect">
-            <a:avLst/>
-          </a:prstGeom>
-          <a:noFill/>
-          <a:ln>
-            <a:noFill/>
-          </a:ln>
-          <a:extLst>
-            <a:ext uri="{909E8E84-426E-40DD-AFC4-6F175D3DCCD1}">
-              <a14:hiddenFill xmlns:a14="http://schemas.microsoft.com/office/drawing/2010/main">
-                <a:solidFill>
-                  <a:schemeClr val="accent1"/>
-                </a:solidFill>
-              </a14:hiddenFill>
-            </a:ext>
-            <a:ext uri="{91240B29-F687-4F45-9708-019B960494DF}">
-              <a14:hiddenLine xmlns:a14="http://schemas.microsoft.com/office/drawing/2010/main" w="9525">
-                <a:solidFill>
-                  <a:schemeClr val="tx1"/>
-                </a:solidFill>
-                <a:miter lim="800000"/>
-                <a:headEnd/>
-                <a:tailEnd/>
-              </a14:hiddenLine>
-            </a:ext>
-          </a:extLst>
-        </p:spPr>
-      </p:pic>
-      <mc:AlternateContent xmlns:mc="http://schemas.openxmlformats.org/markup-compatibility/2006" xmlns:a14="http://schemas.microsoft.com/office/drawing/2010/main">
-        <mc:Choice Requires="a14">
+      <mc:AlternateContent xmlns:mc="http://schemas.openxmlformats.org/markup-compatibility/2006">
+        <mc:Choice xmlns:a14="http://schemas.microsoft.com/office/drawing/2010/main" Requires="a14">
           <p:sp>
             <p:nvSpPr>
               <p:cNvPr id="3" name="2 CuadroTexto"/>
@@ -8682,8 +10999,8 @@
             </p:nvSpPr>
             <p:spPr>
               <a:xfrm>
-                <a:off x="5580112" y="1268760"/>
-                <a:ext cx="2232248" cy="954107"/>
+                <a:off x="5556200" y="764704"/>
+                <a:ext cx="2232248" cy="1323439"/>
               </a:xfrm>
               <a:prstGeom prst="rect">
                 <a:avLst/>
@@ -8698,7 +11015,7 @@
               <a:p>
                 <a:pPr algn="ctr"/>
                 <a:r>
-                  <a:rPr lang="es-AR" sz="1400" dirty="0" smtClean="0"/>
+                  <a:rPr lang="es-AR" sz="1600" dirty="0" smtClean="0"/>
                   <a:t>Todos los extremos para </a:t>
                 </a:r>
                 <a14:m>
@@ -8707,13 +11024,13 @@
                       <m:rPr>
                         <m:sty m:val="p"/>
                       </m:rPr>
-                      <a:rPr lang="es-AR" sz="1400" b="0" i="0" smtClean="0">
+                      <a:rPr lang="es-AR" sz="1600" b="0" i="0" smtClean="0">
                         <a:latin typeface="Cambria Math"/>
                       </a:rPr>
                       <m:t>los</m:t>
                     </m:r>
                     <m:r>
-                      <a:rPr lang="es-AR" sz="1400" b="0" i="0" smtClean="0">
+                      <a:rPr lang="es-AR" sz="1600" b="0" i="0" smtClean="0">
                         <a:latin typeface="Cambria Math"/>
                       </a:rPr>
                       <m:t> </m:t>
@@ -8722,13 +11039,13 @@
                       <m:rPr>
                         <m:sty m:val="p"/>
                       </m:rPr>
-                      <a:rPr lang="es-AR" sz="1400" b="0" i="0" smtClean="0">
+                      <a:rPr lang="es-AR" sz="1600" b="0" i="0" smtClean="0">
                         <a:latin typeface="Cambria Math"/>
                       </a:rPr>
                       <m:t>distintos</m:t>
                     </m:r>
                     <m:r>
-                      <a:rPr lang="es-AR" sz="1400" b="0" i="0" smtClean="0">
+                      <a:rPr lang="es-AR" sz="1600" b="0" i="0" smtClean="0">
                         <a:latin typeface="Cambria Math"/>
                       </a:rPr>
                       <m:t> </m:t>
@@ -8736,14 +11053,14 @@
                     <m:sSub>
                       <m:sSubPr>
                         <m:ctrlPr>
-                          <a:rPr lang="es-AR" sz="1400" i="1" smtClean="0">
+                          <a:rPr lang="es-AR" sz="1600" i="1" smtClean="0">
                             <a:latin typeface="Cambria Math"/>
                           </a:rPr>
                         </m:ctrlPr>
                       </m:sSubPr>
                       <m:e>
                         <m:r>
-                          <a:rPr lang="es-AR" sz="1400" b="0" i="1" smtClean="0">
+                          <a:rPr lang="es-AR" sz="1600" b="0" i="1" smtClean="0">
                             <a:latin typeface="Cambria Math"/>
                           </a:rPr>
                           <m:t>𝑓</m:t>
@@ -8751,7 +11068,7 @@
                       </m:e>
                       <m:sub>
                         <m:r>
-                          <a:rPr lang="es-AR" sz="1400" b="0" i="1" smtClean="0">
+                          <a:rPr lang="es-AR" sz="1600" b="0" i="1" smtClean="0">
                             <a:latin typeface="Cambria Math"/>
                           </a:rPr>
                           <m:t>0</m:t>
@@ -8759,7 +11076,7 @@
                       </m:sub>
                     </m:sSub>
                     <m:r>
-                      <a:rPr lang="es-AR" sz="1400" b="0" i="0" smtClean="0">
+                      <a:rPr lang="es-AR" sz="1600" b="0" i="0" smtClean="0">
                         <a:latin typeface="Cambria Math"/>
                       </a:rPr>
                       <m:t>,</m:t>
@@ -8767,11 +11084,11 @@
                   </m:oMath>
                 </a14:m>
                 <a:r>
-                  <a:rPr lang="es-AR" sz="1400" dirty="0" smtClean="0"/>
+                  <a:rPr lang="es-AR" sz="1600" dirty="0" smtClean="0"/>
                   <a:t> de la señal cuadrada, se encontraron en</a:t>
                 </a:r>
                 <a:r>
-                  <a:rPr lang="es-AR" sz="1400" dirty="0"/>
+                  <a:rPr lang="es-AR" sz="1600" dirty="0"/>
                   <a:t> </a:t>
                 </a:r>
                 <a14:m>
@@ -8779,14 +11096,14 @@
                     <m:sSub>
                       <m:sSubPr>
                         <m:ctrlPr>
-                          <a:rPr lang="es-AR" sz="1400" i="1">
+                          <a:rPr lang="es-AR" sz="1600" i="1">
                             <a:latin typeface="Cambria Math"/>
                           </a:rPr>
                         </m:ctrlPr>
                       </m:sSubPr>
                       <m:e>
                         <m:r>
-                          <a:rPr lang="es-AR" sz="1400" i="1">
+                          <a:rPr lang="es-AR" sz="1600" i="1">
                             <a:latin typeface="Cambria Math"/>
                           </a:rPr>
                           <m:t>𝑓</m:t>
@@ -8794,7 +11111,7 @@
                       </m:e>
                       <m:sub>
                         <m:r>
-                          <a:rPr lang="es-AR" sz="1400" b="0" i="1" smtClean="0">
+                          <a:rPr lang="es-AR" sz="1600" b="0" i="1" smtClean="0">
                             <a:latin typeface="Cambria Math"/>
                           </a:rPr>
                           <m:t>𝑠</m:t>
@@ -8802,7 +11119,7 @@
                       </m:sub>
                     </m:sSub>
                     <m:r>
-                      <a:rPr lang="es-AR" sz="1400" b="0" i="1" smtClean="0">
+                      <a:rPr lang="es-AR" sz="1600" b="0" i="1" smtClean="0">
                         <a:latin typeface="Cambria Math"/>
                       </a:rPr>
                       <m:t>=(500,00 ±0,05)</m:t>
@@ -8810,15 +11127,15 @@
                   </m:oMath>
                 </a14:m>
                 <a:r>
-                  <a:rPr lang="es-AR" sz="1400" dirty="0" smtClean="0"/>
+                  <a:rPr lang="es-AR" sz="1600" dirty="0" smtClean="0"/>
                   <a:t> </a:t>
                 </a:r>
-                <a:endParaRPr lang="es-AR" sz="1400" dirty="0"/>
+                <a:endParaRPr lang="es-AR" sz="1600" dirty="0"/>
               </a:p>
             </p:txBody>
           </p:sp>
         </mc:Choice>
-        <mc:Fallback xmlns="">
+        <mc:Fallback>
           <p:sp>
             <p:nvSpPr>
               <p:cNvPr id="3" name="2 CuadroTexto"/>
@@ -8829,16 +11146,16 @@
             </p:nvSpPr>
             <p:spPr>
               <a:xfrm>
-                <a:off x="5580112" y="1268760"/>
-                <a:ext cx="2232248" cy="954107"/>
+                <a:off x="5556200" y="764704"/>
+                <a:ext cx="2232248" cy="1323439"/>
               </a:xfrm>
               <a:prstGeom prst="rect">
                 <a:avLst/>
               </a:prstGeom>
               <a:blipFill rotWithShape="1">
-                <a:blip r:embed="rId4"/>
+                <a:blip r:embed="rId3"/>
                 <a:stretch>
-                  <a:fillRect t="-637" r="-817" b="-5096"/>
+                  <a:fillRect l="-272" t="-1376" r="-2180" b="-1376"/>
                 </a:stretch>
               </a:blipFill>
             </p:spPr>
@@ -8847,7 +11164,7 @@
               <a:lstStyle/>
               <a:p>
                 <a:r>
-                  <a:rPr lang="es-AR">
+                  <a:rPr lang="es-ES">
                     <a:noFill/>
                   </a:rPr>
                   <a:t> </a:t>
@@ -8857,6 +11174,373 @@
           </p:sp>
         </mc:Fallback>
       </mc:AlternateContent>
+      <p:graphicFrame>
+        <p:nvGraphicFramePr>
+          <p:cNvPr id="2" name="1 Tabla"/>
+          <p:cNvGraphicFramePr>
+            <a:graphicFrameLocks noGrp="1"/>
+          </p:cNvGraphicFramePr>
+          <p:nvPr>
+            <p:extLst>
+              <p:ext uri="{D42A27DB-BD31-4B8C-83A1-F6EECF244321}">
+                <p14:modId xmlns:p14="http://schemas.microsoft.com/office/powerpoint/2010/main" val="2381683435"/>
+              </p:ext>
+            </p:extLst>
+          </p:nvPr>
+        </p:nvGraphicFramePr>
+        <p:xfrm>
+          <a:off x="2987824" y="3861048"/>
+          <a:ext cx="4320480" cy="2489334"/>
+        </p:xfrm>
+        <a:graphic>
+          <a:graphicData uri="http://schemas.openxmlformats.org/drawingml/2006/table">
+            <a:tbl>
+              <a:tblPr firstRow="1" bandRow="1">
+                <a:tableStyleId>{9D7B26C5-4107-4FEC-AEDC-1716B250A1EF}</a:tableStyleId>
+              </a:tblPr>
+              <a:tblGrid>
+                <a:gridCol w="1319808"/>
+                <a:gridCol w="3000672"/>
+              </a:tblGrid>
+              <a:tr h="360426">
+                <a:tc>
+                  <a:txBody>
+                    <a:bodyPr/>
+                    <a:lstStyle/>
+                    <a:p>
+                      <a:r>
+                        <a:rPr lang="es-ES" dirty="0" smtClean="0"/>
+                        <a:t>Armónico</a:t>
+                      </a:r>
+                      <a:endParaRPr lang="es-ES" dirty="0"/>
+                    </a:p>
+                  </a:txBody>
+                  <a:tcPr/>
+                </a:tc>
+                <a:tc>
+                  <a:txBody>
+                    <a:bodyPr/>
+                    <a:lstStyle/>
+                    <a:p>
+                      <a:r>
+                        <a:rPr lang="es-ES" i="1" baseline="0" dirty="0" smtClean="0"/>
+                        <a:t>f </a:t>
+                      </a:r>
+                      <a:r>
+                        <a:rPr lang="es-ES" i="0" baseline="0" dirty="0" smtClean="0"/>
+                        <a:t>de máxima </a:t>
+                      </a:r>
+                      <a:r>
+                        <a:rPr lang="es-ES" i="0" baseline="0" dirty="0" err="1" smtClean="0"/>
+                        <a:t>transmision</a:t>
+                      </a:r>
+                      <a:r>
+                        <a:rPr lang="es-ES" i="0" baseline="0" dirty="0" smtClean="0"/>
+                        <a:t> (HZ)</a:t>
+                      </a:r>
+                      <a:r>
+                        <a:rPr lang="es-ES" i="1" baseline="0" dirty="0" smtClean="0"/>
+                        <a:t> </a:t>
+                      </a:r>
+                      <a:endParaRPr lang="es-ES" i="1" dirty="0"/>
+                    </a:p>
+                  </a:txBody>
+                  <a:tcPr/>
+                </a:tc>
+              </a:tr>
+              <a:tr h="353929">
+                <a:tc>
+                  <a:txBody>
+                    <a:bodyPr/>
+                    <a:lstStyle/>
+                    <a:p>
+                      <a:pPr algn="ctr"/>
+                      <a:r>
+                        <a:rPr lang="es-ES" sz="1600" dirty="0" smtClean="0"/>
+                        <a:t>1</a:t>
+                      </a:r>
+                      <a:endParaRPr lang="es-ES" sz="1600" dirty="0"/>
+                    </a:p>
+                  </a:txBody>
+                  <a:tcPr/>
+                </a:tc>
+                <a:tc>
+                  <a:txBody>
+                    <a:bodyPr/>
+                    <a:lstStyle/>
+                    <a:p>
+                      <a:pPr algn="ctr"/>
+                      <a:r>
+                        <a:rPr lang="es-ES" sz="1600" dirty="0" smtClean="0"/>
+                        <a:t>500,00</a:t>
+                      </a:r>
+                      <a:r>
+                        <a:rPr lang="es-ES" sz="1600" baseline="0" dirty="0" smtClean="0"/>
+                        <a:t> </a:t>
+                      </a:r>
+                      <a:r>
+                        <a:rPr lang="es-ES" sz="1600" dirty="0" smtClean="0"/>
+                        <a:t>± 0,05</a:t>
+                      </a:r>
+                      <a:endParaRPr lang="es-ES" sz="1600" dirty="0"/>
+                    </a:p>
+                  </a:txBody>
+                  <a:tcPr/>
+                </a:tc>
+              </a:tr>
+              <a:tr h="353929">
+                <a:tc>
+                  <a:txBody>
+                    <a:bodyPr/>
+                    <a:lstStyle/>
+                    <a:p>
+                      <a:pPr algn="ctr"/>
+                      <a:r>
+                        <a:rPr lang="es-ES" sz="1600" dirty="0" smtClean="0"/>
+                        <a:t>2</a:t>
+                      </a:r>
+                      <a:endParaRPr lang="es-ES" sz="1600" dirty="0"/>
+                    </a:p>
+                  </a:txBody>
+                  <a:tcPr/>
+                </a:tc>
+                <a:tc>
+                  <a:txBody>
+                    <a:bodyPr/>
+                    <a:lstStyle/>
+                    <a:p>
+                      <a:pPr algn="ctr"/>
+                      <a:r>
+                        <a:rPr lang="es-ES" sz="1600" dirty="0" smtClean="0"/>
+                        <a:t>500,00</a:t>
+                      </a:r>
+                      <a:r>
+                        <a:rPr lang="es-ES" sz="1600" baseline="0" dirty="0" smtClean="0"/>
+                        <a:t> </a:t>
+                      </a:r>
+                      <a:r>
+                        <a:rPr lang="es-ES" sz="1600" dirty="0" smtClean="0"/>
+                        <a:t>± 0,05</a:t>
+                      </a:r>
+                      <a:endParaRPr lang="es-ES" sz="1600" dirty="0"/>
+                    </a:p>
+                  </a:txBody>
+                  <a:tcPr/>
+                </a:tc>
+              </a:tr>
+              <a:tr h="353929">
+                <a:tc>
+                  <a:txBody>
+                    <a:bodyPr/>
+                    <a:lstStyle/>
+                    <a:p>
+                      <a:pPr algn="ctr"/>
+                      <a:r>
+                        <a:rPr lang="es-ES" sz="1600" dirty="0" smtClean="0"/>
+                        <a:t>3</a:t>
+                      </a:r>
+                      <a:endParaRPr lang="es-ES" sz="1600" dirty="0"/>
+                    </a:p>
+                  </a:txBody>
+                  <a:tcPr/>
+                </a:tc>
+                <a:tc>
+                  <a:txBody>
+                    <a:bodyPr/>
+                    <a:lstStyle/>
+                    <a:p>
+                      <a:pPr algn="ctr"/>
+                      <a:r>
+                        <a:rPr lang="es-ES" sz="1600" dirty="0" smtClean="0"/>
+                        <a:t>480,00 ± 0,05</a:t>
+                      </a:r>
+                      <a:endParaRPr lang="es-ES" sz="1600" dirty="0"/>
+                    </a:p>
+                  </a:txBody>
+                  <a:tcPr/>
+                </a:tc>
+              </a:tr>
+              <a:tr h="353929">
+                <a:tc>
+                  <a:txBody>
+                    <a:bodyPr/>
+                    <a:lstStyle/>
+                    <a:p>
+                      <a:pPr algn="ctr"/>
+                      <a:r>
+                        <a:rPr lang="es-ES" sz="1600" dirty="0" smtClean="0"/>
+                        <a:t>4</a:t>
+                      </a:r>
+                      <a:endParaRPr lang="es-ES" sz="1600" dirty="0"/>
+                    </a:p>
+                  </a:txBody>
+                  <a:tcPr/>
+                </a:tc>
+                <a:tc>
+                  <a:txBody>
+                    <a:bodyPr/>
+                    <a:lstStyle/>
+                    <a:p>
+                      <a:pPr algn="ctr"/>
+                      <a:r>
+                        <a:rPr lang="es-ES" sz="1600" dirty="0" smtClean="0"/>
+                        <a:t>480,00 ± 0,05</a:t>
+                      </a:r>
+                      <a:endParaRPr lang="es-ES" sz="1600" dirty="0"/>
+                    </a:p>
+                  </a:txBody>
+                  <a:tcPr/>
+                </a:tc>
+              </a:tr>
+              <a:tr h="353929">
+                <a:tc>
+                  <a:txBody>
+                    <a:bodyPr/>
+                    <a:lstStyle/>
+                    <a:p>
+                      <a:pPr algn="ctr"/>
+                      <a:r>
+                        <a:rPr lang="es-ES" sz="1600" dirty="0" smtClean="0"/>
+                        <a:t>5</a:t>
+                      </a:r>
+                      <a:endParaRPr lang="es-ES" sz="1600" dirty="0"/>
+                    </a:p>
+                  </a:txBody>
+                  <a:tcPr/>
+                </a:tc>
+                <a:tc>
+                  <a:txBody>
+                    <a:bodyPr/>
+                    <a:lstStyle/>
+                    <a:p>
+                      <a:pPr algn="ctr"/>
+                      <a:r>
+                        <a:rPr lang="es-ES" sz="1600" dirty="0" smtClean="0"/>
+                        <a:t>500,00</a:t>
+                      </a:r>
+                      <a:r>
+                        <a:rPr lang="es-ES" sz="1600" baseline="0" dirty="0" smtClean="0"/>
+                        <a:t> </a:t>
+                      </a:r>
+                      <a:r>
+                        <a:rPr lang="es-ES" sz="1600" dirty="0" smtClean="0"/>
+                        <a:t>± 0,05</a:t>
+                      </a:r>
+                      <a:endParaRPr lang="es-ES" sz="1600" dirty="0"/>
+                    </a:p>
+                  </a:txBody>
+                  <a:tcPr/>
+                </a:tc>
+              </a:tr>
+              <a:tr h="353929">
+                <a:tc>
+                  <a:txBody>
+                    <a:bodyPr/>
+                    <a:lstStyle/>
+                    <a:p>
+                      <a:pPr algn="ctr"/>
+                      <a:r>
+                        <a:rPr lang="es-ES" sz="1600" dirty="0" smtClean="0"/>
+                        <a:t>6</a:t>
+                      </a:r>
+                      <a:endParaRPr lang="es-ES" sz="1600" dirty="0"/>
+                    </a:p>
+                  </a:txBody>
+                  <a:tcPr/>
+                </a:tc>
+                <a:tc>
+                  <a:txBody>
+                    <a:bodyPr/>
+                    <a:lstStyle/>
+                    <a:p>
+                      <a:pPr algn="ctr"/>
+                      <a:r>
+                        <a:rPr lang="es-ES" sz="1600" dirty="0" smtClean="0"/>
+                        <a:t>480,00 </a:t>
+                      </a:r>
+                      <a:r>
+                        <a:rPr lang="es-ES" sz="1600" dirty="0" smtClean="0"/>
+                        <a:t>± 0,05</a:t>
+                      </a:r>
+                      <a:endParaRPr lang="es-ES" sz="1600" dirty="0"/>
+                    </a:p>
+                  </a:txBody>
+                  <a:tcPr/>
+                </a:tc>
+              </a:tr>
+            </a:tbl>
+          </a:graphicData>
+        </a:graphic>
+      </p:graphicFrame>
+      <p:sp>
+        <p:nvSpPr>
+          <p:cNvPr id="4" name="3 CuadroTexto"/>
+          <p:cNvSpPr txBox="1"/>
+          <p:nvPr/>
+        </p:nvSpPr>
+        <p:spPr>
+          <a:xfrm>
+            <a:off x="179512" y="3299992"/>
+            <a:ext cx="4536504" cy="584775"/>
+          </a:xfrm>
+          <a:prstGeom prst="rect">
+            <a:avLst/>
+          </a:prstGeom>
+          <a:noFill/>
+        </p:spPr>
+        <p:txBody>
+          <a:bodyPr wrap="square" rtlCol="0">
+            <a:spAutoFit/>
+          </a:bodyPr>
+          <a:lstStyle/>
+          <a:p>
+            <a:pPr algn="ctr"/>
+            <a:r>
+              <a:rPr lang="es-ES" sz="1600" dirty="0" smtClean="0"/>
+              <a:t>Ejemplo de transmisión vs </a:t>
+            </a:r>
+            <a:r>
+              <a:rPr lang="es-ES" sz="1600" i="1" dirty="0" smtClean="0"/>
+              <a:t>f </a:t>
+            </a:r>
+            <a:r>
+              <a:rPr lang="es-ES" sz="1600" dirty="0" smtClean="0"/>
+              <a:t>; 1º armónico de la señal cuadrada</a:t>
+            </a:r>
+            <a:endParaRPr lang="es-ES" sz="1600" dirty="0"/>
+          </a:p>
+        </p:txBody>
+      </p:sp>
+      <p:sp>
+        <p:nvSpPr>
+          <p:cNvPr id="5" name="4 CuadroTexto"/>
+          <p:cNvSpPr txBox="1"/>
+          <p:nvPr/>
+        </p:nvSpPr>
+        <p:spPr>
+          <a:xfrm>
+            <a:off x="2051720" y="6340678"/>
+            <a:ext cx="6682420" cy="338554"/>
+          </a:xfrm>
+          <a:prstGeom prst="rect">
+            <a:avLst/>
+          </a:prstGeom>
+          <a:noFill/>
+        </p:spPr>
+        <p:txBody>
+          <a:bodyPr wrap="square" rtlCol="0">
+            <a:spAutoFit/>
+          </a:bodyPr>
+          <a:lstStyle/>
+          <a:p>
+            <a:r>
+              <a:rPr lang="es-ES" sz="1600" dirty="0" smtClean="0"/>
+              <a:t>Frecuencia de máxima transmisión para los armónicos en la señal parabólica</a:t>
+            </a:r>
+            <a:endParaRPr lang="es-ES" sz="1600" dirty="0"/>
+          </a:p>
+        </p:txBody>
+      </p:sp>
     </p:spTree>
     <p:extLst>
       <p:ext uri="{BB962C8B-B14F-4D97-AF65-F5344CB8AC3E}">
@@ -8994,6 +11678,565 @@
           </a:extLst>
         </p:spPr>
       </p:pic>
+      <p:cxnSp>
+        <p:nvCxnSpPr>
+          <p:cNvPr id="4" name="3 Conector recto de flecha"/>
+          <p:cNvCxnSpPr/>
+          <p:nvPr/>
+        </p:nvCxnSpPr>
+        <p:spPr>
+          <a:xfrm flipH="1">
+            <a:off x="4572000" y="980728"/>
+            <a:ext cx="504056" cy="0"/>
+          </a:xfrm>
+          <a:prstGeom prst="straightConnector1">
+            <a:avLst/>
+          </a:prstGeom>
+          <a:ln w="19050">
+            <a:solidFill>
+              <a:schemeClr val="tx1"/>
+            </a:solidFill>
+            <a:tailEnd type="arrow"/>
+          </a:ln>
+        </p:spPr>
+        <p:style>
+          <a:lnRef idx="1">
+            <a:schemeClr val="accent1"/>
+          </a:lnRef>
+          <a:fillRef idx="0">
+            <a:schemeClr val="accent1"/>
+          </a:fillRef>
+          <a:effectRef idx="0">
+            <a:schemeClr val="accent1"/>
+          </a:effectRef>
+          <a:fontRef idx="minor">
+            <a:schemeClr val="tx1"/>
+          </a:fontRef>
+        </p:style>
+      </p:cxnSp>
+      <p:cxnSp>
+        <p:nvCxnSpPr>
+          <p:cNvPr id="8" name="7 Conector recto de flecha"/>
+          <p:cNvCxnSpPr/>
+          <p:nvPr/>
+        </p:nvCxnSpPr>
+        <p:spPr>
+          <a:xfrm>
+            <a:off x="3830920" y="4293096"/>
+            <a:ext cx="530448" cy="0"/>
+          </a:xfrm>
+          <a:prstGeom prst="straightConnector1">
+            <a:avLst/>
+          </a:prstGeom>
+          <a:ln w="19050">
+            <a:solidFill>
+              <a:schemeClr val="tx1"/>
+            </a:solidFill>
+            <a:tailEnd type="arrow"/>
+          </a:ln>
+        </p:spPr>
+        <p:style>
+          <a:lnRef idx="1">
+            <a:schemeClr val="accent1"/>
+          </a:lnRef>
+          <a:fillRef idx="0">
+            <a:schemeClr val="accent1"/>
+          </a:fillRef>
+          <a:effectRef idx="0">
+            <a:schemeClr val="accent1"/>
+          </a:effectRef>
+          <a:fontRef idx="minor">
+            <a:schemeClr val="tx1"/>
+          </a:fontRef>
+        </p:style>
+      </p:cxnSp>
+      <p:grpSp>
+        <p:nvGrpSpPr>
+          <p:cNvPr id="9" name="8 Grupo"/>
+          <p:cNvGrpSpPr/>
+          <p:nvPr/>
+        </p:nvGrpSpPr>
+        <p:grpSpPr>
+          <a:xfrm>
+            <a:off x="5189543" y="476672"/>
+            <a:ext cx="3528392" cy="2362381"/>
+            <a:chOff x="5189543" y="476672"/>
+            <a:chExt cx="3528392" cy="2362381"/>
+          </a:xfrm>
+        </p:grpSpPr>
+        <p:sp>
+          <p:nvSpPr>
+            <p:cNvPr id="2" name="1 Rectángulo"/>
+            <p:cNvSpPr/>
+            <p:nvPr/>
+          </p:nvSpPr>
+          <p:spPr>
+            <a:xfrm>
+              <a:off x="5189543" y="476672"/>
+              <a:ext cx="3528392" cy="2304256"/>
+            </a:xfrm>
+            <a:prstGeom prst="rect">
+              <a:avLst/>
+            </a:prstGeom>
+            <a:noFill/>
+            <a:ln>
+              <a:solidFill>
+                <a:schemeClr val="tx1"/>
+              </a:solidFill>
+            </a:ln>
+          </p:spPr>
+          <p:style>
+            <a:lnRef idx="2">
+              <a:schemeClr val="accent1">
+                <a:shade val="50000"/>
+              </a:schemeClr>
+            </a:lnRef>
+            <a:fillRef idx="1">
+              <a:schemeClr val="accent1"/>
+            </a:fillRef>
+            <a:effectRef idx="0">
+              <a:schemeClr val="accent1"/>
+            </a:effectRef>
+            <a:fontRef idx="minor">
+              <a:schemeClr val="lt1"/>
+            </a:fontRef>
+          </p:style>
+          <p:txBody>
+            <a:bodyPr rtlCol="0" anchor="ctr"/>
+            <a:lstStyle/>
+            <a:p>
+              <a:pPr algn="ctr"/>
+              <a:endParaRPr lang="es-ES"/>
+            </a:p>
+          </p:txBody>
+        </p:sp>
+        <mc:AlternateContent xmlns:mc="http://schemas.openxmlformats.org/markup-compatibility/2006">
+          <mc:Choice xmlns:a14="http://schemas.microsoft.com/office/drawing/2010/main" Requires="a14">
+            <p:sp>
+              <p:nvSpPr>
+                <p:cNvPr id="7" name="6 CuadroTexto"/>
+                <p:cNvSpPr txBox="1"/>
+                <p:nvPr/>
+              </p:nvSpPr>
+              <p:spPr>
+                <a:xfrm>
+                  <a:off x="5436096" y="692696"/>
+                  <a:ext cx="2880320" cy="2146357"/>
+                </a:xfrm>
+                <a:prstGeom prst="rect">
+                  <a:avLst/>
+                </a:prstGeom>
+                <a:noFill/>
+              </p:spPr>
+              <p:txBody>
+                <a:bodyPr wrap="square" rtlCol="0">
+                  <a:spAutoFit/>
+                </a:bodyPr>
+                <a:lstStyle/>
+                <a:p>
+                  <a:r>
+                    <a:rPr lang="es-ES" dirty="0" smtClean="0"/>
+                    <a:t>Señal cuadrada :</a:t>
+                  </a:r>
+                </a:p>
+                <a:p>
+                  <a:r>
+                    <a:rPr lang="es-ES" dirty="0" smtClean="0"/>
+                    <a:t>Transmisión vs Armónico</a:t>
+                  </a:r>
+                </a:p>
+                <a:p>
+                  <a:r>
+                    <a:rPr lang="es-ES" dirty="0" smtClean="0"/>
+                    <a:t> </a:t>
+                  </a:r>
+                  <a:endParaRPr lang="es-ES" dirty="0"/>
+                </a:p>
+                <a:p>
+                  <a:pPr algn="ctr"/>
+                  <a:r>
+                    <a:rPr lang="es-ES" dirty="0" smtClean="0"/>
+                    <a:t>A=(0,91 ± 0,09)</a:t>
+                  </a:r>
+                </a:p>
+                <a:p>
+                  <a:pPr algn="ctr"/>
+                  <a14:m>
+                    <m:oMath xmlns:m="http://schemas.openxmlformats.org/officeDocument/2006/math">
+                      <m:sSub>
+                        <m:sSubPr>
+                          <m:ctrlPr>
+                            <a:rPr lang="es-ES" b="0" i="1" smtClean="0">
+                              <a:latin typeface="Cambria Math"/>
+                            </a:rPr>
+                          </m:ctrlPr>
+                        </m:sSubPr>
+                        <m:e>
+                          <m:r>
+                            <a:rPr lang="es-ES" b="0" i="1" smtClean="0">
+                              <a:latin typeface="Cambria Math"/>
+                            </a:rPr>
+                            <m:t>𝑇</m:t>
+                          </m:r>
+                        </m:e>
+                        <m:sub>
+                          <m:r>
+                            <a:rPr lang="es-ES" b="0" i="1" smtClean="0">
+                              <a:latin typeface="Cambria Math"/>
+                            </a:rPr>
+                            <m:t>𝑚𝑎𝑥</m:t>
+                          </m:r>
+                        </m:sub>
+                      </m:sSub>
+                      <m:f>
+                        <m:fPr>
+                          <m:ctrlPr>
+                            <a:rPr lang="es-ES" b="0" i="1" smtClean="0">
+                              <a:latin typeface="Cambria Math"/>
+                            </a:rPr>
+                          </m:ctrlPr>
+                        </m:fPr>
+                        <m:num>
+                          <m:r>
+                            <a:rPr lang="es-ES" b="0" i="1" smtClean="0">
+                              <a:latin typeface="Cambria Math"/>
+                            </a:rPr>
+                            <m:t>4</m:t>
+                          </m:r>
+                        </m:num>
+                        <m:den>
+                          <m:r>
+                            <a:rPr lang="es-ES" b="0" i="1" smtClean="0">
+                              <a:latin typeface="Cambria Math"/>
+                            </a:rPr>
+                            <m:t>𝜋</m:t>
+                          </m:r>
+                        </m:den>
+                      </m:f>
+                    </m:oMath>
+                  </a14:m>
+                  <a:r>
+                    <a:rPr lang="es-ES" b="0" dirty="0" smtClean="0"/>
+                    <a:t>=(0,962</a:t>
+                  </a:r>
+                  <a:r>
+                    <a:rPr lang="es-ES" dirty="0"/>
+                    <a:t> </a:t>
+                  </a:r>
+                  <a:r>
+                    <a:rPr lang="es-ES" dirty="0" smtClean="0"/>
+                    <a:t>±0,004)</a:t>
+                  </a:r>
+                  <a:r>
+                    <a:rPr lang="es-ES" b="0" dirty="0" smtClean="0"/>
+                    <a:t>    </a:t>
+                  </a:r>
+                </a:p>
+                <a:p>
+                  <a:pPr algn="ctr"/>
+                  <a:endParaRPr lang="es-ES" b="0" dirty="0" smtClean="0"/>
+                </a:p>
+                <a:p>
+                  <a:r>
+                    <a:rPr lang="es-ES" dirty="0" smtClean="0"/>
+                    <a:t> </a:t>
+                  </a:r>
+                  <a:endParaRPr lang="es-ES" dirty="0"/>
+                </a:p>
+              </p:txBody>
+            </p:sp>
+          </mc:Choice>
+          <mc:Fallback>
+            <p:sp>
+              <p:nvSpPr>
+                <p:cNvPr id="7" name="6 CuadroTexto"/>
+                <p:cNvSpPr txBox="1">
+                  <a:spLocks noRot="1" noChangeAspect="1" noMove="1" noResize="1" noEditPoints="1" noAdjustHandles="1" noChangeArrowheads="1" noChangeShapeType="1" noTextEdit="1"/>
+                </p:cNvSpPr>
+                <p:nvPr/>
+              </p:nvSpPr>
+              <p:spPr>
+                <a:xfrm>
+                  <a:off x="5436096" y="692696"/>
+                  <a:ext cx="2880320" cy="2146357"/>
+                </a:xfrm>
+                <a:prstGeom prst="rect">
+                  <a:avLst/>
+                </a:prstGeom>
+                <a:blipFill rotWithShape="1">
+                  <a:blip r:embed="rId4"/>
+                  <a:stretch>
+                    <a:fillRect l="-1907" t="-1420"/>
+                  </a:stretch>
+                </a:blipFill>
+              </p:spPr>
+              <p:txBody>
+                <a:bodyPr/>
+                <a:lstStyle/>
+                <a:p>
+                  <a:r>
+                    <a:rPr lang="es-ES">
+                      <a:noFill/>
+                    </a:rPr>
+                    <a:t> </a:t>
+                  </a:r>
+                </a:p>
+              </p:txBody>
+            </p:sp>
+          </mc:Fallback>
+        </mc:AlternateContent>
+      </p:grpSp>
+      <p:grpSp>
+        <p:nvGrpSpPr>
+          <p:cNvPr id="14" name="13 Grupo"/>
+          <p:cNvGrpSpPr/>
+          <p:nvPr/>
+        </p:nvGrpSpPr>
+        <p:grpSpPr>
+          <a:xfrm>
+            <a:off x="302528" y="3899825"/>
+            <a:ext cx="3528392" cy="2362381"/>
+            <a:chOff x="5189543" y="476672"/>
+            <a:chExt cx="3528392" cy="2362381"/>
+          </a:xfrm>
+        </p:grpSpPr>
+        <p:sp>
+          <p:nvSpPr>
+            <p:cNvPr id="15" name="14 Rectángulo"/>
+            <p:cNvSpPr/>
+            <p:nvPr/>
+          </p:nvSpPr>
+          <p:spPr>
+            <a:xfrm>
+              <a:off x="5189543" y="476672"/>
+              <a:ext cx="3528392" cy="2304256"/>
+            </a:xfrm>
+            <a:prstGeom prst="rect">
+              <a:avLst/>
+            </a:prstGeom>
+            <a:noFill/>
+            <a:ln>
+              <a:solidFill>
+                <a:schemeClr val="tx1"/>
+              </a:solidFill>
+            </a:ln>
+          </p:spPr>
+          <p:style>
+            <a:lnRef idx="2">
+              <a:schemeClr val="accent1">
+                <a:shade val="50000"/>
+              </a:schemeClr>
+            </a:lnRef>
+            <a:fillRef idx="1">
+              <a:schemeClr val="accent1"/>
+            </a:fillRef>
+            <a:effectRef idx="0">
+              <a:schemeClr val="accent1"/>
+            </a:effectRef>
+            <a:fontRef idx="minor">
+              <a:schemeClr val="lt1"/>
+            </a:fontRef>
+          </p:style>
+          <p:txBody>
+            <a:bodyPr rtlCol="0" anchor="ctr"/>
+            <a:lstStyle/>
+            <a:p>
+              <a:pPr algn="ctr"/>
+              <a:endParaRPr lang="es-ES"/>
+            </a:p>
+          </p:txBody>
+        </p:sp>
+        <mc:AlternateContent xmlns:mc="http://schemas.openxmlformats.org/markup-compatibility/2006">
+          <mc:Choice xmlns:a14="http://schemas.microsoft.com/office/drawing/2010/main" Requires="a14">
+            <p:sp>
+              <p:nvSpPr>
+                <p:cNvPr id="16" name="15 CuadroTexto"/>
+                <p:cNvSpPr txBox="1"/>
+                <p:nvPr/>
+              </p:nvSpPr>
+              <p:spPr>
+                <a:xfrm>
+                  <a:off x="5436096" y="692696"/>
+                  <a:ext cx="2880320" cy="2146357"/>
+                </a:xfrm>
+                <a:prstGeom prst="rect">
+                  <a:avLst/>
+                </a:prstGeom>
+                <a:noFill/>
+              </p:spPr>
+              <p:txBody>
+                <a:bodyPr wrap="square" rtlCol="0">
+                  <a:spAutoFit/>
+                </a:bodyPr>
+                <a:lstStyle/>
+                <a:p>
+                  <a:r>
+                    <a:rPr lang="es-ES" dirty="0" smtClean="0"/>
+                    <a:t>Señal parabólica :</a:t>
+                  </a:r>
+                </a:p>
+                <a:p>
+                  <a:r>
+                    <a:rPr lang="es-ES" dirty="0" smtClean="0"/>
+                    <a:t>Transmisión vs Armónico</a:t>
+                  </a:r>
+                </a:p>
+                <a:p>
+                  <a:r>
+                    <a:rPr lang="es-ES" dirty="0" smtClean="0"/>
+                    <a:t> </a:t>
+                  </a:r>
+                  <a:endParaRPr lang="es-ES" dirty="0"/>
+                </a:p>
+                <a:p>
+                  <a:pPr algn="ctr"/>
+                  <a:r>
+                    <a:rPr lang="es-ES" dirty="0" smtClean="0"/>
+                    <a:t>A=(0,44 ± 0,07)</a:t>
+                  </a:r>
+                </a:p>
+                <a:p>
+                  <a:pPr algn="ctr"/>
+                  <a14:m>
+                    <m:oMath xmlns:m="http://schemas.openxmlformats.org/officeDocument/2006/math">
+                      <m:sSub>
+                        <m:sSubPr>
+                          <m:ctrlPr>
+                            <a:rPr lang="es-ES" b="0" i="1" smtClean="0">
+                              <a:latin typeface="Cambria Math"/>
+                            </a:rPr>
+                          </m:ctrlPr>
+                        </m:sSubPr>
+                        <m:e>
+                          <m:r>
+                            <a:rPr lang="es-ES" b="0" i="1" smtClean="0">
+                              <a:latin typeface="Cambria Math"/>
+                            </a:rPr>
+                            <m:t>𝑇</m:t>
+                          </m:r>
+                        </m:e>
+                        <m:sub>
+                          <m:r>
+                            <a:rPr lang="es-ES" b="0" i="1" smtClean="0">
+                              <a:latin typeface="Cambria Math"/>
+                            </a:rPr>
+                            <m:t>𝑚𝑎𝑥</m:t>
+                          </m:r>
+                        </m:sub>
+                      </m:sSub>
+                      <m:f>
+                        <m:fPr>
+                          <m:ctrlPr>
+                            <a:rPr lang="es-ES" b="0" i="1" smtClean="0">
+                              <a:latin typeface="Cambria Math"/>
+                            </a:rPr>
+                          </m:ctrlPr>
+                        </m:fPr>
+                        <m:num>
+                          <m:r>
+                            <a:rPr lang="es-ES" b="0" i="1" smtClean="0">
+                              <a:latin typeface="Cambria Math"/>
+                            </a:rPr>
+                            <m:t>4</m:t>
+                          </m:r>
+                        </m:num>
+                        <m:den>
+                          <m:sSup>
+                            <m:sSupPr>
+                              <m:ctrlPr>
+                                <a:rPr lang="es-ES" b="0" i="1" smtClean="0">
+                                  <a:latin typeface="Cambria Math"/>
+                                </a:rPr>
+                              </m:ctrlPr>
+                            </m:sSupPr>
+                            <m:e>
+                              <m:r>
+                                <a:rPr lang="es-ES" b="0" i="1" smtClean="0">
+                                  <a:latin typeface="Cambria Math"/>
+                                </a:rPr>
+                                <m:t>𝜋</m:t>
+                              </m:r>
+                            </m:e>
+                            <m:sup>
+                              <m:r>
+                                <a:rPr lang="es-ES" b="0" i="1" smtClean="0">
+                                  <a:latin typeface="Cambria Math"/>
+                                </a:rPr>
+                                <m:t>2</m:t>
+                              </m:r>
+                            </m:sup>
+                          </m:sSup>
+                        </m:den>
+                      </m:f>
+                    </m:oMath>
+                  </a14:m>
+                  <a:r>
+                    <a:rPr lang="es-ES" b="0" dirty="0" smtClean="0"/>
+                    <a:t>=(0,3060</a:t>
+                  </a:r>
+                  <a:r>
+                    <a:rPr lang="es-ES" dirty="0" smtClean="0"/>
+                    <a:t> ±0,0012)</a:t>
+                  </a:r>
+                  <a:r>
+                    <a:rPr lang="es-ES" b="0" dirty="0" smtClean="0"/>
+                    <a:t>    </a:t>
+                  </a:r>
+                </a:p>
+                <a:p>
+                  <a:pPr algn="ctr"/>
+                  <a:endParaRPr lang="es-ES" b="0" dirty="0" smtClean="0"/>
+                </a:p>
+                <a:p>
+                  <a:r>
+                    <a:rPr lang="es-ES" dirty="0" smtClean="0"/>
+                    <a:t> </a:t>
+                  </a:r>
+                  <a:endParaRPr lang="es-ES" dirty="0"/>
+                </a:p>
+              </p:txBody>
+            </p:sp>
+          </mc:Choice>
+          <mc:Fallback>
+            <p:sp>
+              <p:nvSpPr>
+                <p:cNvPr id="16" name="15 CuadroTexto"/>
+                <p:cNvSpPr txBox="1">
+                  <a:spLocks noRot="1" noChangeAspect="1" noMove="1" noResize="1" noEditPoints="1" noAdjustHandles="1" noChangeArrowheads="1" noChangeShapeType="1" noTextEdit="1"/>
+                </p:cNvSpPr>
+                <p:nvPr/>
+              </p:nvSpPr>
+              <p:spPr>
+                <a:xfrm>
+                  <a:off x="5436096" y="692696"/>
+                  <a:ext cx="2880320" cy="2146357"/>
+                </a:xfrm>
+                <a:prstGeom prst="rect">
+                  <a:avLst/>
+                </a:prstGeom>
+                <a:blipFill rotWithShape="1">
+                  <a:blip r:embed="rId5"/>
+                  <a:stretch>
+                    <a:fillRect l="-1691" t="-1420"/>
+                  </a:stretch>
+                </a:blipFill>
+              </p:spPr>
+              <p:txBody>
+                <a:bodyPr/>
+                <a:lstStyle/>
+                <a:p>
+                  <a:r>
+                    <a:rPr lang="es-ES">
+                      <a:noFill/>
+                    </a:rPr>
+                    <a:t> </a:t>
+                  </a:r>
+                </a:p>
+              </p:txBody>
+            </p:sp>
+          </mc:Fallback>
+        </mc:AlternateContent>
+      </p:grpSp>
     </p:spTree>
     <p:extLst>
       <p:ext uri="{BB962C8B-B14F-4D97-AF65-F5344CB8AC3E}">
@@ -9131,6 +12374,36 @@
           </a:extLst>
         </p:spPr>
       </p:pic>
+      <p:sp>
+        <p:nvSpPr>
+          <p:cNvPr id="2" name="1 CuadroTexto"/>
+          <p:cNvSpPr txBox="1"/>
+          <p:nvPr/>
+        </p:nvSpPr>
+        <p:spPr>
+          <a:xfrm>
+            <a:off x="1619672" y="5005000"/>
+            <a:ext cx="5760640" cy="369332"/>
+          </a:xfrm>
+          <a:prstGeom prst="rect">
+            <a:avLst/>
+          </a:prstGeom>
+          <a:noFill/>
+        </p:spPr>
+        <p:txBody>
+          <a:bodyPr wrap="square" rtlCol="0">
+            <a:spAutoFit/>
+          </a:bodyPr>
+          <a:lstStyle/>
+          <a:p>
+            <a:r>
+              <a:rPr lang="es-ES" dirty="0" smtClean="0"/>
+              <a:t>Respuesta del circuito sumador para una señal triangular</a:t>
+            </a:r>
+            <a:endParaRPr lang="es-ES" dirty="0"/>
+          </a:p>
+        </p:txBody>
+      </p:sp>
     </p:spTree>
     <p:extLst>
       <p:ext uri="{BB962C8B-B14F-4D97-AF65-F5344CB8AC3E}">

</xml_diff>

<commit_message>
Mañana liquidamos el asunto
</commit_message>
<xml_diff>
--- a/Practica-Especial-Presentacion.pptx
+++ b/Practica-Especial-Presentacion.pptx
@@ -7,17 +7,18 @@
   <p:sldIdLst>
     <p:sldId id="256" r:id="rId2"/>
     <p:sldId id="257" r:id="rId3"/>
-    <p:sldId id="260" r:id="rId4"/>
-    <p:sldId id="267" r:id="rId5"/>
-    <p:sldId id="262" r:id="rId6"/>
-    <p:sldId id="263" r:id="rId7"/>
-    <p:sldId id="266" r:id="rId8"/>
-    <p:sldId id="264" r:id="rId9"/>
-    <p:sldId id="265" r:id="rId10"/>
-    <p:sldId id="269" r:id="rId11"/>
-    <p:sldId id="258" r:id="rId12"/>
-    <p:sldId id="259" r:id="rId13"/>
-    <p:sldId id="268" r:id="rId14"/>
+    <p:sldId id="270" r:id="rId4"/>
+    <p:sldId id="260" r:id="rId5"/>
+    <p:sldId id="267" r:id="rId6"/>
+    <p:sldId id="262" r:id="rId7"/>
+    <p:sldId id="263" r:id="rId8"/>
+    <p:sldId id="266" r:id="rId9"/>
+    <p:sldId id="264" r:id="rId10"/>
+    <p:sldId id="265" r:id="rId11"/>
+    <p:sldId id="269" r:id="rId12"/>
+    <p:sldId id="258" r:id="rId13"/>
+    <p:sldId id="259" r:id="rId14"/>
+    <p:sldId id="268" r:id="rId15"/>
   </p:sldIdLst>
   <p:sldSz cx="9144000" cy="6858000" type="screen4x3"/>
   <p:notesSz cx="6858000" cy="9144000"/>
@@ -361,7 +362,7 @@
           <a:p>
             <a:fld id="{ADACF0CF-B77B-4348-986E-4344E6FC3834}" type="slidenum">
               <a:rPr lang="es-ES" smtClean="0"/>
-              <a:t>‹Nº›</a:t>
+              <a:t>‹#›</a:t>
             </a:fld>
             <a:endParaRPr lang="es-ES"/>
           </a:p>
@@ -538,7 +539,7 @@
           <a:p>
             <a:fld id="{ADACF0CF-B77B-4348-986E-4344E6FC3834}" type="slidenum">
               <a:rPr lang="es-ES" smtClean="0"/>
-              <a:t>‹Nº›</a:t>
+              <a:t>‹#›</a:t>
             </a:fld>
             <a:endParaRPr lang="es-ES"/>
           </a:p>
@@ -720,7 +721,7 @@
           <a:p>
             <a:fld id="{ADACF0CF-B77B-4348-986E-4344E6FC3834}" type="slidenum">
               <a:rPr lang="es-ES" smtClean="0"/>
-              <a:t>‹Nº›</a:t>
+              <a:t>‹#›</a:t>
             </a:fld>
             <a:endParaRPr lang="es-ES"/>
           </a:p>
@@ -913,7 +914,7 @@
           <a:p>
             <a:fld id="{ADACF0CF-B77B-4348-986E-4344E6FC3834}" type="slidenum">
               <a:rPr lang="es-ES" smtClean="0"/>
-              <a:t>‹Nº›</a:t>
+              <a:t>‹#›</a:t>
             </a:fld>
             <a:endParaRPr lang="es-ES"/>
           </a:p>
@@ -1044,7 +1045,7 @@
           <a:p>
             <a:fld id="{ADACF0CF-B77B-4348-986E-4344E6FC3834}" type="slidenum">
               <a:rPr lang="es-ES" smtClean="0"/>
-              <a:t>‹Nº›</a:t>
+              <a:t>‹#›</a:t>
             </a:fld>
             <a:endParaRPr lang="es-ES"/>
           </a:p>
@@ -1428,7 +1429,7 @@
           <a:p>
             <a:fld id="{ADACF0CF-B77B-4348-986E-4344E6FC3834}" type="slidenum">
               <a:rPr lang="es-ES" smtClean="0"/>
-              <a:t>‹Nº›</a:t>
+              <a:t>‹#›</a:t>
             </a:fld>
             <a:endParaRPr lang="es-ES"/>
           </a:p>
@@ -1873,7 +1874,7 @@
           <a:p>
             <a:fld id="{ADACF0CF-B77B-4348-986E-4344E6FC3834}" type="slidenum">
               <a:rPr lang="es-ES" smtClean="0"/>
-              <a:t>‹Nº›</a:t>
+              <a:t>‹#›</a:t>
             </a:fld>
             <a:endParaRPr lang="es-ES"/>
           </a:p>
@@ -1998,7 +1999,7 @@
           <a:p>
             <a:fld id="{ADACF0CF-B77B-4348-986E-4344E6FC3834}" type="slidenum">
               <a:rPr lang="es-ES" smtClean="0"/>
-              <a:t>‹Nº›</a:t>
+              <a:t>‹#›</a:t>
             </a:fld>
             <a:endParaRPr lang="es-ES"/>
           </a:p>
@@ -2095,7 +2096,7 @@
           <a:p>
             <a:fld id="{ADACF0CF-B77B-4348-986E-4344E6FC3834}" type="slidenum">
               <a:rPr lang="es-ES" smtClean="0"/>
-              <a:t>‹Nº›</a:t>
+              <a:t>‹#›</a:t>
             </a:fld>
             <a:endParaRPr lang="es-ES"/>
           </a:p>
@@ -2386,7 +2387,7 @@
           <a:p>
             <a:fld id="{ADACF0CF-B77B-4348-986E-4344E6FC3834}" type="slidenum">
               <a:rPr lang="es-ES" smtClean="0"/>
-              <a:t>‹Nº›</a:t>
+              <a:t>‹#›</a:t>
             </a:fld>
             <a:endParaRPr lang="es-ES"/>
           </a:p>
@@ -2655,7 +2656,7 @@
           <a:p>
             <a:fld id="{ADACF0CF-B77B-4348-986E-4344E6FC3834}" type="slidenum">
               <a:rPr lang="es-ES" smtClean="0"/>
-              <a:t>‹Nº›</a:t>
+              <a:t>‹#›</a:t>
             </a:fld>
             <a:endParaRPr lang="es-ES"/>
           </a:p>
@@ -2872,7 +2873,7 @@
           <a:p>
             <a:fld id="{ADACF0CF-B77B-4348-986E-4344E6FC3834}" type="slidenum">
               <a:rPr lang="es-ES" smtClean="0"/>
-              <a:t>‹Nº›</a:t>
+              <a:t>‹#›</a:t>
             </a:fld>
             <a:endParaRPr lang="es-ES"/>
           </a:p>
@@ -3473,6 +3474,173 @@
       </p:grpSpPr>
       <p:pic>
         <p:nvPicPr>
+          <p:cNvPr id="5122" name="Picture 2" descr="F:\Practica-Especial - copia\Voltaje_de_Salida.jpg"/>
+          <p:cNvPicPr>
+            <a:picLocks noChangeAspect="1" noChangeArrowheads="1"/>
+          </p:cNvPicPr>
+          <p:nvPr/>
+        </p:nvPicPr>
+        <p:blipFill>
+          <a:blip r:embed="rId2" cstate="print">
+            <a:extLst>
+              <a:ext uri="{28A0092B-C50C-407E-A947-70E740481C1C}">
+                <a14:useLocalDpi xmlns:a14="http://schemas.microsoft.com/office/drawing/2010/main" val="0"/>
+              </a:ext>
+            </a:extLst>
+          </a:blip>
+          <a:srcRect/>
+          <a:stretch>
+            <a:fillRect/>
+          </a:stretch>
+        </p:blipFill>
+        <p:spPr bwMode="auto">
+          <a:xfrm>
+            <a:off x="4549414" y="1324404"/>
+            <a:ext cx="4108704" cy="3535680"/>
+          </a:xfrm>
+          <a:prstGeom prst="rect">
+            <a:avLst/>
+          </a:prstGeom>
+          <a:ln>
+            <a:noFill/>
+          </a:ln>
+          <a:effectLst>
+            <a:outerShdw blurRad="292100" dist="139700" dir="2700000" algn="tl" rotWithShape="0">
+              <a:srgbClr val="333333">
+                <a:alpha val="65000"/>
+              </a:srgbClr>
+            </a:outerShdw>
+          </a:effectLst>
+          <a:extLst>
+            <a:ext uri="{909E8E84-426E-40DD-AFC4-6F175D3DCCD1}">
+              <a14:hiddenFill xmlns:a14="http://schemas.microsoft.com/office/drawing/2010/main">
+                <a:solidFill>
+                  <a:srgbClr val="FFFFFF"/>
+                </a:solidFill>
+              </a14:hiddenFill>
+            </a:ext>
+          </a:extLst>
+        </p:spPr>
+      </p:pic>
+      <p:pic>
+        <p:nvPicPr>
+          <p:cNvPr id="5123" name="Picture 3" descr="F:\Practica-Especial - copia\Salida_vs_Entrada.jpg"/>
+          <p:cNvPicPr>
+            <a:picLocks noChangeAspect="1" noChangeArrowheads="1"/>
+          </p:cNvPicPr>
+          <p:nvPr/>
+        </p:nvPicPr>
+        <p:blipFill>
+          <a:blip r:embed="rId3" cstate="print">
+            <a:extLst>
+              <a:ext uri="{28A0092B-C50C-407E-A947-70E740481C1C}">
+                <a14:useLocalDpi xmlns:a14="http://schemas.microsoft.com/office/drawing/2010/main" val="0"/>
+              </a:ext>
+            </a:extLst>
+          </a:blip>
+          <a:srcRect/>
+          <a:stretch>
+            <a:fillRect/>
+          </a:stretch>
+        </p:blipFill>
+        <p:spPr bwMode="auto">
+          <a:xfrm>
+            <a:off x="107504" y="1340768"/>
+            <a:ext cx="4230624" cy="3486912"/>
+          </a:xfrm>
+          <a:prstGeom prst="rect">
+            <a:avLst/>
+          </a:prstGeom>
+          <a:ln>
+            <a:noFill/>
+          </a:ln>
+          <a:effectLst>
+            <a:outerShdw blurRad="292100" dist="139700" dir="2700000" algn="tl" rotWithShape="0">
+              <a:srgbClr val="333333">
+                <a:alpha val="65000"/>
+              </a:srgbClr>
+            </a:outerShdw>
+          </a:effectLst>
+          <a:extLst>
+            <a:ext uri="{909E8E84-426E-40DD-AFC4-6F175D3DCCD1}">
+              <a14:hiddenFill xmlns:a14="http://schemas.microsoft.com/office/drawing/2010/main">
+                <a:solidFill>
+                  <a:srgbClr val="FFFFFF"/>
+                </a:solidFill>
+              </a14:hiddenFill>
+            </a:ext>
+          </a:extLst>
+        </p:spPr>
+      </p:pic>
+      <p:sp>
+        <p:nvSpPr>
+          <p:cNvPr id="2" name="1 CuadroTexto"/>
+          <p:cNvSpPr txBox="1"/>
+          <p:nvPr/>
+        </p:nvSpPr>
+        <p:spPr>
+          <a:xfrm>
+            <a:off x="1619672" y="5005000"/>
+            <a:ext cx="5760640" cy="369332"/>
+          </a:xfrm>
+          <a:prstGeom prst="rect">
+            <a:avLst/>
+          </a:prstGeom>
+          <a:noFill/>
+        </p:spPr>
+        <p:txBody>
+          <a:bodyPr wrap="square" rtlCol="0">
+            <a:spAutoFit/>
+          </a:bodyPr>
+          <a:lstStyle/>
+          <a:p>
+            <a:r>
+              <a:rPr lang="es-ES" dirty="0" smtClean="0"/>
+              <a:t>Respuesta del circuito sumador para una señal triangular</a:t>
+            </a:r>
+            <a:endParaRPr lang="es-ES" dirty="0"/>
+          </a:p>
+        </p:txBody>
+      </p:sp>
+    </p:spTree>
+    <p:extLst>
+      <p:ext uri="{BB962C8B-B14F-4D97-AF65-F5344CB8AC3E}">
+        <p14:creationId xmlns:p14="http://schemas.microsoft.com/office/powerpoint/2010/main" val="2031422833"/>
+      </p:ext>
+    </p:extLst>
+  </p:cSld>
+  <p:clrMapOvr>
+    <a:masterClrMapping/>
+  </p:clrMapOvr>
+  <p:timing>
+    <p:tnLst>
+      <p:par>
+        <p:cTn id="1" dur="indefinite" restart="never" nodeType="tmRoot"/>
+      </p:par>
+    </p:tnLst>
+  </p:timing>
+</p:sld>
+</file>
+
+<file path=ppt/slides/slide11.xml><?xml version="1.0" encoding="utf-8"?>
+<p:sld xmlns:a="http://schemas.openxmlformats.org/drawingml/2006/main" xmlns:r="http://schemas.openxmlformats.org/officeDocument/2006/relationships" xmlns:p="http://schemas.openxmlformats.org/presentationml/2006/main">
+  <p:cSld>
+    <p:spTree>
+      <p:nvGrpSpPr>
+        <p:cNvPr id="1" name=""/>
+        <p:cNvGrpSpPr/>
+        <p:nvPr/>
+      </p:nvGrpSpPr>
+      <p:grpSpPr>
+        <a:xfrm>
+          <a:off x="0" y="0"/>
+          <a:ext cx="0" cy="0"/>
+          <a:chOff x="0" y="0"/>
+          <a:chExt cx="0" cy="0"/>
+        </a:xfrm>
+      </p:grpSpPr>
+      <p:pic>
+        <p:nvPicPr>
           <p:cNvPr id="2" name="Picture 2" descr="F:\Practica-Especial - copia\5600hz.jpg"/>
           <p:cNvPicPr>
             <a:picLocks noChangeAspect="1" noChangeArrowheads="1"/>
@@ -3567,8 +3735,8 @@
           </a:extLst>
         </p:spPr>
       </p:pic>
-      <mc:AlternateContent xmlns:mc="http://schemas.openxmlformats.org/markup-compatibility/2006">
-        <mc:Choice xmlns:a14="http://schemas.microsoft.com/office/drawing/2010/main" Requires="a14">
+      <mc:AlternateContent xmlns:mc="http://schemas.openxmlformats.org/markup-compatibility/2006" xmlns:a14="http://schemas.microsoft.com/office/drawing/2010/main">
+        <mc:Choice Requires="a14">
           <p:sp>
             <p:nvSpPr>
               <p:cNvPr id="4" name="3 CuadroTexto"/>
@@ -3675,7 +3843,7 @@
             </p:txBody>
           </p:sp>
         </mc:Choice>
-        <mc:Fallback>
+        <mc:Fallback xmlns="">
           <p:sp>
             <p:nvSpPr>
               <p:cNvPr id="4" name="3 CuadroTexto"/>
@@ -3734,7 +3902,7 @@
 </p:sld>
 </file>
 
-<file path=ppt/slides/slide11.xml><?xml version="1.0" encoding="utf-8"?>
+<file path=ppt/slides/slide12.xml><?xml version="1.0" encoding="utf-8"?>
 <p:sld xmlns:a="http://schemas.openxmlformats.org/drawingml/2006/main" xmlns:r="http://schemas.openxmlformats.org/officeDocument/2006/relationships" xmlns:p="http://schemas.openxmlformats.org/presentationml/2006/main">
   <p:cSld>
     <p:spTree>
@@ -4211,8 +4379,8 @@
           </a:p>
         </p:txBody>
       </p:sp>
-      <mc:AlternateContent xmlns:mc="http://schemas.openxmlformats.org/markup-compatibility/2006">
-        <mc:Choice xmlns:a14="http://schemas.microsoft.com/office/drawing/2010/main" Requires="a14">
+      <mc:AlternateContent xmlns:mc="http://schemas.openxmlformats.org/markup-compatibility/2006" xmlns:a14="http://schemas.microsoft.com/office/drawing/2010/main">
+        <mc:Choice Requires="a14">
           <p:sp>
             <p:nvSpPr>
               <p:cNvPr id="8" name="7 CuadroTexto"/>
@@ -4277,7 +4445,7 @@
             </p:txBody>
           </p:sp>
         </mc:Choice>
-        <mc:Fallback>
+        <mc:Fallback xmlns="">
           <p:sp>
             <p:nvSpPr>
               <p:cNvPr id="8" name="7 CuadroTexto"/>
@@ -4336,7 +4504,7 @@
 </p:sld>
 </file>
 
-<file path=ppt/slides/slide12.xml><?xml version="1.0" encoding="utf-8"?>
+<file path=ppt/slides/slide13.xml><?xml version="1.0" encoding="utf-8"?>
 <p:sld xmlns:a="http://schemas.openxmlformats.org/drawingml/2006/main" xmlns:r="http://schemas.openxmlformats.org/officeDocument/2006/relationships" xmlns:p="http://schemas.openxmlformats.org/presentationml/2006/main">
   <p:cSld>
     <p:spTree>
@@ -4403,8 +4571,8 @@
           </a:extLst>
         </p:spPr>
       </p:pic>
-      <mc:AlternateContent xmlns:mc="http://schemas.openxmlformats.org/markup-compatibility/2006">
-        <mc:Choice xmlns:a14="http://schemas.microsoft.com/office/drawing/2010/main" Requires="a14">
+      <mc:AlternateContent xmlns:mc="http://schemas.openxmlformats.org/markup-compatibility/2006" xmlns:a14="http://schemas.microsoft.com/office/drawing/2010/main">
+        <mc:Choice Requires="a14">
           <p:sp>
             <p:nvSpPr>
               <p:cNvPr id="2" name="1 CuadroTexto"/>
@@ -4507,7 +4675,7 @@
             </p:txBody>
           </p:sp>
         </mc:Choice>
-        <mc:Fallback>
+        <mc:Fallback xmlns="">
           <p:sp>
             <p:nvSpPr>
               <p:cNvPr id="2" name="1 CuadroTexto"/>
@@ -4566,7 +4734,7 @@
 </p:sld>
 </file>
 
-<file path=ppt/slides/slide13.xml><?xml version="1.0" encoding="utf-8"?>
+<file path=ppt/slides/slide14.xml><?xml version="1.0" encoding="utf-8"?>
 <p:sld xmlns:a="http://schemas.openxmlformats.org/drawingml/2006/main" xmlns:r="http://schemas.openxmlformats.org/officeDocument/2006/relationships" xmlns:p="http://schemas.openxmlformats.org/presentationml/2006/main">
   <p:cSld>
     <p:spTree>
@@ -6010,1031 +6178,16 @@
       </p:grpSp>
       <p:grpSp>
         <p:nvGrpSpPr>
-          <p:cNvPr id="19" name="18 Grupo"/>
-          <p:cNvGrpSpPr/>
-          <p:nvPr/>
-        </p:nvGrpSpPr>
-        <p:grpSpPr>
-          <a:xfrm>
-            <a:off x="683568" y="2615579"/>
-            <a:ext cx="2760756" cy="1807099"/>
-            <a:chOff x="508205" y="4143808"/>
-            <a:chExt cx="2760756" cy="1807099"/>
-          </a:xfrm>
-        </p:grpSpPr>
-        <mc:AlternateContent xmlns:mc="http://schemas.openxmlformats.org/markup-compatibility/2006">
-          <mc:Choice xmlns:a14="http://schemas.microsoft.com/office/drawing/2010/main" Requires="a14">
-            <p:sp>
-              <p:nvSpPr>
-                <p:cNvPr id="13" name="12 CuadroTexto"/>
-                <p:cNvSpPr txBox="1"/>
-                <p:nvPr/>
-              </p:nvSpPr>
-              <p:spPr>
-                <a:xfrm>
-                  <a:off x="508205" y="4605426"/>
-                  <a:ext cx="2760756" cy="629596"/>
-                </a:xfrm>
-                <a:prstGeom prst="rect">
-                  <a:avLst/>
-                </a:prstGeom>
-                <a:noFill/>
-              </p:spPr>
-              <p:txBody>
-                <a:bodyPr wrap="none" rtlCol="0">
-                  <a:spAutoFit/>
-                </a:bodyPr>
-                <a:lstStyle/>
-                <a:p>
-                  <a:pPr/>
-                  <a14:m>
-                    <m:oMathPara xmlns:m="http://schemas.openxmlformats.org/officeDocument/2006/math">
-                      <m:oMathParaPr>
-                        <m:jc m:val="centerGroup"/>
-                      </m:oMathParaPr>
-                      <m:oMath xmlns:m="http://schemas.openxmlformats.org/officeDocument/2006/math">
-                        <m:r>
-                          <a:rPr lang="es-ES" b="0" i="1" smtClean="0">
-                            <a:latin typeface="Cambria Math"/>
-                          </a:rPr>
-                          <m:t>𝐶</m:t>
-                        </m:r>
-                        <m:r>
-                          <a:rPr lang="es-ES" b="0" i="1" smtClean="0">
-                            <a:latin typeface="Cambria Math"/>
-                          </a:rPr>
-                          <m:t>(</m:t>
-                        </m:r>
-                        <m:r>
-                          <a:rPr lang="es-ES" b="0" i="1" smtClean="0">
-                            <a:latin typeface="Cambria Math"/>
-                          </a:rPr>
-                          <m:t>𝑡</m:t>
-                        </m:r>
-                        <m:r>
-                          <a:rPr lang="es-ES" b="0" i="1" smtClean="0">
-                            <a:latin typeface="Cambria Math"/>
-                          </a:rPr>
-                          <m:t>)=</m:t>
-                        </m:r>
-                        <m:d>
-                          <m:dPr>
-                            <m:begChr m:val="{"/>
-                            <m:endChr m:val=""/>
-                            <m:ctrlPr>
-                              <a:rPr lang="es-ES" i="1" smtClean="0">
-                                <a:latin typeface="Cambria Math"/>
-                              </a:rPr>
-                            </m:ctrlPr>
-                          </m:dPr>
-                          <m:e>
-                            <m:r>
-                              <a:rPr lang="es-ES" b="0" i="1" smtClean="0">
-                                <a:latin typeface="Cambria Math"/>
-                              </a:rPr>
-                              <m:t> </m:t>
-                            </m:r>
-                            <m:eqArr>
-                              <m:eqArrPr>
-                                <m:ctrlPr>
-                                  <a:rPr lang="es-ES" i="1" smtClean="0">
-                                    <a:latin typeface="Cambria Math"/>
-                                  </a:rPr>
-                                </m:ctrlPr>
-                              </m:eqArrPr>
-                              <m:e>
-                                <m:r>
-                                  <a:rPr lang="es-ES" b="0" i="1" smtClean="0">
-                                    <a:latin typeface="Cambria Math"/>
-                                  </a:rPr>
-                                  <m:t> </m:t>
-                                </m:r>
-                                <m:sSub>
-                                  <m:sSubPr>
-                                    <m:ctrlPr>
-                                      <a:rPr lang="es-ES" i="1" smtClean="0">
-                                        <a:latin typeface="Cambria Math"/>
-                                      </a:rPr>
-                                    </m:ctrlPr>
-                                  </m:sSubPr>
-                                  <m:e>
-                                    <m:r>
-                                      <a:rPr lang="es-ES" b="0" i="1" smtClean="0">
-                                        <a:latin typeface="Cambria Math"/>
-                                      </a:rPr>
-                                      <m:t>−</m:t>
-                                    </m:r>
-                                    <m:r>
-                                      <a:rPr lang="es-ES" b="0" i="1" smtClean="0">
-                                        <a:latin typeface="Cambria Math"/>
-                                      </a:rPr>
-                                      <m:t>𝑉</m:t>
-                                    </m:r>
-                                  </m:e>
-                                  <m:sub>
-                                    <m:r>
-                                      <a:rPr lang="es-ES" b="0" i="1" smtClean="0">
-                                        <a:latin typeface="Cambria Math"/>
-                                      </a:rPr>
-                                      <m:t>0</m:t>
-                                    </m:r>
-                                  </m:sub>
-                                </m:sSub>
-                                <m:r>
-                                  <a:rPr lang="es-ES" b="0" i="1" smtClean="0">
-                                    <a:latin typeface="Cambria Math"/>
-                                  </a:rPr>
-                                  <m:t>   </m:t>
-                                </m:r>
-                                <m:r>
-                                  <a:rPr lang="es-ES" b="0" i="1" smtClean="0">
-                                    <a:latin typeface="Cambria Math"/>
-                                  </a:rPr>
-                                  <m:t>𝑡</m:t>
-                                </m:r>
-                                <m:r>
-                                  <a:rPr lang="es-ES" b="0" i="1" smtClean="0">
-                                    <a:latin typeface="Cambria Math"/>
-                                    <a:ea typeface="Cambria Math"/>
-                                  </a:rPr>
-                                  <m:t>∈[−</m:t>
-                                </m:r>
-                                <m:r>
-                                  <a:rPr lang="es-ES" b="0" i="1" smtClean="0">
-                                    <a:latin typeface="Cambria Math"/>
-                                    <a:ea typeface="Cambria Math"/>
-                                  </a:rPr>
-                                  <m:t>𝜏</m:t>
-                                </m:r>
-                                <m:r>
-                                  <a:rPr lang="es-ES" b="0" i="1" smtClean="0">
-                                    <a:latin typeface="Cambria Math"/>
-                                    <a:ea typeface="Cambria Math"/>
-                                  </a:rPr>
-                                  <m:t>,0)</m:t>
-                                </m:r>
-                              </m:e>
-                              <m:e>
-                                <m:sSub>
-                                  <m:sSubPr>
-                                    <m:ctrlPr>
-                                      <a:rPr lang="es-ES" i="1" smtClean="0">
-                                        <a:latin typeface="Cambria Math"/>
-                                      </a:rPr>
-                                    </m:ctrlPr>
-                                  </m:sSubPr>
-                                  <m:e>
-                                    <m:r>
-                                      <a:rPr lang="es-ES" b="0" i="1" smtClean="0">
-                                        <a:latin typeface="Cambria Math"/>
-                                      </a:rPr>
-                                      <m:t>𝑉</m:t>
-                                    </m:r>
-                                  </m:e>
-                                  <m:sub>
-                                    <m:r>
-                                      <a:rPr lang="es-ES" b="0" i="1" smtClean="0">
-                                        <a:latin typeface="Cambria Math"/>
-                                      </a:rPr>
-                                      <m:t>0</m:t>
-                                    </m:r>
-                                  </m:sub>
-                                </m:sSub>
-                                <m:r>
-                                  <a:rPr lang="es-ES" b="0" i="1" smtClean="0">
-                                    <a:latin typeface="Cambria Math"/>
-                                  </a:rPr>
-                                  <m:t>   </m:t>
-                                </m:r>
-                                <m:r>
-                                  <a:rPr lang="es-ES" b="0" i="1" smtClean="0">
-                                    <a:latin typeface="Cambria Math"/>
-                                  </a:rPr>
-                                  <m:t>𝑡</m:t>
-                                </m:r>
-                                <m:r>
-                                  <a:rPr lang="es-ES" b="0" i="1" smtClean="0">
-                                    <a:latin typeface="Cambria Math"/>
-                                    <a:ea typeface="Cambria Math"/>
-                                  </a:rPr>
-                                  <m:t>∈[0,</m:t>
-                                </m:r>
-                                <m:r>
-                                  <a:rPr lang="es-ES" b="0" i="1" smtClean="0">
-                                    <a:latin typeface="Cambria Math"/>
-                                    <a:ea typeface="Cambria Math"/>
-                                  </a:rPr>
-                                  <m:t>𝜏</m:t>
-                                </m:r>
-                                <m:r>
-                                  <a:rPr lang="es-ES" b="0" i="1" smtClean="0">
-                                    <a:latin typeface="Cambria Math"/>
-                                    <a:ea typeface="Cambria Math"/>
-                                  </a:rPr>
-                                  <m:t>)</m:t>
-                                </m:r>
-                              </m:e>
-                            </m:eqArr>
-                          </m:e>
-                        </m:d>
-                      </m:oMath>
-                    </m:oMathPara>
-                  </a14:m>
-                  <a:endParaRPr lang="es-ES" dirty="0"/>
-                </a:p>
-              </p:txBody>
-            </p:sp>
-          </mc:Choice>
-          <mc:Fallback>
-            <p:sp>
-              <p:nvSpPr>
-                <p:cNvPr id="13" name="12 CuadroTexto"/>
-                <p:cNvSpPr txBox="1">
-                  <a:spLocks noRot="1" noChangeAspect="1" noMove="1" noResize="1" noEditPoints="1" noAdjustHandles="1" noChangeArrowheads="1" noChangeShapeType="1" noTextEdit="1"/>
-                </p:cNvSpPr>
-                <p:nvPr/>
-              </p:nvSpPr>
-              <p:spPr>
-                <a:xfrm>
-                  <a:off x="508205" y="4605426"/>
-                  <a:ext cx="2760756" cy="629596"/>
-                </a:xfrm>
-                <a:prstGeom prst="rect">
-                  <a:avLst/>
-                </a:prstGeom>
-                <a:blipFill rotWithShape="1">
-                  <a:blip r:embed="rId6"/>
-                  <a:stretch>
-                    <a:fillRect/>
-                  </a:stretch>
-                </a:blipFill>
-              </p:spPr>
-              <p:txBody>
-                <a:bodyPr/>
-                <a:lstStyle/>
-                <a:p>
-                  <a:r>
-                    <a:rPr lang="es-ES">
-                      <a:noFill/>
-                    </a:rPr>
-                    <a:t> </a:t>
-                  </a:r>
-                </a:p>
-              </p:txBody>
-            </p:sp>
-          </mc:Fallback>
-        </mc:AlternateContent>
-        <mc:AlternateContent xmlns:mc="http://schemas.openxmlformats.org/markup-compatibility/2006" xmlns:a14="http://schemas.microsoft.com/office/drawing/2010/main">
-          <mc:Choice Requires="a14">
-            <p:sp>
-              <p:nvSpPr>
-                <p:cNvPr id="14" name="13 CuadroTexto"/>
-                <p:cNvSpPr txBox="1"/>
-                <p:nvPr/>
-              </p:nvSpPr>
-              <p:spPr>
-                <a:xfrm>
-                  <a:off x="622563" y="5327146"/>
-                  <a:ext cx="2358914" cy="623761"/>
-                </a:xfrm>
-                <a:prstGeom prst="rect">
-                  <a:avLst/>
-                </a:prstGeom>
-                <a:noFill/>
-              </p:spPr>
-              <p:txBody>
-                <a:bodyPr wrap="none" rtlCol="0">
-                  <a:spAutoFit/>
-                </a:bodyPr>
-                <a:lstStyle/>
-                <a:p>
-                  <a:pPr/>
-                  <a14:m>
-                    <m:oMathPara xmlns:m="http://schemas.openxmlformats.org/officeDocument/2006/math">
-                      <m:oMathParaPr>
-                        <m:jc m:val="centerGroup"/>
-                      </m:oMathParaPr>
-                      <m:oMath xmlns:m="http://schemas.openxmlformats.org/officeDocument/2006/math">
-                        <m:sSub>
-                          <m:sSubPr>
-                            <m:ctrlPr>
-                              <a:rPr lang="es-ES" i="1" smtClean="0">
-                                <a:latin typeface="Cambria Math"/>
-                              </a:rPr>
-                            </m:ctrlPr>
-                          </m:sSubPr>
-                          <m:e>
-                            <m:r>
-                              <a:rPr lang="es-ES" i="1" smtClean="0">
-                                <a:latin typeface="Cambria Math"/>
-                                <a:ea typeface="Cambria Math"/>
-                              </a:rPr>
-                              <m:t>𝛼</m:t>
-                            </m:r>
-                          </m:e>
-                          <m:sub>
-                            <m:r>
-                              <a:rPr lang="es-ES" b="0" i="1" smtClean="0">
-                                <a:latin typeface="Cambria Math"/>
-                              </a:rPr>
-                              <m:t>𝑛</m:t>
-                            </m:r>
-                          </m:sub>
-                        </m:sSub>
-                        <m:r>
-                          <a:rPr lang="es-ES" i="1" smtClean="0">
-                            <a:latin typeface="Cambria Math"/>
-                          </a:rPr>
-                          <m:t>=</m:t>
-                        </m:r>
-                        <m:f>
-                          <m:fPr>
-                            <m:ctrlPr>
-                              <a:rPr lang="es-ES" i="1" smtClean="0">
-                                <a:latin typeface="Cambria Math"/>
-                              </a:rPr>
-                            </m:ctrlPr>
-                          </m:fPr>
-                          <m:num>
-                            <m:r>
-                              <a:rPr lang="es-ES" b="0" i="1" smtClean="0">
-                                <a:latin typeface="Cambria Math"/>
-                              </a:rPr>
-                              <m:t>2</m:t>
-                            </m:r>
-                            <m:sSub>
-                              <m:sSubPr>
-                                <m:ctrlPr>
-                                  <a:rPr lang="es-ES" b="0" i="1" smtClean="0">
-                                    <a:latin typeface="Cambria Math"/>
-                                  </a:rPr>
-                                </m:ctrlPr>
-                              </m:sSubPr>
-                              <m:e>
-                                <m:r>
-                                  <a:rPr lang="es-ES" b="0" i="1" smtClean="0">
-                                    <a:latin typeface="Cambria Math"/>
-                                  </a:rPr>
-                                  <m:t>𝑉</m:t>
-                                </m:r>
-                              </m:e>
-                              <m:sub>
-                                <m:r>
-                                  <a:rPr lang="es-ES" b="0" i="1" smtClean="0">
-                                    <a:latin typeface="Cambria Math"/>
-                                  </a:rPr>
-                                  <m:t>0</m:t>
-                                </m:r>
-                              </m:sub>
-                            </m:sSub>
-                            <m:r>
-                              <a:rPr lang="es-ES" b="0" i="1" smtClean="0">
-                                <a:latin typeface="Cambria Math"/>
-                              </a:rPr>
-                              <m:t>(1−</m:t>
-                            </m:r>
-                            <m:sSup>
-                              <m:sSupPr>
-                                <m:ctrlPr>
-                                  <a:rPr lang="es-ES" b="0" i="1" smtClean="0">
-                                    <a:latin typeface="Cambria Math"/>
-                                  </a:rPr>
-                                </m:ctrlPr>
-                              </m:sSupPr>
-                              <m:e>
-                                <m:r>
-                                  <a:rPr lang="es-ES" b="0" i="1" smtClean="0">
-                                    <a:latin typeface="Cambria Math"/>
-                                  </a:rPr>
-                                  <m:t>(−1)</m:t>
-                                </m:r>
-                              </m:e>
-                              <m:sup>
-                                <m:r>
-                                  <a:rPr lang="es-ES" b="0" i="1" smtClean="0">
-                                    <a:latin typeface="Cambria Math"/>
-                                  </a:rPr>
-                                  <m:t>𝑛</m:t>
-                                </m:r>
-                              </m:sup>
-                            </m:sSup>
-                            <m:r>
-                              <a:rPr lang="es-ES" b="0" i="1" smtClean="0">
-                                <a:latin typeface="Cambria Math"/>
-                              </a:rPr>
-                              <m:t>)</m:t>
-                            </m:r>
-                          </m:num>
-                          <m:den>
-                            <m:r>
-                              <a:rPr lang="es-ES" b="0" i="1" smtClean="0">
-                                <a:latin typeface="Cambria Math"/>
-                              </a:rPr>
-                              <m:t>𝑛</m:t>
-                            </m:r>
-                            <m:r>
-                              <a:rPr lang="es-ES" b="0" i="1" smtClean="0">
-                                <a:latin typeface="Cambria Math"/>
-                                <a:ea typeface="Cambria Math"/>
-                              </a:rPr>
-                              <m:t>𝜋</m:t>
-                            </m:r>
-                          </m:den>
-                        </m:f>
-                      </m:oMath>
-                    </m:oMathPara>
-                  </a14:m>
-                  <a:endParaRPr lang="es-ES" dirty="0"/>
-                </a:p>
-              </p:txBody>
-            </p:sp>
-          </mc:Choice>
-          <mc:Fallback xmlns="">
-            <p:sp>
-              <p:nvSpPr>
-                <p:cNvPr id="14" name="13 CuadroTexto"/>
-                <p:cNvSpPr txBox="1">
-                  <a:spLocks noRot="1" noChangeAspect="1" noMove="1" noResize="1" noEditPoints="1" noAdjustHandles="1" noChangeArrowheads="1" noChangeShapeType="1" noTextEdit="1"/>
-                </p:cNvSpPr>
-                <p:nvPr/>
-              </p:nvSpPr>
-              <p:spPr>
-                <a:xfrm>
-                  <a:off x="622563" y="5327146"/>
-                  <a:ext cx="2358914" cy="623761"/>
-                </a:xfrm>
-                <a:prstGeom prst="rect">
-                  <a:avLst/>
-                </a:prstGeom>
-                <a:blipFill rotWithShape="1">
-                  <a:blip r:embed="rId8"/>
-                  <a:stretch>
-                    <a:fillRect/>
-                  </a:stretch>
-                </a:blipFill>
-              </p:spPr>
-              <p:txBody>
-                <a:bodyPr/>
-                <a:lstStyle/>
-                <a:p>
-                  <a:r>
-                    <a:rPr lang="es-ES">
-                      <a:noFill/>
-                    </a:rPr>
-                    <a:t> </a:t>
-                  </a:r>
-                </a:p>
-              </p:txBody>
-            </p:sp>
-          </mc:Fallback>
-        </mc:AlternateContent>
-        <p:sp>
-          <p:nvSpPr>
-            <p:cNvPr id="5" name="4 CuadroTexto"/>
-            <p:cNvSpPr txBox="1"/>
-            <p:nvPr/>
-          </p:nvSpPr>
-          <p:spPr>
-            <a:xfrm>
-              <a:off x="889126" y="4143808"/>
-              <a:ext cx="1664859" cy="369332"/>
-            </a:xfrm>
-            <a:prstGeom prst="rect">
-              <a:avLst/>
-            </a:prstGeom>
-            <a:noFill/>
-          </p:spPr>
-          <p:txBody>
-            <a:bodyPr wrap="square" rtlCol="0">
-              <a:spAutoFit/>
-            </a:bodyPr>
-            <a:lstStyle/>
-            <a:p>
-              <a:r>
-                <a:rPr lang="es-ES" u="sng" dirty="0" smtClean="0"/>
-                <a:t>Señal cuadrada:</a:t>
-              </a:r>
-              <a:endParaRPr lang="es-ES" u="sng" dirty="0"/>
-            </a:p>
-          </p:txBody>
-        </p:sp>
-      </p:grpSp>
-      <p:grpSp>
-        <p:nvGrpSpPr>
-          <p:cNvPr id="20" name="19 Grupo"/>
-          <p:cNvGrpSpPr/>
-          <p:nvPr/>
-        </p:nvGrpSpPr>
-        <p:grpSpPr>
-          <a:xfrm>
-            <a:off x="5135248" y="2638740"/>
-            <a:ext cx="2884828" cy="1844705"/>
-            <a:chOff x="3440921" y="4513140"/>
-            <a:chExt cx="2884828" cy="1844705"/>
-          </a:xfrm>
-        </p:grpSpPr>
-        <mc:AlternateContent xmlns:mc="http://schemas.openxmlformats.org/markup-compatibility/2006" xmlns:a14="http://schemas.microsoft.com/office/drawing/2010/main">
-          <mc:Choice Requires="a14">
-            <p:sp>
-              <p:nvSpPr>
-                <p:cNvPr id="15" name="14 CuadroTexto"/>
-                <p:cNvSpPr txBox="1"/>
-                <p:nvPr/>
-              </p:nvSpPr>
-              <p:spPr>
-                <a:xfrm>
-                  <a:off x="3810234" y="5658871"/>
-                  <a:ext cx="1858778" cy="698974"/>
-                </a:xfrm>
-                <a:prstGeom prst="rect">
-                  <a:avLst/>
-                </a:prstGeom>
-                <a:noFill/>
-              </p:spPr>
-              <p:txBody>
-                <a:bodyPr wrap="none" rtlCol="0">
-                  <a:spAutoFit/>
-                </a:bodyPr>
-                <a:lstStyle/>
-                <a:p>
-                  <a:pPr/>
-                  <a14:m>
-                    <m:oMathPara xmlns:m="http://schemas.openxmlformats.org/officeDocument/2006/math">
-                      <m:oMathParaPr>
-                        <m:jc m:val="centerGroup"/>
-                      </m:oMathParaPr>
-                      <m:oMath xmlns:m="http://schemas.openxmlformats.org/officeDocument/2006/math">
-                        <m:sSub>
-                          <m:sSubPr>
-                            <m:ctrlPr>
-                              <a:rPr lang="es-ES" i="1" smtClean="0">
-                                <a:latin typeface="Cambria Math"/>
-                              </a:rPr>
-                            </m:ctrlPr>
-                          </m:sSubPr>
-                          <m:e>
-                            <m:r>
-                              <a:rPr lang="es-ES" i="1" smtClean="0">
-                                <a:latin typeface="Cambria Math"/>
-                                <a:ea typeface="Cambria Math"/>
-                              </a:rPr>
-                              <m:t>𝛼</m:t>
-                            </m:r>
-                          </m:e>
-                          <m:sub>
-                            <m:r>
-                              <a:rPr lang="es-ES" b="0" i="1" smtClean="0">
-                                <a:latin typeface="Cambria Math"/>
-                              </a:rPr>
-                              <m:t>𝑛</m:t>
-                            </m:r>
-                          </m:sub>
-                        </m:sSub>
-                        <m:r>
-                          <a:rPr lang="es-ES" i="1" smtClean="0">
-                            <a:latin typeface="Cambria Math"/>
-                          </a:rPr>
-                          <m:t>=</m:t>
-                        </m:r>
-                        <m:f>
-                          <m:fPr>
-                            <m:ctrlPr>
-                              <a:rPr lang="es-ES" i="1" smtClean="0">
-                                <a:latin typeface="Cambria Math"/>
-                              </a:rPr>
-                            </m:ctrlPr>
-                          </m:fPr>
-                          <m:num>
-                            <m:r>
-                              <a:rPr lang="es-ES" b="0" i="1" smtClean="0">
-                                <a:latin typeface="Cambria Math"/>
-                              </a:rPr>
-                              <m:t>4</m:t>
-                            </m:r>
-                            <m:sSub>
-                              <m:sSubPr>
-                                <m:ctrlPr>
-                                  <a:rPr lang="es-ES" b="0" i="1" smtClean="0">
-                                    <a:latin typeface="Cambria Math"/>
-                                  </a:rPr>
-                                </m:ctrlPr>
-                              </m:sSubPr>
-                              <m:e>
-                                <m:r>
-                                  <a:rPr lang="es-ES" b="0" i="1" smtClean="0">
-                                    <a:latin typeface="Cambria Math"/>
-                                  </a:rPr>
-                                  <m:t>𝑉</m:t>
-                                </m:r>
-                              </m:e>
-                              <m:sub>
-                                <m:r>
-                                  <a:rPr lang="es-ES" b="0" i="1" smtClean="0">
-                                    <a:latin typeface="Cambria Math"/>
-                                  </a:rPr>
-                                  <m:t>0</m:t>
-                                </m:r>
-                              </m:sub>
-                            </m:sSub>
-                            <m:sSup>
-                              <m:sSupPr>
-                                <m:ctrlPr>
-                                  <a:rPr lang="es-ES" b="0" i="1" smtClean="0">
-                                    <a:latin typeface="Cambria Math"/>
-                                  </a:rPr>
-                                </m:ctrlPr>
-                              </m:sSupPr>
-                              <m:e>
-                                <m:r>
-                                  <a:rPr lang="es-ES" b="0" i="1" smtClean="0">
-                                    <a:latin typeface="Cambria Math"/>
-                                  </a:rPr>
-                                  <m:t>(−1)</m:t>
-                                </m:r>
-                              </m:e>
-                              <m:sup>
-                                <m:r>
-                                  <a:rPr lang="es-ES" b="0" i="1" smtClean="0">
-                                    <a:latin typeface="Cambria Math"/>
-                                  </a:rPr>
-                                  <m:t>𝑛</m:t>
-                                </m:r>
-                              </m:sup>
-                            </m:sSup>
-                            <m:r>
-                              <a:rPr lang="es-ES" b="0" i="1" smtClean="0">
-                                <a:latin typeface="Cambria Math"/>
-                              </a:rPr>
-                              <m:t>)</m:t>
-                            </m:r>
-                          </m:num>
-                          <m:den>
-                            <m:sSup>
-                              <m:sSupPr>
-                                <m:ctrlPr>
-                                  <a:rPr lang="es-ES" i="1" smtClean="0">
-                                    <a:latin typeface="Cambria Math"/>
-                                  </a:rPr>
-                                </m:ctrlPr>
-                              </m:sSupPr>
-                              <m:e>
-                                <m:r>
-                                  <a:rPr lang="es-ES" b="0" i="1" smtClean="0">
-                                    <a:latin typeface="Cambria Math"/>
-                                  </a:rPr>
-                                  <m:t>(</m:t>
-                                </m:r>
-                                <m:r>
-                                  <a:rPr lang="es-ES" b="0" i="1" smtClean="0">
-                                    <a:latin typeface="Cambria Math"/>
-                                  </a:rPr>
-                                  <m:t>𝑛</m:t>
-                                </m:r>
-                                <m:r>
-                                  <a:rPr lang="es-ES" b="0" i="1" smtClean="0">
-                                    <a:latin typeface="Cambria Math"/>
-                                    <a:ea typeface="Cambria Math"/>
-                                  </a:rPr>
-                                  <m:t>𝜋</m:t>
-                                </m:r>
-                                <m:r>
-                                  <a:rPr lang="es-ES" b="0" i="1" smtClean="0">
-                                    <a:latin typeface="Cambria Math"/>
-                                  </a:rPr>
-                                  <m:t>)</m:t>
-                                </m:r>
-                              </m:e>
-                              <m:sup>
-                                <m:r>
-                                  <a:rPr lang="es-ES" b="0" i="1" smtClean="0">
-                                    <a:latin typeface="Cambria Math"/>
-                                  </a:rPr>
-                                  <m:t>2</m:t>
-                                </m:r>
-                              </m:sup>
-                            </m:sSup>
-                          </m:den>
-                        </m:f>
-                      </m:oMath>
-                    </m:oMathPara>
-                  </a14:m>
-                  <a:endParaRPr lang="es-ES" dirty="0"/>
-                </a:p>
-              </p:txBody>
-            </p:sp>
-          </mc:Choice>
-          <mc:Fallback xmlns="">
-            <p:sp>
-              <p:nvSpPr>
-                <p:cNvPr id="15" name="14 CuadroTexto"/>
-                <p:cNvSpPr txBox="1">
-                  <a:spLocks noRot="1" noChangeAspect="1" noMove="1" noResize="1" noEditPoints="1" noAdjustHandles="1" noChangeArrowheads="1" noChangeShapeType="1" noTextEdit="1"/>
-                </p:cNvSpPr>
-                <p:nvPr/>
-              </p:nvSpPr>
-              <p:spPr>
-                <a:xfrm>
-                  <a:off x="3810234" y="5658871"/>
-                  <a:ext cx="1858778" cy="698974"/>
-                </a:xfrm>
-                <a:prstGeom prst="rect">
-                  <a:avLst/>
-                </a:prstGeom>
-                <a:blipFill rotWithShape="1">
-                  <a:blip r:embed="rId9"/>
-                  <a:stretch>
-                    <a:fillRect/>
-                  </a:stretch>
-                </a:blipFill>
-              </p:spPr>
-              <p:txBody>
-                <a:bodyPr/>
-                <a:lstStyle/>
-                <a:p>
-                  <a:r>
-                    <a:rPr lang="es-ES">
-                      <a:noFill/>
-                    </a:rPr>
-                    <a:t> </a:t>
-                  </a:r>
-                </a:p>
-              </p:txBody>
-            </p:sp>
-          </mc:Fallback>
-        </mc:AlternateContent>
-        <mc:AlternateContent xmlns:mc="http://schemas.openxmlformats.org/markup-compatibility/2006" xmlns:a14="http://schemas.microsoft.com/office/drawing/2010/main">
-          <mc:Choice Requires="a14">
-            <p:sp>
-              <p:nvSpPr>
-                <p:cNvPr id="16" name="15 CuadroTexto"/>
-                <p:cNvSpPr txBox="1"/>
-                <p:nvPr/>
-              </p:nvSpPr>
-              <p:spPr>
-                <a:xfrm>
-                  <a:off x="3440921" y="4947804"/>
-                  <a:ext cx="2884828" cy="653256"/>
-                </a:xfrm>
-                <a:prstGeom prst="rect">
-                  <a:avLst/>
-                </a:prstGeom>
-                <a:noFill/>
-              </p:spPr>
-              <p:txBody>
-                <a:bodyPr wrap="none" rtlCol="0">
-                  <a:spAutoFit/>
-                </a:bodyPr>
-                <a:lstStyle/>
-                <a:p>
-                  <a:pPr/>
-                  <a14:m>
-                    <m:oMathPara xmlns:m="http://schemas.openxmlformats.org/officeDocument/2006/math">
-                      <m:oMathParaPr>
-                        <m:jc m:val="centerGroup"/>
-                      </m:oMathParaPr>
-                      <m:oMath xmlns:m="http://schemas.openxmlformats.org/officeDocument/2006/math">
-                        <m:r>
-                          <a:rPr lang="es-ES" b="0" i="1" smtClean="0">
-                            <a:latin typeface="Cambria Math"/>
-                          </a:rPr>
-                          <m:t>𝑃</m:t>
-                        </m:r>
-                        <m:d>
-                          <m:dPr>
-                            <m:ctrlPr>
-                              <a:rPr lang="es-ES" b="0" i="1" smtClean="0">
-                                <a:latin typeface="Cambria Math"/>
-                              </a:rPr>
-                            </m:ctrlPr>
-                          </m:dPr>
-                          <m:e>
-                            <m:r>
-                              <a:rPr lang="es-ES" b="0" i="1" smtClean="0">
-                                <a:latin typeface="Cambria Math"/>
-                              </a:rPr>
-                              <m:t>𝑡</m:t>
-                            </m:r>
-                          </m:e>
-                        </m:d>
-                        <m:r>
-                          <a:rPr lang="es-ES" i="1" smtClean="0">
-                            <a:latin typeface="Cambria Math"/>
-                          </a:rPr>
-                          <m:t>=</m:t>
-                        </m:r>
-                        <m:sSub>
-                          <m:sSubPr>
-                            <m:ctrlPr>
-                              <a:rPr lang="es-ES" i="1" smtClean="0">
-                                <a:latin typeface="Cambria Math"/>
-                              </a:rPr>
-                            </m:ctrlPr>
-                          </m:sSubPr>
-                          <m:e>
-                            <m:r>
-                              <a:rPr lang="es-ES" b="0" i="1" smtClean="0">
-                                <a:latin typeface="Cambria Math"/>
-                              </a:rPr>
-                              <m:t>𝑉</m:t>
-                            </m:r>
-                          </m:e>
-                          <m:sub>
-                            <m:r>
-                              <a:rPr lang="es-ES" b="0" i="1" smtClean="0">
-                                <a:latin typeface="Cambria Math"/>
-                              </a:rPr>
-                              <m:t>0</m:t>
-                            </m:r>
-                          </m:sub>
-                        </m:sSub>
-                        <m:sSup>
-                          <m:sSupPr>
-                            <m:ctrlPr>
-                              <a:rPr lang="es-ES" i="1" smtClean="0">
-                                <a:latin typeface="Cambria Math"/>
-                              </a:rPr>
-                            </m:ctrlPr>
-                          </m:sSupPr>
-                          <m:e>
-                            <m:d>
-                              <m:dPr>
-                                <m:ctrlPr>
-                                  <a:rPr lang="es-ES" i="1" smtClean="0">
-                                    <a:latin typeface="Cambria Math"/>
-                                  </a:rPr>
-                                </m:ctrlPr>
-                              </m:dPr>
-                              <m:e>
-                                <m:f>
-                                  <m:fPr>
-                                    <m:ctrlPr>
-                                      <a:rPr lang="es-ES" i="1" smtClean="0">
-                                        <a:latin typeface="Cambria Math"/>
-                                      </a:rPr>
-                                    </m:ctrlPr>
-                                  </m:fPr>
-                                  <m:num>
-                                    <m:r>
-                                      <a:rPr lang="es-ES" b="0" i="1" smtClean="0">
-                                        <a:latin typeface="Cambria Math"/>
-                                      </a:rPr>
-                                      <m:t>𝑡</m:t>
-                                    </m:r>
-                                  </m:num>
-                                  <m:den>
-                                    <m:r>
-                                      <a:rPr lang="es-ES" i="1" smtClean="0">
-                                        <a:latin typeface="Cambria Math"/>
-                                        <a:ea typeface="Cambria Math"/>
-                                      </a:rPr>
-                                      <m:t>𝜏</m:t>
-                                    </m:r>
-                                  </m:den>
-                                </m:f>
-                              </m:e>
-                            </m:d>
-                          </m:e>
-                          <m:sup>
-                            <m:r>
-                              <a:rPr lang="es-ES" i="1" smtClean="0">
-                                <a:latin typeface="Cambria Math"/>
-                              </a:rPr>
-                              <m:t>2</m:t>
-                            </m:r>
-                          </m:sup>
-                        </m:sSup>
-                        <m:r>
-                          <a:rPr lang="es-ES" b="0" i="1" smtClean="0">
-                            <a:latin typeface="Cambria Math"/>
-                          </a:rPr>
-                          <m:t>   </m:t>
-                        </m:r>
-                        <m:r>
-                          <a:rPr lang="es-ES" b="0" i="1" smtClean="0">
-                            <a:latin typeface="Cambria Math"/>
-                          </a:rPr>
-                          <m:t>𝑡</m:t>
-                        </m:r>
-                        <m:r>
-                          <a:rPr lang="es-ES" b="0" i="1" smtClean="0">
-                            <a:latin typeface="Cambria Math"/>
-                          </a:rPr>
-                          <m:t>∈[−</m:t>
-                        </m:r>
-                        <m:r>
-                          <a:rPr lang="es-ES" b="0" i="1" smtClean="0">
-                            <a:latin typeface="Cambria Math"/>
-                          </a:rPr>
-                          <m:t>𝜏</m:t>
-                        </m:r>
-                        <m:r>
-                          <a:rPr lang="es-ES" b="0" i="1" smtClean="0">
-                            <a:latin typeface="Cambria Math"/>
-                          </a:rPr>
-                          <m:t>, </m:t>
-                        </m:r>
-                        <m:r>
-                          <a:rPr lang="es-ES" b="0" i="1" smtClean="0">
-                            <a:latin typeface="Cambria Math"/>
-                          </a:rPr>
-                          <m:t>𝜏</m:t>
-                        </m:r>
-                        <m:r>
-                          <a:rPr lang="es-ES" b="0" i="1" smtClean="0">
-                            <a:latin typeface="Cambria Math"/>
-                          </a:rPr>
-                          <m:t>]</m:t>
-                        </m:r>
-                      </m:oMath>
-                    </m:oMathPara>
-                  </a14:m>
-                  <a:endParaRPr lang="es-ES" dirty="0"/>
-                </a:p>
-              </p:txBody>
-            </p:sp>
-          </mc:Choice>
-          <mc:Fallback xmlns="">
-            <p:sp>
-              <p:nvSpPr>
-                <p:cNvPr id="16" name="15 CuadroTexto"/>
-                <p:cNvSpPr txBox="1">
-                  <a:spLocks noRot="1" noChangeAspect="1" noMove="1" noResize="1" noEditPoints="1" noAdjustHandles="1" noChangeArrowheads="1" noChangeShapeType="1" noTextEdit="1"/>
-                </p:cNvSpPr>
-                <p:nvPr/>
-              </p:nvSpPr>
-              <p:spPr>
-                <a:xfrm>
-                  <a:off x="3440921" y="4947804"/>
-                  <a:ext cx="2884828" cy="653256"/>
-                </a:xfrm>
-                <a:prstGeom prst="rect">
-                  <a:avLst/>
-                </a:prstGeom>
-                <a:blipFill rotWithShape="1">
-                  <a:blip r:embed="rId10"/>
-                  <a:stretch>
-                    <a:fillRect/>
-                  </a:stretch>
-                </a:blipFill>
-              </p:spPr>
-              <p:txBody>
-                <a:bodyPr/>
-                <a:lstStyle/>
-                <a:p>
-                  <a:r>
-                    <a:rPr lang="es-ES">
-                      <a:noFill/>
-                    </a:rPr>
-                    <a:t> </a:t>
-                  </a:r>
-                </a:p>
-              </p:txBody>
-            </p:sp>
-          </mc:Fallback>
-        </mc:AlternateContent>
-        <p:sp>
-          <p:nvSpPr>
-            <p:cNvPr id="17" name="16 CuadroTexto"/>
-            <p:cNvSpPr txBox="1"/>
-            <p:nvPr/>
-          </p:nvSpPr>
-          <p:spPr>
-            <a:xfrm>
-              <a:off x="3840365" y="4513140"/>
-              <a:ext cx="2085941" cy="369332"/>
-            </a:xfrm>
-            <a:prstGeom prst="rect">
-              <a:avLst/>
-            </a:prstGeom>
-            <a:noFill/>
-          </p:spPr>
-          <p:txBody>
-            <a:bodyPr wrap="square" rtlCol="0">
-              <a:spAutoFit/>
-            </a:bodyPr>
-            <a:lstStyle/>
-            <a:p>
-              <a:r>
-                <a:rPr lang="es-ES" u="sng" dirty="0" smtClean="0"/>
-                <a:t>Señal parabólica:</a:t>
-              </a:r>
-              <a:endParaRPr lang="es-ES" u="sng" dirty="0"/>
-            </a:p>
-          </p:txBody>
-        </p:sp>
-      </p:grpSp>
-      <p:grpSp>
-        <p:nvGrpSpPr>
           <p:cNvPr id="21" name="20 Grupo"/>
           <p:cNvGrpSpPr/>
           <p:nvPr/>
         </p:nvGrpSpPr>
         <p:grpSpPr>
           <a:xfrm>
-            <a:off x="104718" y="990428"/>
-            <a:ext cx="3867629" cy="1987621"/>
-            <a:chOff x="271154" y="1075167"/>
-            <a:chExt cx="4227669" cy="1209116"/>
+            <a:off x="104718" y="1246331"/>
+            <a:ext cx="3863763" cy="1849122"/>
+            <a:chOff x="271154" y="1159419"/>
+            <a:chExt cx="4223443" cy="1124864"/>
           </a:xfrm>
         </p:grpSpPr>
         <mc:AlternateContent xmlns:mc="http://schemas.openxmlformats.org/markup-compatibility/2006" xmlns:a14="http://schemas.microsoft.com/office/drawing/2010/main">
@@ -7360,8 +6513,8 @@
             </p:sp>
           </mc:Fallback>
         </mc:AlternateContent>
-        <mc:AlternateContent xmlns:mc="http://schemas.openxmlformats.org/markup-compatibility/2006" xmlns:a14="http://schemas.microsoft.com/office/drawing/2010/main">
-          <mc:Choice Requires="a14">
+        <mc:AlternateContent xmlns:mc="http://schemas.openxmlformats.org/markup-compatibility/2006">
+          <mc:Choice xmlns:a14="http://schemas.microsoft.com/office/drawing/2010/main" Requires="a14">
             <p:sp>
               <p:nvSpPr>
                 <p:cNvPr id="18" name="17 CuadroTexto"/>
@@ -7370,8 +6523,8 @@
               </p:nvSpPr>
               <p:spPr>
                 <a:xfrm>
-                  <a:off x="358874" y="1075167"/>
-                  <a:ext cx="4139949" cy="393178"/>
+                  <a:off x="354649" y="1159419"/>
+                  <a:ext cx="4139948" cy="224673"/>
                 </a:xfrm>
                 <a:prstGeom prst="rect">
                   <a:avLst/>
@@ -7386,7 +6539,15 @@
                 <a:p>
                   <a:r>
                     <a:rPr lang="es-ES" dirty="0" smtClean="0"/>
-                    <a:t>Si f(t) es una función periódica con periodo </a:t>
+                    <a:t>Si f(t) es una función </a:t>
+                  </a:r>
+                  <a:r>
+                    <a:rPr lang="es-ES" dirty="0" smtClean="0"/>
+                    <a:t>de </a:t>
+                  </a:r>
+                  <a:r>
+                    <a:rPr lang="es-ES" dirty="0" smtClean="0"/>
+                    <a:t>periodo </a:t>
                   </a:r>
                   <a14:m>
                     <m:oMath xmlns:m="http://schemas.openxmlformats.org/officeDocument/2006/math">
@@ -7407,7 +6568,7 @@
               </p:txBody>
             </p:sp>
           </mc:Choice>
-          <mc:Fallback xmlns="">
+          <mc:Fallback>
             <p:sp>
               <p:nvSpPr>
                 <p:cNvPr id="18" name="17 CuadroTexto"/>
@@ -7418,8 +6579,8 @@
               </p:nvSpPr>
               <p:spPr>
                 <a:xfrm>
-                  <a:off x="358874" y="1075167"/>
-                  <a:ext cx="4139949" cy="393178"/>
+                  <a:off x="354649" y="1159419"/>
+                  <a:ext cx="4139948" cy="224673"/>
                 </a:xfrm>
                 <a:prstGeom prst="rect">
                   <a:avLst/>
@@ -7427,7 +6588,7 @@
                 <a:blipFill rotWithShape="1">
                   <a:blip r:embed="rId12"/>
                   <a:stretch>
-                    <a:fillRect l="-1449" t="-4717" b="-14151"/>
+                    <a:fillRect l="-1449" t="-8197" b="-24590"/>
                   </a:stretch>
                 </a:blipFill>
               </p:spPr>
@@ -7436,7 +6597,7 @@
                 <a:lstStyle/>
                 <a:p>
                   <a:r>
-                    <a:rPr lang="es-ES">
+                    <a:rPr lang="ru-RU">
                       <a:noFill/>
                     </a:rPr>
                     <a:t> </a:t>
@@ -7447,16 +6608,2352 @@
           </mc:Fallback>
         </mc:AlternateContent>
       </p:grpSp>
+      <mc:AlternateContent xmlns:mc="http://schemas.openxmlformats.org/markup-compatibility/2006">
+        <mc:Choice xmlns:a14="http://schemas.microsoft.com/office/drawing/2010/main" Requires="a14">
+          <p:sp>
+            <p:nvSpPr>
+              <p:cNvPr id="22" name="TextBox 21"/>
+              <p:cNvSpPr txBox="1"/>
+              <p:nvPr/>
+            </p:nvSpPr>
+            <p:spPr>
+              <a:xfrm>
+                <a:off x="-205430" y="4515420"/>
+                <a:ext cx="9193286" cy="1009122"/>
+              </a:xfrm>
+              <a:prstGeom prst="rect">
+                <a:avLst/>
+              </a:prstGeom>
+              <a:noFill/>
+            </p:spPr>
+            <p:txBody>
+              <a:bodyPr wrap="none" rtlCol="0">
+                <a:spAutoFit/>
+              </a:bodyPr>
+              <a:lstStyle/>
+              <a:p>
+                <a14:m>
+                  <m:oMathPara xmlns:m="http://schemas.openxmlformats.org/officeDocument/2006/math">
+                    <m:oMathParaPr>
+                      <m:jc m:val="centerGroup"/>
+                    </m:oMathParaPr>
+                    <m:oMath xmlns:m="http://schemas.openxmlformats.org/officeDocument/2006/math">
+                      <m:r>
+                        <a:rPr lang="es-ES" sz="1600" b="0" i="1" smtClean="0">
+                          <a:latin typeface="Cambria Math"/>
+                        </a:rPr>
+                        <m:t>𝑃</m:t>
+                      </m:r>
+                      <m:d>
+                        <m:dPr>
+                          <m:ctrlPr>
+                            <a:rPr lang="es-ES" sz="1600" b="0" i="1" smtClean="0">
+                              <a:latin typeface="Cambria Math"/>
+                            </a:rPr>
+                          </m:ctrlPr>
+                        </m:dPr>
+                        <m:e>
+                          <m:r>
+                            <a:rPr lang="es-ES" sz="1600" b="0" i="1" smtClean="0">
+                              <a:latin typeface="Cambria Math"/>
+                            </a:rPr>
+                            <m:t>𝜔</m:t>
+                          </m:r>
+                        </m:e>
+                      </m:d>
+                      <m:r>
+                        <a:rPr lang="es-ES" sz="1600" b="0" i="1" smtClean="0">
+                          <a:latin typeface="Cambria Math"/>
+                        </a:rPr>
+                        <m:t>=</m:t>
+                      </m:r>
+                      <m:sSup>
+                        <m:sSupPr>
+                          <m:ctrlPr>
+                            <a:rPr lang="es-ES" sz="1600" b="0" i="1" smtClean="0">
+                              <a:latin typeface="Cambria Math"/>
+                            </a:rPr>
+                          </m:ctrlPr>
+                        </m:sSupPr>
+                        <m:e>
+                          <m:d>
+                            <m:dPr>
+                              <m:begChr m:val="|"/>
+                              <m:endChr m:val="|"/>
+                              <m:ctrlPr>
+                                <a:rPr lang="es-ES" sz="1600" b="0" i="1" smtClean="0">
+                                  <a:latin typeface="Cambria Math"/>
+                                </a:rPr>
+                              </m:ctrlPr>
+                            </m:dPr>
+                            <m:e>
+                              <m:f>
+                                <m:fPr>
+                                  <m:ctrlPr>
+                                    <a:rPr lang="es-ES" sz="1600" b="0" i="1" smtClean="0">
+                                      <a:latin typeface="Cambria Math"/>
+                                    </a:rPr>
+                                  </m:ctrlPr>
+                                </m:fPr>
+                                <m:num>
+                                  <m:r>
+                                    <a:rPr lang="es-ES" sz="1600" b="0" i="1" smtClean="0">
+                                      <a:latin typeface="Cambria Math"/>
+                                    </a:rPr>
+                                    <m:t>1</m:t>
+                                  </m:r>
+                                </m:num>
+                                <m:den>
+                                  <m:sSub>
+                                    <m:sSubPr>
+                                      <m:ctrlPr>
+                                        <a:rPr lang="es-ES" sz="1600" b="0" i="1" smtClean="0">
+                                          <a:latin typeface="Cambria Math"/>
+                                        </a:rPr>
+                                      </m:ctrlPr>
+                                    </m:sSubPr>
+                                    <m:e>
+                                      <m:r>
+                                        <a:rPr lang="es-ES" sz="1600" b="0" i="1" smtClean="0">
+                                          <a:latin typeface="Cambria Math"/>
+                                        </a:rPr>
+                                        <m:t>𝑡</m:t>
+                                      </m:r>
+                                    </m:e>
+                                    <m:sub>
+                                      <m:r>
+                                        <a:rPr lang="es-ES" sz="1600" b="0" i="1" smtClean="0">
+                                          <a:latin typeface="Cambria Math"/>
+                                        </a:rPr>
+                                        <m:t>1</m:t>
+                                      </m:r>
+                                    </m:sub>
+                                  </m:sSub>
+                                  <m:r>
+                                    <a:rPr lang="es-ES" sz="1600" b="0" i="1" smtClean="0">
+                                      <a:latin typeface="Cambria Math"/>
+                                    </a:rPr>
+                                    <m:t>−</m:t>
+                                  </m:r>
+                                  <m:sSub>
+                                    <m:sSubPr>
+                                      <m:ctrlPr>
+                                        <a:rPr lang="es-ES" sz="1600" b="0" i="1" smtClean="0">
+                                          <a:latin typeface="Cambria Math"/>
+                                        </a:rPr>
+                                      </m:ctrlPr>
+                                    </m:sSubPr>
+                                    <m:e>
+                                      <m:r>
+                                        <a:rPr lang="es-ES" sz="1600" b="0" i="1" smtClean="0">
+                                          <a:latin typeface="Cambria Math"/>
+                                        </a:rPr>
+                                        <m:t>𝑡</m:t>
+                                      </m:r>
+                                    </m:e>
+                                    <m:sub>
+                                      <m:r>
+                                        <a:rPr lang="es-ES" sz="1600" b="0" i="1" smtClean="0">
+                                          <a:latin typeface="Cambria Math"/>
+                                        </a:rPr>
+                                        <m:t>0</m:t>
+                                      </m:r>
+                                    </m:sub>
+                                  </m:sSub>
+                                </m:den>
+                              </m:f>
+                              <m:nary>
+                                <m:naryPr>
+                                  <m:ctrlPr>
+                                    <a:rPr lang="es-ES" sz="1600" b="0" i="1" smtClean="0">
+                                      <a:latin typeface="Cambria Math"/>
+                                    </a:rPr>
+                                  </m:ctrlPr>
+                                </m:naryPr>
+                                <m:sub>
+                                  <m:sSub>
+                                    <m:sSubPr>
+                                      <m:ctrlPr>
+                                        <a:rPr lang="es-ES" sz="1600" b="0" i="1" smtClean="0">
+                                          <a:latin typeface="Cambria Math"/>
+                                        </a:rPr>
+                                      </m:ctrlPr>
+                                    </m:sSubPr>
+                                    <m:e>
+                                      <m:r>
+                                        <m:rPr>
+                                          <m:brk m:alnAt="23"/>
+                                        </m:rPr>
+                                        <a:rPr lang="es-ES" sz="1600" b="0" i="1" smtClean="0">
+                                          <a:latin typeface="Cambria Math"/>
+                                        </a:rPr>
+                                        <m:t>𝑡</m:t>
+                                      </m:r>
+                                    </m:e>
+                                    <m:sub>
+                                      <m:r>
+                                        <m:rPr>
+                                          <m:brk m:alnAt="23"/>
+                                        </m:rPr>
+                                        <a:rPr lang="es-ES" sz="1600" b="0" i="1" smtClean="0">
+                                          <a:latin typeface="Cambria Math"/>
+                                        </a:rPr>
+                                        <m:t>0</m:t>
+                                      </m:r>
+                                    </m:sub>
+                                  </m:sSub>
+                                </m:sub>
+                                <m:sup>
+                                  <m:sSub>
+                                    <m:sSubPr>
+                                      <m:ctrlPr>
+                                        <a:rPr lang="es-ES" sz="1600" b="0" i="1" smtClean="0">
+                                          <a:latin typeface="Cambria Math"/>
+                                        </a:rPr>
+                                      </m:ctrlPr>
+                                    </m:sSubPr>
+                                    <m:e>
+                                      <m:r>
+                                        <a:rPr lang="es-ES" sz="1600" b="0" i="1" smtClean="0">
+                                          <a:latin typeface="Cambria Math"/>
+                                        </a:rPr>
+                                        <m:t>𝑡</m:t>
+                                      </m:r>
+                                    </m:e>
+                                    <m:sub>
+                                      <m:r>
+                                        <a:rPr lang="es-ES" sz="1600" b="0" i="1" smtClean="0">
+                                          <a:latin typeface="Cambria Math"/>
+                                        </a:rPr>
+                                        <m:t>1</m:t>
+                                      </m:r>
+                                    </m:sub>
+                                  </m:sSub>
+                                </m:sup>
+                                <m:e>
+                                  <m:r>
+                                    <a:rPr lang="es-ES" sz="1600" b="0" i="1" smtClean="0">
+                                      <a:latin typeface="Cambria Math"/>
+                                    </a:rPr>
+                                    <m:t>𝑓</m:t>
+                                  </m:r>
+                                  <m:d>
+                                    <m:dPr>
+                                      <m:ctrlPr>
+                                        <a:rPr lang="es-ES" sz="1600" b="0" i="1" smtClean="0">
+                                          <a:latin typeface="Cambria Math"/>
+                                        </a:rPr>
+                                      </m:ctrlPr>
+                                    </m:dPr>
+                                    <m:e>
+                                      <m:r>
+                                        <a:rPr lang="es-ES" sz="1600" b="0" i="1" smtClean="0">
+                                          <a:latin typeface="Cambria Math"/>
+                                        </a:rPr>
+                                        <m:t>𝑡</m:t>
+                                      </m:r>
+                                    </m:e>
+                                  </m:d>
+                                  <m:r>
+                                    <a:rPr lang="es-ES" sz="1600" b="0" i="1" smtClean="0">
+                                      <a:latin typeface="Cambria Math"/>
+                                    </a:rPr>
+                                    <m:t>.</m:t>
+                                  </m:r>
+                                  <m:sSup>
+                                    <m:sSupPr>
+                                      <m:ctrlPr>
+                                        <a:rPr lang="es-ES" sz="1600" b="0" i="1" smtClean="0">
+                                          <a:latin typeface="Cambria Math"/>
+                                        </a:rPr>
+                                      </m:ctrlPr>
+                                    </m:sSupPr>
+                                    <m:e>
+                                      <m:r>
+                                        <a:rPr lang="es-ES" sz="1600" b="0" i="1" smtClean="0">
+                                          <a:latin typeface="Cambria Math"/>
+                                        </a:rPr>
+                                        <m:t>𝑒</m:t>
+                                      </m:r>
+                                    </m:e>
+                                    <m:sup>
+                                      <m:r>
+                                        <a:rPr lang="es-ES" sz="1600" b="0" i="1" smtClean="0">
+                                          <a:latin typeface="Cambria Math"/>
+                                        </a:rPr>
+                                        <m:t>−</m:t>
+                                      </m:r>
+                                      <m:r>
+                                        <a:rPr lang="es-ES" sz="1600" b="0" i="1" smtClean="0">
+                                          <a:latin typeface="Cambria Math"/>
+                                        </a:rPr>
+                                        <m:t>𝑖</m:t>
+                                      </m:r>
+                                      <m:r>
+                                        <a:rPr lang="es-ES" sz="1600" b="0" i="1" smtClean="0">
+                                          <a:latin typeface="Cambria Math"/>
+                                        </a:rPr>
+                                        <m:t>𝜔</m:t>
+                                      </m:r>
+                                      <m:r>
+                                        <a:rPr lang="es-ES" sz="1600" b="0" i="1" smtClean="0">
+                                          <a:latin typeface="Cambria Math"/>
+                                        </a:rPr>
+                                        <m:t>𝑡</m:t>
+                                      </m:r>
+                                    </m:sup>
+                                  </m:sSup>
+                                  <m:r>
+                                    <a:rPr lang="es-ES" sz="1600" b="0" i="1" smtClean="0">
+                                      <a:latin typeface="Cambria Math"/>
+                                    </a:rPr>
+                                    <m:t>𝑑𝑡</m:t>
+                                  </m:r>
+                                </m:e>
+                              </m:nary>
+                            </m:e>
+                          </m:d>
+                        </m:e>
+                        <m:sup>
+                          <m:r>
+                            <a:rPr lang="es-ES" sz="1600" b="0" i="1" smtClean="0">
+                              <a:latin typeface="Cambria Math"/>
+                            </a:rPr>
+                            <m:t>2</m:t>
+                          </m:r>
+                        </m:sup>
+                      </m:sSup>
+                      <m:r>
+                        <a:rPr lang="es-ES" sz="1600" b="0" i="1" smtClean="0">
+                          <a:latin typeface="Cambria Math"/>
+                        </a:rPr>
+                        <m:t>=</m:t>
+                      </m:r>
+                      <m:sSup>
+                        <m:sSupPr>
+                          <m:ctrlPr>
+                            <a:rPr lang="ru-RU" sz="1600" i="1"/>
+                          </m:ctrlPr>
+                        </m:sSupPr>
+                        <m:e>
+                          <m:d>
+                            <m:dPr>
+                              <m:ctrlPr>
+                                <a:rPr lang="ru-RU" sz="1600" i="1"/>
+                              </m:ctrlPr>
+                            </m:dPr>
+                            <m:e>
+                              <m:f>
+                                <m:fPr>
+                                  <m:ctrlPr>
+                                    <a:rPr lang="ru-RU" sz="1600" i="1"/>
+                                  </m:ctrlPr>
+                                </m:fPr>
+                                <m:num>
+                                  <m:r>
+                                    <a:rPr lang="es-ES" sz="1600" i="1"/>
+                                    <m:t>1</m:t>
+                                  </m:r>
+                                </m:num>
+                                <m:den>
+                                  <m:sSub>
+                                    <m:sSubPr>
+                                      <m:ctrlPr>
+                                        <a:rPr lang="ru-RU" sz="1600" i="1"/>
+                                      </m:ctrlPr>
+                                    </m:sSubPr>
+                                    <m:e>
+                                      <m:r>
+                                        <a:rPr lang="es-ES" sz="1600" i="1"/>
+                                        <m:t>𝑡</m:t>
+                                      </m:r>
+                                    </m:e>
+                                    <m:sub>
+                                      <m:r>
+                                        <a:rPr lang="es-ES" sz="1600" i="1"/>
+                                        <m:t>1</m:t>
+                                      </m:r>
+                                    </m:sub>
+                                  </m:sSub>
+                                  <m:r>
+                                    <a:rPr lang="es-ES" sz="1600" i="1"/>
+                                    <m:t>−</m:t>
+                                  </m:r>
+                                  <m:sSub>
+                                    <m:sSubPr>
+                                      <m:ctrlPr>
+                                        <a:rPr lang="ru-RU" sz="1600" i="1"/>
+                                      </m:ctrlPr>
+                                    </m:sSubPr>
+                                    <m:e>
+                                      <m:r>
+                                        <a:rPr lang="es-ES" sz="1600" i="1"/>
+                                        <m:t>𝑡</m:t>
+                                      </m:r>
+                                    </m:e>
+                                    <m:sub>
+                                      <m:r>
+                                        <a:rPr lang="es-ES" sz="1600" i="1"/>
+                                        <m:t>0</m:t>
+                                      </m:r>
+                                    </m:sub>
+                                  </m:sSub>
+                                </m:den>
+                              </m:f>
+                              <m:nary>
+                                <m:naryPr>
+                                  <m:ctrlPr>
+                                    <a:rPr lang="ru-RU" sz="1600" i="1"/>
+                                  </m:ctrlPr>
+                                </m:naryPr>
+                                <m:sub>
+                                  <m:sSub>
+                                    <m:sSubPr>
+                                      <m:ctrlPr>
+                                        <a:rPr lang="ru-RU" sz="1600" i="1"/>
+                                      </m:ctrlPr>
+                                    </m:sSubPr>
+                                    <m:e>
+                                      <m:r>
+                                        <a:rPr lang="es-ES" sz="1600" i="1"/>
+                                        <m:t>𝑡</m:t>
+                                      </m:r>
+                                    </m:e>
+                                    <m:sub>
+                                      <m:r>
+                                        <a:rPr lang="es-ES" sz="1600" i="1"/>
+                                        <m:t>0</m:t>
+                                      </m:r>
+                                    </m:sub>
+                                  </m:sSub>
+                                </m:sub>
+                                <m:sup>
+                                  <m:sSub>
+                                    <m:sSubPr>
+                                      <m:ctrlPr>
+                                        <a:rPr lang="ru-RU" sz="1600" i="1"/>
+                                      </m:ctrlPr>
+                                    </m:sSubPr>
+                                    <m:e>
+                                      <m:r>
+                                        <a:rPr lang="es-ES" sz="1600" i="1"/>
+                                        <m:t>𝑡</m:t>
+                                      </m:r>
+                                    </m:e>
+                                    <m:sub>
+                                      <m:r>
+                                        <a:rPr lang="es-ES" sz="1600" i="1"/>
+                                        <m:t>1</m:t>
+                                      </m:r>
+                                    </m:sub>
+                                  </m:sSub>
+                                </m:sup>
+                                <m:e>
+                                  <m:r>
+                                    <a:rPr lang="es-ES" sz="1600" i="1"/>
+                                    <m:t>𝑓</m:t>
+                                  </m:r>
+                                  <m:d>
+                                    <m:dPr>
+                                      <m:ctrlPr>
+                                        <a:rPr lang="ru-RU" sz="1600" i="1"/>
+                                      </m:ctrlPr>
+                                    </m:dPr>
+                                    <m:e>
+                                      <m:r>
+                                        <a:rPr lang="es-ES" sz="1600" i="1"/>
+                                        <m:t>𝑡</m:t>
+                                      </m:r>
+                                    </m:e>
+                                  </m:d>
+                                  <m:r>
+                                    <a:rPr lang="es-ES" sz="1600" i="1"/>
+                                    <m:t>.</m:t>
+                                  </m:r>
+                                  <m:r>
+                                    <m:rPr>
+                                      <m:sty m:val="p"/>
+                                    </m:rPr>
+                                    <a:rPr lang="es-ES" sz="1600"/>
+                                    <m:t>cos</m:t>
+                                  </m:r>
+                                  <m:r>
+                                    <a:rPr lang="es-ES" sz="1600" i="1"/>
+                                    <m:t>(</m:t>
+                                  </m:r>
+                                  <m:r>
+                                    <a:rPr lang="es-ES" sz="1600" i="1"/>
+                                    <m:t>𝜔</m:t>
+                                  </m:r>
+                                  <m:r>
+                                    <a:rPr lang="es-ES" sz="1600" i="1"/>
+                                    <m:t>𝑡</m:t>
+                                  </m:r>
+                                  <m:r>
+                                    <a:rPr lang="es-ES" sz="1600" i="1"/>
+                                    <m:t>)</m:t>
+                                  </m:r>
+                                  <m:r>
+                                    <a:rPr lang="es-ES" sz="1600" i="1"/>
+                                    <m:t>𝑑𝑡</m:t>
+                                  </m:r>
+                                </m:e>
+                              </m:nary>
+                            </m:e>
+                          </m:d>
+                        </m:e>
+                        <m:sup>
+                          <m:r>
+                            <a:rPr lang="ru-RU" sz="1600" i="1"/>
+                            <m:t>2</m:t>
+                          </m:r>
+                        </m:sup>
+                      </m:sSup>
+                      <m:r>
+                        <a:rPr lang="ru-RU" sz="1600" i="1"/>
+                        <m:t>+</m:t>
+                      </m:r>
+                      <m:sSup>
+                        <m:sSupPr>
+                          <m:ctrlPr>
+                            <a:rPr lang="ru-RU" sz="1600" i="1"/>
+                          </m:ctrlPr>
+                        </m:sSupPr>
+                        <m:e>
+                          <m:d>
+                            <m:dPr>
+                              <m:ctrlPr>
+                                <a:rPr lang="ru-RU" sz="1600" i="1"/>
+                              </m:ctrlPr>
+                            </m:dPr>
+                            <m:e>
+                              <m:f>
+                                <m:fPr>
+                                  <m:ctrlPr>
+                                    <a:rPr lang="ru-RU" sz="1600" i="1"/>
+                                  </m:ctrlPr>
+                                </m:fPr>
+                                <m:num>
+                                  <m:r>
+                                    <a:rPr lang="es-ES" sz="1600" i="1"/>
+                                    <m:t>1</m:t>
+                                  </m:r>
+                                </m:num>
+                                <m:den>
+                                  <m:sSub>
+                                    <m:sSubPr>
+                                      <m:ctrlPr>
+                                        <a:rPr lang="ru-RU" sz="1600" i="1"/>
+                                      </m:ctrlPr>
+                                    </m:sSubPr>
+                                    <m:e>
+                                      <m:r>
+                                        <a:rPr lang="es-ES" sz="1600" i="1"/>
+                                        <m:t>𝑡</m:t>
+                                      </m:r>
+                                    </m:e>
+                                    <m:sub>
+                                      <m:r>
+                                        <a:rPr lang="es-ES" sz="1600" i="1"/>
+                                        <m:t>1</m:t>
+                                      </m:r>
+                                    </m:sub>
+                                  </m:sSub>
+                                  <m:r>
+                                    <a:rPr lang="es-ES" sz="1600" i="1"/>
+                                    <m:t>−</m:t>
+                                  </m:r>
+                                  <m:sSub>
+                                    <m:sSubPr>
+                                      <m:ctrlPr>
+                                        <a:rPr lang="ru-RU" sz="1600" i="1"/>
+                                      </m:ctrlPr>
+                                    </m:sSubPr>
+                                    <m:e>
+                                      <m:r>
+                                        <a:rPr lang="es-ES" sz="1600" i="1"/>
+                                        <m:t>𝑡</m:t>
+                                      </m:r>
+                                    </m:e>
+                                    <m:sub>
+                                      <m:r>
+                                        <a:rPr lang="es-ES" sz="1600" i="1"/>
+                                        <m:t>0</m:t>
+                                      </m:r>
+                                    </m:sub>
+                                  </m:sSub>
+                                </m:den>
+                              </m:f>
+                              <m:nary>
+                                <m:naryPr>
+                                  <m:ctrlPr>
+                                    <a:rPr lang="ru-RU" sz="1600" i="1"/>
+                                  </m:ctrlPr>
+                                </m:naryPr>
+                                <m:sub>
+                                  <m:sSub>
+                                    <m:sSubPr>
+                                      <m:ctrlPr>
+                                        <a:rPr lang="ru-RU" sz="1600" i="1"/>
+                                      </m:ctrlPr>
+                                    </m:sSubPr>
+                                    <m:e>
+                                      <m:r>
+                                        <a:rPr lang="es-ES" sz="1600" i="1"/>
+                                        <m:t>𝑡</m:t>
+                                      </m:r>
+                                    </m:e>
+                                    <m:sub>
+                                      <m:r>
+                                        <a:rPr lang="es-ES" sz="1600" i="1"/>
+                                        <m:t>0</m:t>
+                                      </m:r>
+                                    </m:sub>
+                                  </m:sSub>
+                                </m:sub>
+                                <m:sup>
+                                  <m:sSub>
+                                    <m:sSubPr>
+                                      <m:ctrlPr>
+                                        <a:rPr lang="ru-RU" sz="1600" i="1"/>
+                                      </m:ctrlPr>
+                                    </m:sSubPr>
+                                    <m:e>
+                                      <m:r>
+                                        <a:rPr lang="es-ES" sz="1600" i="1"/>
+                                        <m:t>𝑡</m:t>
+                                      </m:r>
+                                    </m:e>
+                                    <m:sub>
+                                      <m:r>
+                                        <a:rPr lang="es-ES" sz="1600" i="1"/>
+                                        <m:t>1</m:t>
+                                      </m:r>
+                                    </m:sub>
+                                  </m:sSub>
+                                </m:sup>
+                                <m:e>
+                                  <m:r>
+                                    <a:rPr lang="es-ES" sz="1600" i="1"/>
+                                    <m:t>𝑓</m:t>
+                                  </m:r>
+                                  <m:d>
+                                    <m:dPr>
+                                      <m:ctrlPr>
+                                        <a:rPr lang="ru-RU" sz="1600" i="1"/>
+                                      </m:ctrlPr>
+                                    </m:dPr>
+                                    <m:e>
+                                      <m:r>
+                                        <a:rPr lang="es-ES" sz="1600" i="1"/>
+                                        <m:t>𝑡</m:t>
+                                      </m:r>
+                                    </m:e>
+                                  </m:d>
+                                  <m:r>
+                                    <a:rPr lang="es-ES" sz="1600" i="1"/>
+                                    <m:t>.</m:t>
+                                  </m:r>
+                                  <m:r>
+                                    <m:rPr>
+                                      <m:sty m:val="p"/>
+                                    </m:rPr>
+                                    <a:rPr lang="es-ES" sz="1600"/>
+                                    <m:t>sin</m:t>
+                                  </m:r>
+                                  <m:r>
+                                    <a:rPr lang="es-ES" sz="1600" i="1"/>
+                                    <m:t>(</m:t>
+                                  </m:r>
+                                  <m:r>
+                                    <a:rPr lang="es-ES" sz="1600" i="1"/>
+                                    <m:t>𝜔</m:t>
+                                  </m:r>
+                                  <m:r>
+                                    <a:rPr lang="es-ES" sz="1600" i="1"/>
+                                    <m:t>𝑡</m:t>
+                                  </m:r>
+                                  <m:r>
+                                    <a:rPr lang="es-ES" sz="1600" i="1"/>
+                                    <m:t>)</m:t>
+                                  </m:r>
+                                  <m:r>
+                                    <a:rPr lang="es-ES" sz="1600" i="1"/>
+                                    <m:t>𝑑𝑡</m:t>
+                                  </m:r>
+                                </m:e>
+                              </m:nary>
+                            </m:e>
+                          </m:d>
+                        </m:e>
+                        <m:sup>
+                          <m:r>
+                            <a:rPr lang="ru-RU" sz="1600" i="1"/>
+                            <m:t>2</m:t>
+                          </m:r>
+                        </m:sup>
+                      </m:sSup>
+                    </m:oMath>
+                  </m:oMathPara>
+                </a14:m>
+                <a:endParaRPr lang="ru-RU" sz="1600" dirty="0"/>
+              </a:p>
+              <a:p>
+                <a:endParaRPr lang="ru-RU" sz="1600" dirty="0"/>
+              </a:p>
+            </p:txBody>
+          </p:sp>
+        </mc:Choice>
+        <mc:Fallback>
+          <p:sp>
+            <p:nvSpPr>
+              <p:cNvPr id="22" name="TextBox 21"/>
+              <p:cNvSpPr txBox="1">
+                <a:spLocks noRot="1" noChangeAspect="1" noMove="1" noResize="1" noEditPoints="1" noAdjustHandles="1" noChangeArrowheads="1" noChangeShapeType="1" noTextEdit="1"/>
+              </p:cNvSpPr>
+              <p:nvPr/>
+            </p:nvSpPr>
+            <p:spPr>
+              <a:xfrm>
+                <a:off x="-205430" y="4515420"/>
+                <a:ext cx="9193286" cy="1009122"/>
+              </a:xfrm>
+              <a:prstGeom prst="rect">
+                <a:avLst/>
+              </a:prstGeom>
+              <a:blipFill rotWithShape="1">
+                <a:blip r:embed="rId13"/>
+                <a:stretch>
+                  <a:fillRect l="-332" b="-3636"/>
+                </a:stretch>
+              </a:blipFill>
+            </p:spPr>
+            <p:txBody>
+              <a:bodyPr/>
+              <a:lstStyle/>
+              <a:p>
+                <a:r>
+                  <a:rPr lang="ru-RU">
+                    <a:noFill/>
+                  </a:rPr>
+                  <a:t> </a:t>
+                </a:r>
+              </a:p>
+            </p:txBody>
+          </p:sp>
+        </mc:Fallback>
+      </mc:AlternateContent>
+      <p:sp>
+        <p:nvSpPr>
+          <p:cNvPr id="23" name="TextBox 22"/>
+          <p:cNvSpPr txBox="1"/>
+          <p:nvPr/>
+        </p:nvSpPr>
+        <p:spPr>
+          <a:xfrm>
+            <a:off x="149200" y="796443"/>
+            <a:ext cx="1925592" cy="400110"/>
+          </a:xfrm>
+          <a:prstGeom prst="rect">
+            <a:avLst/>
+          </a:prstGeom>
+          <a:noFill/>
+        </p:spPr>
+        <p:txBody>
+          <a:bodyPr wrap="none" rtlCol="0">
+            <a:spAutoFit/>
+          </a:bodyPr>
+          <a:lstStyle/>
+          <a:p>
+            <a:r>
+              <a:rPr lang="es-ES" sz="2000" b="1" dirty="0" smtClean="0"/>
+              <a:t>Serie de Fourier </a:t>
+            </a:r>
+            <a:endParaRPr lang="ru-RU" sz="2000" b="1" dirty="0"/>
+          </a:p>
+        </p:txBody>
+      </p:sp>
+      <p:sp>
+        <p:nvSpPr>
+          <p:cNvPr id="24" name="TextBox 23"/>
+          <p:cNvSpPr txBox="1"/>
+          <p:nvPr/>
+        </p:nvSpPr>
+        <p:spPr>
+          <a:xfrm>
+            <a:off x="90337" y="3573016"/>
+            <a:ext cx="1984454" cy="369332"/>
+          </a:xfrm>
+          <a:prstGeom prst="rect">
+            <a:avLst/>
+          </a:prstGeom>
+          <a:noFill/>
+        </p:spPr>
+        <p:txBody>
+          <a:bodyPr wrap="none" rtlCol="0">
+            <a:spAutoFit/>
+          </a:bodyPr>
+          <a:lstStyle/>
+          <a:p>
+            <a:r>
+              <a:rPr lang="es-ES" b="1" dirty="0" smtClean="0"/>
+              <a:t>Potencia espectral </a:t>
+            </a:r>
+            <a:endParaRPr lang="ru-RU" b="1" dirty="0"/>
+          </a:p>
+        </p:txBody>
+      </p:sp>
+      <mc:AlternateContent xmlns:mc="http://schemas.openxmlformats.org/markup-compatibility/2006">
+        <mc:Choice xmlns:a14="http://schemas.microsoft.com/office/drawing/2010/main" Requires="a14">
+          <p:sp>
+            <p:nvSpPr>
+              <p:cNvPr id="25" name="TextBox 24"/>
+              <p:cNvSpPr txBox="1"/>
+              <p:nvPr/>
+            </p:nvSpPr>
+            <p:spPr>
+              <a:xfrm>
+                <a:off x="104718" y="4146088"/>
+                <a:ext cx="5955669" cy="369332"/>
+              </a:xfrm>
+              <a:prstGeom prst="rect">
+                <a:avLst/>
+              </a:prstGeom>
+              <a:noFill/>
+            </p:spPr>
+            <p:txBody>
+              <a:bodyPr wrap="none" rtlCol="0">
+                <a:spAutoFit/>
+              </a:bodyPr>
+              <a:lstStyle/>
+              <a:p>
+                <a:r>
+                  <a:rPr lang="es-ES" dirty="0" smtClean="0"/>
+                  <a:t>Si f(t) es una función definida en el intervalo [</a:t>
+                </a:r>
+                <a14:m>
+                  <m:oMath xmlns:m="http://schemas.openxmlformats.org/officeDocument/2006/math">
+                    <m:sSub>
+                      <m:sSubPr>
+                        <m:ctrlPr>
+                          <a:rPr lang="es-ES" b="0" i="1" smtClean="0">
+                            <a:latin typeface="Cambria Math"/>
+                          </a:rPr>
+                        </m:ctrlPr>
+                      </m:sSubPr>
+                      <m:e>
+                        <m:r>
+                          <a:rPr lang="es-ES" b="0" i="1" smtClean="0">
+                            <a:latin typeface="Cambria Math"/>
+                          </a:rPr>
+                          <m:t>𝑡</m:t>
+                        </m:r>
+                      </m:e>
+                      <m:sub>
+                        <m:r>
+                          <a:rPr lang="es-ES" b="0" i="1" smtClean="0">
+                            <a:latin typeface="Cambria Math"/>
+                          </a:rPr>
+                          <m:t>0</m:t>
+                        </m:r>
+                      </m:sub>
+                    </m:sSub>
+                    <m:r>
+                      <a:rPr lang="es-ES" b="0" i="1" smtClean="0">
+                        <a:latin typeface="Cambria Math"/>
+                      </a:rPr>
+                      <m:t>, </m:t>
+                    </m:r>
+                    <m:sSub>
+                      <m:sSubPr>
+                        <m:ctrlPr>
+                          <a:rPr lang="es-ES" b="0" i="1" smtClean="0">
+                            <a:latin typeface="Cambria Math"/>
+                          </a:rPr>
+                        </m:ctrlPr>
+                      </m:sSubPr>
+                      <m:e>
+                        <m:r>
+                          <a:rPr lang="es-ES" b="0" i="1" smtClean="0">
+                            <a:latin typeface="Cambria Math"/>
+                          </a:rPr>
+                          <m:t>𝑡</m:t>
+                        </m:r>
+                      </m:e>
+                      <m:sub>
+                        <m:r>
+                          <a:rPr lang="es-ES" b="0" i="1" smtClean="0">
+                            <a:latin typeface="Cambria Math"/>
+                          </a:rPr>
+                          <m:t>1</m:t>
+                        </m:r>
+                      </m:sub>
+                    </m:sSub>
+                  </m:oMath>
+                </a14:m>
+                <a:r>
+                  <a:rPr lang="es-ES" dirty="0" smtClean="0"/>
+                  <a:t>], se define </a:t>
+                </a:r>
+                <a:endParaRPr lang="ru-RU" dirty="0"/>
+              </a:p>
+            </p:txBody>
+          </p:sp>
+        </mc:Choice>
+        <mc:Fallback>
+          <p:sp>
+            <p:nvSpPr>
+              <p:cNvPr id="25" name="TextBox 24"/>
+              <p:cNvSpPr txBox="1">
+                <a:spLocks noRot="1" noChangeAspect="1" noMove="1" noResize="1" noEditPoints="1" noAdjustHandles="1" noChangeArrowheads="1" noChangeShapeType="1" noTextEdit="1"/>
+              </p:cNvSpPr>
+              <p:nvPr/>
+            </p:nvSpPr>
+            <p:spPr>
+              <a:xfrm>
+                <a:off x="104718" y="4146088"/>
+                <a:ext cx="5955669" cy="369332"/>
+              </a:xfrm>
+              <a:prstGeom prst="rect">
+                <a:avLst/>
+              </a:prstGeom>
+              <a:blipFill rotWithShape="1">
+                <a:blip r:embed="rId14"/>
+                <a:stretch>
+                  <a:fillRect l="-819" t="-8197" r="-1740" b="-24590"/>
+                </a:stretch>
+              </a:blipFill>
+            </p:spPr>
+            <p:txBody>
+              <a:bodyPr/>
+              <a:lstStyle/>
+              <a:p>
+                <a:r>
+                  <a:rPr lang="ru-RU">
+                    <a:noFill/>
+                  </a:rPr>
+                  <a:t> </a:t>
+                </a:r>
+              </a:p>
+            </p:txBody>
+          </p:sp>
+        </mc:Fallback>
+      </mc:AlternateContent>
+      <mc:AlternateContent xmlns:mc="http://schemas.openxmlformats.org/markup-compatibility/2006">
+        <mc:Choice xmlns:a14="http://schemas.microsoft.com/office/drawing/2010/main" Requires="a14">
+          <p:sp>
+            <p:nvSpPr>
+              <p:cNvPr id="26" name="TextBox 25"/>
+              <p:cNvSpPr txBox="1"/>
+              <p:nvPr/>
+            </p:nvSpPr>
+            <p:spPr>
+              <a:xfrm>
+                <a:off x="90337" y="5668407"/>
+                <a:ext cx="3603186" cy="923330"/>
+              </a:xfrm>
+              <a:prstGeom prst="rect">
+                <a:avLst/>
+              </a:prstGeom>
+              <a:noFill/>
+            </p:spPr>
+            <p:txBody>
+              <a:bodyPr wrap="square" rtlCol="0">
+                <a:spAutoFit/>
+              </a:bodyPr>
+              <a:lstStyle/>
+              <a:p>
+                <a:r>
+                  <a:rPr lang="es-ES" dirty="0" smtClean="0"/>
+                  <a:t>Para el caso particular de una f(t) de período </a:t>
+                </a:r>
+                <a:r>
+                  <a:rPr lang="es-ES" dirty="0"/>
+                  <a:t>2</a:t>
+                </a:r>
+                <a14:m>
+                  <m:oMath xmlns:m="http://schemas.openxmlformats.org/officeDocument/2006/math">
+                    <m:r>
+                      <a:rPr lang="ru-RU" i="1">
+                        <a:latin typeface="Cambria Math"/>
+                      </a:rPr>
+                      <m:t>𝜏</m:t>
+                    </m:r>
+                  </m:oMath>
+                </a14:m>
+                <a:r>
+                  <a:rPr lang="es-ES" dirty="0" smtClean="0"/>
+                  <a:t> </a:t>
+                </a:r>
+                <a14:m>
+                  <m:oMath xmlns:m="http://schemas.openxmlformats.org/officeDocument/2006/math">
+                    <m:r>
+                      <m:rPr>
+                        <m:sty m:val="p"/>
+                      </m:rPr>
+                      <a:rPr lang="es-ES" b="0" i="0" smtClean="0">
+                        <a:latin typeface="Cambria Math"/>
+                      </a:rPr>
+                      <m:t>tal</m:t>
+                    </m:r>
+                    <m:r>
+                      <a:rPr lang="es-ES" b="0" i="0" smtClean="0">
+                        <a:latin typeface="Cambria Math"/>
+                      </a:rPr>
+                      <m:t> </m:t>
+                    </m:r>
+                    <m:r>
+                      <m:rPr>
+                        <m:sty m:val="p"/>
+                      </m:rPr>
+                      <a:rPr lang="es-ES" b="0" i="0" smtClean="0">
+                        <a:latin typeface="Cambria Math"/>
+                      </a:rPr>
+                      <m:t>que</m:t>
+                    </m:r>
+                    <m:r>
+                      <a:rPr lang="es-ES" b="0" i="0" smtClean="0">
+                        <a:latin typeface="Cambria Math"/>
+                      </a:rPr>
+                      <m:t> </m:t>
+                    </m:r>
+                    <m:r>
+                      <a:rPr lang="ru-RU" i="1"/>
+                      <m:t>2</m:t>
+                    </m:r>
+                    <m:r>
+                      <a:rPr lang="ru-RU" i="1"/>
+                      <m:t>𝑘</m:t>
+                    </m:r>
+                    <m:r>
+                      <a:rPr lang="ru-RU" i="1"/>
+                      <m:t>𝜏</m:t>
+                    </m:r>
+                    <m:r>
+                      <a:rPr lang="ru-RU" i="1"/>
+                      <m:t>=</m:t>
+                    </m:r>
+                    <m:sSub>
+                      <m:sSubPr>
+                        <m:ctrlPr>
+                          <a:rPr lang="ru-RU" i="1"/>
+                        </m:ctrlPr>
+                      </m:sSubPr>
+                      <m:e>
+                        <m:r>
+                          <a:rPr lang="ru-RU" i="1"/>
+                          <m:t>𝑡</m:t>
+                        </m:r>
+                      </m:e>
+                      <m:sub>
+                        <m:r>
+                          <a:rPr lang="ru-RU" i="1"/>
+                          <m:t>1</m:t>
+                        </m:r>
+                      </m:sub>
+                    </m:sSub>
+                    <m:r>
+                      <a:rPr lang="ru-RU" i="1"/>
+                      <m:t>−</m:t>
+                    </m:r>
+                    <m:sSub>
+                      <m:sSubPr>
+                        <m:ctrlPr>
+                          <a:rPr lang="ru-RU" i="1"/>
+                        </m:ctrlPr>
+                      </m:sSubPr>
+                      <m:e>
+                        <m:r>
+                          <a:rPr lang="ru-RU" i="1"/>
+                          <m:t>𝑡</m:t>
+                        </m:r>
+                      </m:e>
+                      <m:sub>
+                        <m:r>
+                          <a:rPr lang="ru-RU" i="1"/>
+                          <m:t>0</m:t>
+                        </m:r>
+                      </m:sub>
+                    </m:sSub>
+                  </m:oMath>
+                </a14:m>
+                <a:endParaRPr lang="ru-RU" dirty="0"/>
+              </a:p>
+              <a:p>
+                <a:endParaRPr lang="ru-RU" dirty="0"/>
+              </a:p>
+            </p:txBody>
+          </p:sp>
+        </mc:Choice>
+        <mc:Fallback>
+          <p:sp>
+            <p:nvSpPr>
+              <p:cNvPr id="26" name="TextBox 25"/>
+              <p:cNvSpPr txBox="1">
+                <a:spLocks noRot="1" noChangeAspect="1" noMove="1" noResize="1" noEditPoints="1" noAdjustHandles="1" noChangeArrowheads="1" noChangeShapeType="1" noTextEdit="1"/>
+              </p:cNvSpPr>
+              <p:nvPr/>
+            </p:nvSpPr>
+            <p:spPr>
+              <a:xfrm>
+                <a:off x="90337" y="5668407"/>
+                <a:ext cx="3603186" cy="923330"/>
+              </a:xfrm>
+              <a:prstGeom prst="rect">
+                <a:avLst/>
+              </a:prstGeom>
+              <a:blipFill rotWithShape="1">
+                <a:blip r:embed="rId15"/>
+                <a:stretch>
+                  <a:fillRect l="-1523" t="-3311" r="-1015" b="-9934"/>
+                </a:stretch>
+              </a:blipFill>
+            </p:spPr>
+            <p:txBody>
+              <a:bodyPr/>
+              <a:lstStyle/>
+              <a:p>
+                <a:r>
+                  <a:rPr lang="ru-RU">
+                    <a:noFill/>
+                  </a:rPr>
+                  <a:t> </a:t>
+                </a:r>
+              </a:p>
+            </p:txBody>
+          </p:sp>
+        </mc:Fallback>
+      </mc:AlternateContent>
+      <p:cxnSp>
+        <p:nvCxnSpPr>
+          <p:cNvPr id="28" name="Straight Arrow Connector 27"/>
+          <p:cNvCxnSpPr/>
+          <p:nvPr/>
+        </p:nvCxnSpPr>
+        <p:spPr>
+          <a:xfrm flipV="1">
+            <a:off x="3877795" y="6100454"/>
+            <a:ext cx="1054245" cy="2"/>
+          </a:xfrm>
+          <a:prstGeom prst="straightConnector1">
+            <a:avLst/>
+          </a:prstGeom>
+          <a:ln>
+            <a:tailEnd type="arrow"/>
+          </a:ln>
+        </p:spPr>
+        <p:style>
+          <a:lnRef idx="1">
+            <a:schemeClr val="dk1"/>
+          </a:lnRef>
+          <a:fillRef idx="0">
+            <a:schemeClr val="dk1"/>
+          </a:fillRef>
+          <a:effectRef idx="0">
+            <a:schemeClr val="dk1"/>
+          </a:effectRef>
+          <a:fontRef idx="minor">
+            <a:schemeClr val="tx1"/>
+          </a:fontRef>
+        </p:style>
+      </p:cxnSp>
+      <mc:AlternateContent xmlns:mc="http://schemas.openxmlformats.org/markup-compatibility/2006">
+        <mc:Choice xmlns:a14="http://schemas.microsoft.com/office/drawing/2010/main" Requires="a14">
+          <p:sp>
+            <p:nvSpPr>
+              <p:cNvPr id="29" name="Rectangle 28"/>
+              <p:cNvSpPr/>
+              <p:nvPr/>
+            </p:nvSpPr>
+            <p:spPr>
+              <a:xfrm>
+                <a:off x="5202574" y="5818037"/>
+                <a:ext cx="1497781" cy="564835"/>
+              </a:xfrm>
+              <a:prstGeom prst="rect">
+                <a:avLst/>
+              </a:prstGeom>
+            </p:spPr>
+            <p:txBody>
+              <a:bodyPr wrap="none">
+                <a:spAutoFit/>
+              </a:bodyPr>
+              <a:lstStyle/>
+              <a:p>
+                <a14:m>
+                  <m:oMathPara xmlns:m="http://schemas.openxmlformats.org/officeDocument/2006/math">
+                    <m:oMathParaPr>
+                      <m:jc m:val="centerGroup"/>
+                    </m:oMathParaPr>
+                    <m:oMath xmlns:m="http://schemas.openxmlformats.org/officeDocument/2006/math">
+                      <m:r>
+                        <a:rPr lang="es-ES" i="1"/>
+                        <m:t>𝑃</m:t>
+                      </m:r>
+                      <m:d>
+                        <m:dPr>
+                          <m:ctrlPr>
+                            <a:rPr lang="ru-RU" i="1"/>
+                          </m:ctrlPr>
+                        </m:dPr>
+                        <m:e>
+                          <m:f>
+                            <m:fPr>
+                              <m:ctrlPr>
+                                <a:rPr lang="ru-RU" i="1"/>
+                              </m:ctrlPr>
+                            </m:fPr>
+                            <m:num>
+                              <m:r>
+                                <a:rPr lang="es-ES" i="1"/>
+                                <m:t>𝜋</m:t>
+                              </m:r>
+                            </m:num>
+                            <m:den>
+                              <m:r>
+                                <a:rPr lang="es-ES" i="1"/>
+                                <m:t>𝜏</m:t>
+                              </m:r>
+                            </m:den>
+                          </m:f>
+                          <m:r>
+                            <a:rPr lang="es-ES" i="1"/>
+                            <m:t>𝑛</m:t>
+                          </m:r>
+                        </m:e>
+                      </m:d>
+                      <m:r>
+                        <a:rPr lang="es-ES" i="1"/>
+                        <m:t>=</m:t>
+                      </m:r>
+                      <m:sSubSup>
+                        <m:sSubSupPr>
+                          <m:ctrlPr>
+                            <a:rPr lang="ru-RU" i="1"/>
+                          </m:ctrlPr>
+                        </m:sSubSupPr>
+                        <m:e>
+                          <m:r>
+                            <a:rPr lang="es-ES" i="1"/>
+                            <m:t>𝛼</m:t>
+                          </m:r>
+                        </m:e>
+                        <m:sub>
+                          <m:r>
+                            <a:rPr lang="es-ES" i="1"/>
+                            <m:t>𝑛</m:t>
+                          </m:r>
+                        </m:sub>
+                        <m:sup>
+                          <m:r>
+                            <a:rPr lang="es-ES" i="1"/>
+                            <m:t>2</m:t>
+                          </m:r>
+                        </m:sup>
+                      </m:sSubSup>
+                    </m:oMath>
+                  </m:oMathPara>
+                </a14:m>
+                <a:endParaRPr lang="ru-RU" dirty="0"/>
+              </a:p>
+            </p:txBody>
+          </p:sp>
+        </mc:Choice>
+        <mc:Fallback>
+          <p:sp>
+            <p:nvSpPr>
+              <p:cNvPr id="29" name="Rectangle 28"/>
+              <p:cNvSpPr>
+                <a:spLocks noRot="1" noChangeAspect="1" noMove="1" noResize="1" noEditPoints="1" noAdjustHandles="1" noChangeArrowheads="1" noChangeShapeType="1" noTextEdit="1"/>
+              </p:cNvSpPr>
+              <p:nvPr/>
+            </p:nvSpPr>
+            <p:spPr>
+              <a:xfrm>
+                <a:off x="5202574" y="5818037"/>
+                <a:ext cx="1497781" cy="564835"/>
+              </a:xfrm>
+              <a:prstGeom prst="rect">
+                <a:avLst/>
+              </a:prstGeom>
+              <a:blipFill rotWithShape="1">
+                <a:blip r:embed="rId16"/>
+                <a:stretch>
+                  <a:fillRect r="-4878"/>
+                </a:stretch>
+              </a:blipFill>
+            </p:spPr>
+            <p:txBody>
+              <a:bodyPr/>
+              <a:lstStyle/>
+              <a:p>
+                <a:r>
+                  <a:rPr lang="ru-RU">
+                    <a:noFill/>
+                  </a:rPr>
+                  <a:t> </a:t>
+                </a:r>
+              </a:p>
+            </p:txBody>
+          </p:sp>
+        </mc:Fallback>
+      </mc:AlternateContent>
+    </p:spTree>
+    <p:extLst>
+      <p:ext uri="{BB962C8B-B14F-4D97-AF65-F5344CB8AC3E}">
+        <p14:creationId xmlns:p14="http://schemas.microsoft.com/office/powerpoint/2010/main" val="2822417426"/>
+      </p:ext>
+    </p:extLst>
+  </p:cSld>
+  <p:clrMapOvr>
+    <a:masterClrMapping/>
+  </p:clrMapOvr>
+  <p:timing>
+    <p:tnLst>
+      <p:par>
+        <p:cTn id="1" dur="indefinite" restart="never" nodeType="tmRoot"/>
+      </p:par>
+    </p:tnLst>
+  </p:timing>
+</p:sld>
+</file>
+
+<file path=ppt/slides/slide3.xml><?xml version="1.0" encoding="utf-8"?>
+<p:sld xmlns:a="http://schemas.openxmlformats.org/drawingml/2006/main" xmlns:r="http://schemas.openxmlformats.org/officeDocument/2006/relationships" xmlns:p="http://schemas.openxmlformats.org/presentationml/2006/main">
+  <p:cSld>
+    <p:spTree>
+      <p:nvGrpSpPr>
+        <p:cNvPr id="1" name=""/>
+        <p:cNvGrpSpPr/>
+        <p:nvPr/>
+      </p:nvGrpSpPr>
+      <p:grpSpPr>
+        <a:xfrm>
+          <a:off x="0" y="0"/>
+          <a:ext cx="0" cy="0"/>
+          <a:chOff x="0" y="0"/>
+          <a:chExt cx="0" cy="0"/>
+        </a:xfrm>
+      </p:grpSpPr>
+      <p:grpSp>
+        <p:nvGrpSpPr>
+          <p:cNvPr id="2" name="18 Grupo"/>
+          <p:cNvGrpSpPr/>
+          <p:nvPr/>
+        </p:nvGrpSpPr>
+        <p:grpSpPr>
+          <a:xfrm>
+            <a:off x="683568" y="332656"/>
+            <a:ext cx="3036601" cy="2341115"/>
+            <a:chOff x="508205" y="4143808"/>
+            <a:chExt cx="3036601" cy="2341115"/>
+          </a:xfrm>
+        </p:grpSpPr>
+        <mc:AlternateContent xmlns:mc="http://schemas.openxmlformats.org/markup-compatibility/2006">
+          <mc:Choice xmlns:a14="http://schemas.microsoft.com/office/drawing/2010/main" Requires="a14">
+            <p:sp>
+              <p:nvSpPr>
+                <p:cNvPr id="3" name="12 CuadroTexto"/>
+                <p:cNvSpPr txBox="1"/>
+                <p:nvPr/>
+              </p:nvSpPr>
+              <p:spPr>
+                <a:xfrm>
+                  <a:off x="508205" y="4779976"/>
+                  <a:ext cx="3036601" cy="689356"/>
+                </a:xfrm>
+                <a:prstGeom prst="rect">
+                  <a:avLst/>
+                </a:prstGeom>
+                <a:noFill/>
+              </p:spPr>
+              <p:txBody>
+                <a:bodyPr wrap="none" rtlCol="0">
+                  <a:spAutoFit/>
+                </a:bodyPr>
+                <a:lstStyle/>
+                <a:p>
+                  <a:pPr/>
+                  <a14:m>
+                    <m:oMathPara xmlns:m="http://schemas.openxmlformats.org/officeDocument/2006/math">
+                      <m:oMathParaPr>
+                        <m:jc m:val="centerGroup"/>
+                      </m:oMathParaPr>
+                      <m:oMath xmlns:m="http://schemas.openxmlformats.org/officeDocument/2006/math">
+                        <m:r>
+                          <a:rPr lang="es-ES" sz="2000" b="0" i="1" smtClean="0">
+                            <a:latin typeface="Cambria Math"/>
+                          </a:rPr>
+                          <m:t>𝐶</m:t>
+                        </m:r>
+                        <m:r>
+                          <a:rPr lang="es-ES" sz="2000" b="0" i="1" smtClean="0">
+                            <a:latin typeface="Cambria Math"/>
+                          </a:rPr>
+                          <m:t>(</m:t>
+                        </m:r>
+                        <m:r>
+                          <a:rPr lang="es-ES" sz="2000" b="0" i="1" smtClean="0">
+                            <a:latin typeface="Cambria Math"/>
+                          </a:rPr>
+                          <m:t>𝑡</m:t>
+                        </m:r>
+                        <m:r>
+                          <a:rPr lang="es-ES" sz="2000" b="0" i="1" smtClean="0">
+                            <a:latin typeface="Cambria Math"/>
+                          </a:rPr>
+                          <m:t>)=</m:t>
+                        </m:r>
+                        <m:d>
+                          <m:dPr>
+                            <m:begChr m:val="{"/>
+                            <m:endChr m:val=""/>
+                            <m:ctrlPr>
+                              <a:rPr lang="es-ES" sz="2000" i="1" smtClean="0">
+                                <a:latin typeface="Cambria Math"/>
+                              </a:rPr>
+                            </m:ctrlPr>
+                          </m:dPr>
+                          <m:e>
+                            <m:r>
+                              <a:rPr lang="es-ES" sz="2000" b="0" i="1" smtClean="0">
+                                <a:latin typeface="Cambria Math"/>
+                              </a:rPr>
+                              <m:t> </m:t>
+                            </m:r>
+                            <m:eqArr>
+                              <m:eqArrPr>
+                                <m:ctrlPr>
+                                  <a:rPr lang="es-ES" sz="2000" i="1" smtClean="0">
+                                    <a:latin typeface="Cambria Math"/>
+                                  </a:rPr>
+                                </m:ctrlPr>
+                              </m:eqArrPr>
+                              <m:e>
+                                <m:r>
+                                  <a:rPr lang="es-ES" sz="2000" b="0" i="1" smtClean="0">
+                                    <a:latin typeface="Cambria Math"/>
+                                  </a:rPr>
+                                  <m:t> </m:t>
+                                </m:r>
+                                <m:sSub>
+                                  <m:sSubPr>
+                                    <m:ctrlPr>
+                                      <a:rPr lang="es-ES" sz="2000" i="1" smtClean="0">
+                                        <a:latin typeface="Cambria Math"/>
+                                      </a:rPr>
+                                    </m:ctrlPr>
+                                  </m:sSubPr>
+                                  <m:e>
+                                    <m:r>
+                                      <a:rPr lang="es-ES" sz="2000" b="0" i="1" smtClean="0">
+                                        <a:latin typeface="Cambria Math"/>
+                                      </a:rPr>
+                                      <m:t>−</m:t>
+                                    </m:r>
+                                    <m:r>
+                                      <a:rPr lang="es-ES" sz="2000" b="0" i="1" smtClean="0">
+                                        <a:latin typeface="Cambria Math"/>
+                                      </a:rPr>
+                                      <m:t>𝑉</m:t>
+                                    </m:r>
+                                  </m:e>
+                                  <m:sub>
+                                    <m:r>
+                                      <a:rPr lang="es-ES" sz="2000" b="0" i="1" smtClean="0">
+                                        <a:latin typeface="Cambria Math"/>
+                                      </a:rPr>
+                                      <m:t>0</m:t>
+                                    </m:r>
+                                  </m:sub>
+                                </m:sSub>
+                                <m:r>
+                                  <a:rPr lang="es-ES" sz="2000" b="0" i="1" smtClean="0">
+                                    <a:latin typeface="Cambria Math"/>
+                                  </a:rPr>
+                                  <m:t>   </m:t>
+                                </m:r>
+                                <m:r>
+                                  <a:rPr lang="es-ES" sz="2000" b="0" i="1" smtClean="0">
+                                    <a:latin typeface="Cambria Math"/>
+                                  </a:rPr>
+                                  <m:t>𝑡</m:t>
+                                </m:r>
+                                <m:r>
+                                  <a:rPr lang="es-ES" sz="2000" b="0" i="1" smtClean="0">
+                                    <a:latin typeface="Cambria Math"/>
+                                    <a:ea typeface="Cambria Math"/>
+                                  </a:rPr>
+                                  <m:t>∈[−</m:t>
+                                </m:r>
+                                <m:r>
+                                  <a:rPr lang="es-ES" sz="2000" b="0" i="1" smtClean="0">
+                                    <a:latin typeface="Cambria Math"/>
+                                    <a:ea typeface="Cambria Math"/>
+                                  </a:rPr>
+                                  <m:t>𝜏</m:t>
+                                </m:r>
+                                <m:r>
+                                  <a:rPr lang="es-ES" sz="2000" b="0" i="1" smtClean="0">
+                                    <a:latin typeface="Cambria Math"/>
+                                    <a:ea typeface="Cambria Math"/>
+                                  </a:rPr>
+                                  <m:t>,0)</m:t>
+                                </m:r>
+                              </m:e>
+                              <m:e>
+                                <m:sSub>
+                                  <m:sSubPr>
+                                    <m:ctrlPr>
+                                      <a:rPr lang="es-ES" sz="2000" i="1" smtClean="0">
+                                        <a:latin typeface="Cambria Math"/>
+                                      </a:rPr>
+                                    </m:ctrlPr>
+                                  </m:sSubPr>
+                                  <m:e>
+                                    <m:r>
+                                      <a:rPr lang="es-ES" sz="2000" b="0" i="1" smtClean="0">
+                                        <a:latin typeface="Cambria Math"/>
+                                      </a:rPr>
+                                      <m:t>𝑉</m:t>
+                                    </m:r>
+                                  </m:e>
+                                  <m:sub>
+                                    <m:r>
+                                      <a:rPr lang="es-ES" sz="2000" b="0" i="1" smtClean="0">
+                                        <a:latin typeface="Cambria Math"/>
+                                      </a:rPr>
+                                      <m:t>0</m:t>
+                                    </m:r>
+                                  </m:sub>
+                                </m:sSub>
+                                <m:r>
+                                  <a:rPr lang="es-ES" sz="2000" b="0" i="1" smtClean="0">
+                                    <a:latin typeface="Cambria Math"/>
+                                  </a:rPr>
+                                  <m:t>   </m:t>
+                                </m:r>
+                                <m:r>
+                                  <a:rPr lang="es-ES" sz="2000" b="0" i="1" smtClean="0">
+                                    <a:latin typeface="Cambria Math"/>
+                                  </a:rPr>
+                                  <m:t>𝑡</m:t>
+                                </m:r>
+                                <m:r>
+                                  <a:rPr lang="es-ES" sz="2000" b="0" i="1" smtClean="0">
+                                    <a:latin typeface="Cambria Math"/>
+                                    <a:ea typeface="Cambria Math"/>
+                                  </a:rPr>
+                                  <m:t>∈[0,</m:t>
+                                </m:r>
+                                <m:r>
+                                  <a:rPr lang="es-ES" sz="2000" b="0" i="1" smtClean="0">
+                                    <a:latin typeface="Cambria Math"/>
+                                    <a:ea typeface="Cambria Math"/>
+                                  </a:rPr>
+                                  <m:t>𝜏</m:t>
+                                </m:r>
+                                <m:r>
+                                  <a:rPr lang="es-ES" sz="2000" b="0" i="1" smtClean="0">
+                                    <a:latin typeface="Cambria Math"/>
+                                    <a:ea typeface="Cambria Math"/>
+                                  </a:rPr>
+                                  <m:t>)</m:t>
+                                </m:r>
+                              </m:e>
+                            </m:eqArr>
+                          </m:e>
+                        </m:d>
+                      </m:oMath>
+                    </m:oMathPara>
+                  </a14:m>
+                  <a:endParaRPr lang="es-ES" sz="2000" dirty="0"/>
+                </a:p>
+              </p:txBody>
+            </p:sp>
+          </mc:Choice>
+          <mc:Fallback>
+            <p:sp>
+              <p:nvSpPr>
+                <p:cNvPr id="3" name="12 CuadroTexto"/>
+                <p:cNvSpPr txBox="1">
+                  <a:spLocks noRot="1" noChangeAspect="1" noMove="1" noResize="1" noEditPoints="1" noAdjustHandles="1" noChangeArrowheads="1" noChangeShapeType="1" noTextEdit="1"/>
+                </p:cNvSpPr>
+                <p:nvPr/>
+              </p:nvSpPr>
+              <p:spPr>
+                <a:xfrm>
+                  <a:off x="508205" y="4779976"/>
+                  <a:ext cx="3036601" cy="689356"/>
+                </a:xfrm>
+                <a:prstGeom prst="rect">
+                  <a:avLst/>
+                </a:prstGeom>
+                <a:blipFill rotWithShape="1">
+                  <a:blip r:embed="rId2"/>
+                  <a:stretch>
+                    <a:fillRect r="-2811"/>
+                  </a:stretch>
+                </a:blipFill>
+              </p:spPr>
+              <p:txBody>
+                <a:bodyPr/>
+                <a:lstStyle/>
+                <a:p>
+                  <a:r>
+                    <a:rPr lang="ru-RU">
+                      <a:noFill/>
+                    </a:rPr>
+                    <a:t> </a:t>
+                  </a:r>
+                </a:p>
+              </p:txBody>
+            </p:sp>
+          </mc:Fallback>
+        </mc:AlternateContent>
+        <mc:AlternateContent xmlns:mc="http://schemas.openxmlformats.org/markup-compatibility/2006">
+          <mc:Choice xmlns:a14="http://schemas.microsoft.com/office/drawing/2010/main" Requires="a14">
+            <p:sp>
+              <p:nvSpPr>
+                <p:cNvPr id="4" name="13 CuadroTexto"/>
+                <p:cNvSpPr txBox="1"/>
+                <p:nvPr/>
+              </p:nvSpPr>
+              <p:spPr>
+                <a:xfrm>
+                  <a:off x="622563" y="5799992"/>
+                  <a:ext cx="2598275" cy="684931"/>
+                </a:xfrm>
+                <a:prstGeom prst="rect">
+                  <a:avLst/>
+                </a:prstGeom>
+                <a:noFill/>
+              </p:spPr>
+              <p:txBody>
+                <a:bodyPr wrap="none" rtlCol="0">
+                  <a:spAutoFit/>
+                </a:bodyPr>
+                <a:lstStyle/>
+                <a:p>
+                  <a:pPr/>
+                  <a14:m>
+                    <m:oMathPara xmlns:m="http://schemas.openxmlformats.org/officeDocument/2006/math">
+                      <m:oMathParaPr>
+                        <m:jc m:val="centerGroup"/>
+                      </m:oMathParaPr>
+                      <m:oMath xmlns:m="http://schemas.openxmlformats.org/officeDocument/2006/math">
+                        <m:sSub>
+                          <m:sSubPr>
+                            <m:ctrlPr>
+                              <a:rPr lang="es-ES" sz="2000" i="1" smtClean="0">
+                                <a:latin typeface="Cambria Math"/>
+                              </a:rPr>
+                            </m:ctrlPr>
+                          </m:sSubPr>
+                          <m:e>
+                            <m:r>
+                              <a:rPr lang="es-ES" sz="2000" i="1" smtClean="0">
+                                <a:latin typeface="Cambria Math"/>
+                                <a:ea typeface="Cambria Math"/>
+                              </a:rPr>
+                              <m:t>𝛼</m:t>
+                            </m:r>
+                          </m:e>
+                          <m:sub>
+                            <m:r>
+                              <a:rPr lang="es-ES" sz="2000" b="0" i="1" smtClean="0">
+                                <a:latin typeface="Cambria Math"/>
+                              </a:rPr>
+                              <m:t>𝑛</m:t>
+                            </m:r>
+                          </m:sub>
+                        </m:sSub>
+                        <m:r>
+                          <a:rPr lang="es-ES" sz="2000" i="1" smtClean="0">
+                            <a:latin typeface="Cambria Math"/>
+                          </a:rPr>
+                          <m:t>=</m:t>
+                        </m:r>
+                        <m:f>
+                          <m:fPr>
+                            <m:ctrlPr>
+                              <a:rPr lang="es-ES" sz="2000" i="1" smtClean="0">
+                                <a:latin typeface="Cambria Math"/>
+                              </a:rPr>
+                            </m:ctrlPr>
+                          </m:fPr>
+                          <m:num>
+                            <m:r>
+                              <a:rPr lang="es-ES" sz="2000" b="0" i="1" smtClean="0">
+                                <a:latin typeface="Cambria Math"/>
+                              </a:rPr>
+                              <m:t>2</m:t>
+                            </m:r>
+                            <m:sSub>
+                              <m:sSubPr>
+                                <m:ctrlPr>
+                                  <a:rPr lang="es-ES" sz="2000" b="0" i="1" smtClean="0">
+                                    <a:latin typeface="Cambria Math"/>
+                                  </a:rPr>
+                                </m:ctrlPr>
+                              </m:sSubPr>
+                              <m:e>
+                                <m:r>
+                                  <a:rPr lang="es-ES" sz="2000" b="0" i="1" smtClean="0">
+                                    <a:latin typeface="Cambria Math"/>
+                                  </a:rPr>
+                                  <m:t>𝑉</m:t>
+                                </m:r>
+                              </m:e>
+                              <m:sub>
+                                <m:r>
+                                  <a:rPr lang="es-ES" sz="2000" b="0" i="1" smtClean="0">
+                                    <a:latin typeface="Cambria Math"/>
+                                  </a:rPr>
+                                  <m:t>0</m:t>
+                                </m:r>
+                              </m:sub>
+                            </m:sSub>
+                            <m:r>
+                              <a:rPr lang="es-ES" sz="2000" b="0" i="1" smtClean="0">
+                                <a:latin typeface="Cambria Math"/>
+                              </a:rPr>
+                              <m:t>(1−</m:t>
+                            </m:r>
+                            <m:sSup>
+                              <m:sSupPr>
+                                <m:ctrlPr>
+                                  <a:rPr lang="es-ES" sz="2000" b="0" i="1" smtClean="0">
+                                    <a:latin typeface="Cambria Math"/>
+                                  </a:rPr>
+                                </m:ctrlPr>
+                              </m:sSupPr>
+                              <m:e>
+                                <m:r>
+                                  <a:rPr lang="es-ES" sz="2000" b="0" i="1" smtClean="0">
+                                    <a:latin typeface="Cambria Math"/>
+                                  </a:rPr>
+                                  <m:t>(−1)</m:t>
+                                </m:r>
+                              </m:e>
+                              <m:sup>
+                                <m:r>
+                                  <a:rPr lang="es-ES" sz="2000" b="0" i="1" smtClean="0">
+                                    <a:latin typeface="Cambria Math"/>
+                                  </a:rPr>
+                                  <m:t>𝑛</m:t>
+                                </m:r>
+                              </m:sup>
+                            </m:sSup>
+                            <m:r>
+                              <a:rPr lang="es-ES" sz="2000" b="0" i="1" smtClean="0">
+                                <a:latin typeface="Cambria Math"/>
+                              </a:rPr>
+                              <m:t>)</m:t>
+                            </m:r>
+                          </m:num>
+                          <m:den>
+                            <m:r>
+                              <a:rPr lang="es-ES" sz="2000" b="0" i="1" smtClean="0">
+                                <a:latin typeface="Cambria Math"/>
+                              </a:rPr>
+                              <m:t>𝑛</m:t>
+                            </m:r>
+                            <m:r>
+                              <a:rPr lang="es-ES" sz="2000" b="0" i="1" smtClean="0">
+                                <a:latin typeface="Cambria Math"/>
+                                <a:ea typeface="Cambria Math"/>
+                              </a:rPr>
+                              <m:t>𝜋</m:t>
+                            </m:r>
+                          </m:den>
+                        </m:f>
+                      </m:oMath>
+                    </m:oMathPara>
+                  </a14:m>
+                  <a:endParaRPr lang="es-ES" sz="2000" dirty="0"/>
+                </a:p>
+              </p:txBody>
+            </p:sp>
+          </mc:Choice>
+          <mc:Fallback>
+            <p:sp>
+              <p:nvSpPr>
+                <p:cNvPr id="4" name="13 CuadroTexto"/>
+                <p:cNvSpPr txBox="1">
+                  <a:spLocks noRot="1" noChangeAspect="1" noMove="1" noResize="1" noEditPoints="1" noAdjustHandles="1" noChangeArrowheads="1" noChangeShapeType="1" noTextEdit="1"/>
+                </p:cNvSpPr>
+                <p:nvPr/>
+              </p:nvSpPr>
+              <p:spPr>
+                <a:xfrm>
+                  <a:off x="622563" y="5799992"/>
+                  <a:ext cx="2598275" cy="684931"/>
+                </a:xfrm>
+                <a:prstGeom prst="rect">
+                  <a:avLst/>
+                </a:prstGeom>
+                <a:blipFill rotWithShape="1">
+                  <a:blip r:embed="rId3"/>
+                  <a:stretch>
+                    <a:fillRect r="-3286"/>
+                  </a:stretch>
+                </a:blipFill>
+              </p:spPr>
+              <p:txBody>
+                <a:bodyPr/>
+                <a:lstStyle/>
+                <a:p>
+                  <a:r>
+                    <a:rPr lang="ru-RU">
+                      <a:noFill/>
+                    </a:rPr>
+                    <a:t> </a:t>
+                  </a:r>
+                </a:p>
+              </p:txBody>
+            </p:sp>
+          </mc:Fallback>
+        </mc:AlternateContent>
+        <p:sp>
+          <p:nvSpPr>
+            <p:cNvPr id="5" name="4 CuadroTexto"/>
+            <p:cNvSpPr txBox="1"/>
+            <p:nvPr/>
+          </p:nvSpPr>
+          <p:spPr>
+            <a:xfrm>
+              <a:off x="622564" y="4143808"/>
+              <a:ext cx="2646398" cy="461665"/>
+            </a:xfrm>
+            <a:prstGeom prst="rect">
+              <a:avLst/>
+            </a:prstGeom>
+            <a:noFill/>
+          </p:spPr>
+          <p:txBody>
+            <a:bodyPr wrap="square" rtlCol="0">
+              <a:spAutoFit/>
+            </a:bodyPr>
+            <a:lstStyle/>
+            <a:p>
+              <a:r>
+                <a:rPr lang="es-ES" sz="2400" b="1" u="sng" dirty="0" smtClean="0"/>
+                <a:t>Señal cuadrada:</a:t>
+              </a:r>
+              <a:endParaRPr lang="es-ES" sz="2400" b="1" u="sng" dirty="0"/>
+            </a:p>
+          </p:txBody>
+        </p:sp>
+      </p:grpSp>
+      <p:grpSp>
+        <p:nvGrpSpPr>
+          <p:cNvPr id="6" name="19 Grupo"/>
+          <p:cNvGrpSpPr/>
+          <p:nvPr/>
+        </p:nvGrpSpPr>
+        <p:grpSpPr>
+          <a:xfrm>
+            <a:off x="5065406" y="332656"/>
+            <a:ext cx="3180486" cy="2344707"/>
+            <a:chOff x="3440921" y="4513140"/>
+            <a:chExt cx="3180486" cy="2344707"/>
+          </a:xfrm>
+        </p:grpSpPr>
+        <mc:AlternateContent xmlns:mc="http://schemas.openxmlformats.org/markup-compatibility/2006">
+          <mc:Choice xmlns:a14="http://schemas.microsoft.com/office/drawing/2010/main" Requires="a14">
+            <p:sp>
+              <p:nvSpPr>
+                <p:cNvPr id="7" name="14 CuadroTexto"/>
+                <p:cNvSpPr txBox="1"/>
+                <p:nvPr/>
+              </p:nvSpPr>
+              <p:spPr>
+                <a:xfrm>
+                  <a:off x="3810233" y="6118349"/>
+                  <a:ext cx="1937646" cy="739498"/>
+                </a:xfrm>
+                <a:prstGeom prst="rect">
+                  <a:avLst/>
+                </a:prstGeom>
+                <a:noFill/>
+              </p:spPr>
+              <p:txBody>
+                <a:bodyPr wrap="none" rtlCol="0">
+                  <a:spAutoFit/>
+                </a:bodyPr>
+                <a:lstStyle/>
+                <a:p>
+                  <a:pPr/>
+                  <a14:m>
+                    <m:oMathPara xmlns:m="http://schemas.openxmlformats.org/officeDocument/2006/math">
+                      <m:oMathParaPr>
+                        <m:jc m:val="centerGroup"/>
+                      </m:oMathParaPr>
+                      <m:oMath xmlns:m="http://schemas.openxmlformats.org/officeDocument/2006/math">
+                        <m:sSub>
+                          <m:sSubPr>
+                            <m:ctrlPr>
+                              <a:rPr lang="es-ES" sz="2000" i="1" smtClean="0">
+                                <a:latin typeface="Cambria Math"/>
+                              </a:rPr>
+                            </m:ctrlPr>
+                          </m:sSubPr>
+                          <m:e>
+                            <m:r>
+                              <a:rPr lang="es-ES" sz="2000" i="1" smtClean="0">
+                                <a:latin typeface="Cambria Math"/>
+                                <a:ea typeface="Cambria Math"/>
+                              </a:rPr>
+                              <m:t>𝛼</m:t>
+                            </m:r>
+                          </m:e>
+                          <m:sub>
+                            <m:r>
+                              <a:rPr lang="es-ES" sz="2000" b="0" i="1" smtClean="0">
+                                <a:latin typeface="Cambria Math"/>
+                              </a:rPr>
+                              <m:t>𝑛</m:t>
+                            </m:r>
+                          </m:sub>
+                        </m:sSub>
+                        <m:r>
+                          <a:rPr lang="es-ES" sz="2000" i="1" smtClean="0">
+                            <a:latin typeface="Cambria Math"/>
+                          </a:rPr>
+                          <m:t>=</m:t>
+                        </m:r>
+                        <m:f>
+                          <m:fPr>
+                            <m:ctrlPr>
+                              <a:rPr lang="es-ES" sz="2000" i="1" smtClean="0">
+                                <a:latin typeface="Cambria Math"/>
+                              </a:rPr>
+                            </m:ctrlPr>
+                          </m:fPr>
+                          <m:num>
+                            <m:r>
+                              <a:rPr lang="es-ES" sz="2000" b="0" i="1" smtClean="0">
+                                <a:latin typeface="Cambria Math"/>
+                              </a:rPr>
+                              <m:t>4</m:t>
+                            </m:r>
+                            <m:sSub>
+                              <m:sSubPr>
+                                <m:ctrlPr>
+                                  <a:rPr lang="es-ES" sz="2000" b="0" i="1" smtClean="0">
+                                    <a:latin typeface="Cambria Math"/>
+                                  </a:rPr>
+                                </m:ctrlPr>
+                              </m:sSubPr>
+                              <m:e>
+                                <m:r>
+                                  <a:rPr lang="es-ES" sz="2000" b="0" i="1" smtClean="0">
+                                    <a:latin typeface="Cambria Math"/>
+                                  </a:rPr>
+                                  <m:t>𝑉</m:t>
+                                </m:r>
+                              </m:e>
+                              <m:sub>
+                                <m:r>
+                                  <a:rPr lang="es-ES" sz="2000" b="0" i="1" smtClean="0">
+                                    <a:latin typeface="Cambria Math"/>
+                                  </a:rPr>
+                                  <m:t>0</m:t>
+                                </m:r>
+                              </m:sub>
+                            </m:sSub>
+                            <m:sSup>
+                              <m:sSupPr>
+                                <m:ctrlPr>
+                                  <a:rPr lang="es-ES" sz="2000" b="0" i="1" smtClean="0">
+                                    <a:latin typeface="Cambria Math"/>
+                                  </a:rPr>
+                                </m:ctrlPr>
+                              </m:sSupPr>
+                              <m:e>
+                                <m:r>
+                                  <a:rPr lang="es-ES" sz="2000" b="0" i="1" smtClean="0">
+                                    <a:latin typeface="Cambria Math"/>
+                                  </a:rPr>
+                                  <m:t>(−1)</m:t>
+                                </m:r>
+                              </m:e>
+                              <m:sup>
+                                <m:r>
+                                  <a:rPr lang="es-ES" sz="2000" b="0" i="1" smtClean="0">
+                                    <a:latin typeface="Cambria Math"/>
+                                  </a:rPr>
+                                  <m:t>𝑛</m:t>
+                                </m:r>
+                              </m:sup>
+                            </m:sSup>
+                          </m:num>
+                          <m:den>
+                            <m:sSup>
+                              <m:sSupPr>
+                                <m:ctrlPr>
+                                  <a:rPr lang="es-ES" sz="2000" i="1" smtClean="0">
+                                    <a:latin typeface="Cambria Math"/>
+                                  </a:rPr>
+                                </m:ctrlPr>
+                              </m:sSupPr>
+                              <m:e>
+                                <m:r>
+                                  <a:rPr lang="es-ES" sz="2000" b="0" i="1" smtClean="0">
+                                    <a:latin typeface="Cambria Math"/>
+                                  </a:rPr>
+                                  <m:t>(</m:t>
+                                </m:r>
+                                <m:r>
+                                  <a:rPr lang="es-ES" sz="2000" b="0" i="1" smtClean="0">
+                                    <a:latin typeface="Cambria Math"/>
+                                  </a:rPr>
+                                  <m:t>𝑛</m:t>
+                                </m:r>
+                                <m:r>
+                                  <a:rPr lang="es-ES" sz="2000" b="0" i="1" smtClean="0">
+                                    <a:latin typeface="Cambria Math"/>
+                                    <a:ea typeface="Cambria Math"/>
+                                  </a:rPr>
+                                  <m:t>𝜋</m:t>
+                                </m:r>
+                                <m:r>
+                                  <a:rPr lang="es-ES" sz="2000" b="0" i="1" smtClean="0">
+                                    <a:latin typeface="Cambria Math"/>
+                                  </a:rPr>
+                                  <m:t>)</m:t>
+                                </m:r>
+                              </m:e>
+                              <m:sup>
+                                <m:r>
+                                  <a:rPr lang="es-ES" sz="2000" b="0" i="1" smtClean="0">
+                                    <a:latin typeface="Cambria Math"/>
+                                  </a:rPr>
+                                  <m:t>2</m:t>
+                                </m:r>
+                              </m:sup>
+                            </m:sSup>
+                          </m:den>
+                        </m:f>
+                      </m:oMath>
+                    </m:oMathPara>
+                  </a14:m>
+                  <a:endParaRPr lang="es-ES" sz="2000" dirty="0"/>
+                </a:p>
+              </p:txBody>
+            </p:sp>
+          </mc:Choice>
+          <mc:Fallback>
+            <p:sp>
+              <p:nvSpPr>
+                <p:cNvPr id="7" name="14 CuadroTexto"/>
+                <p:cNvSpPr txBox="1">
+                  <a:spLocks noRot="1" noChangeAspect="1" noMove="1" noResize="1" noEditPoints="1" noAdjustHandles="1" noChangeArrowheads="1" noChangeShapeType="1" noTextEdit="1"/>
+                </p:cNvSpPr>
+                <p:nvPr/>
+              </p:nvSpPr>
+              <p:spPr>
+                <a:xfrm>
+                  <a:off x="3810233" y="6118349"/>
+                  <a:ext cx="1937646" cy="739498"/>
+                </a:xfrm>
+                <a:prstGeom prst="rect">
+                  <a:avLst/>
+                </a:prstGeom>
+                <a:blipFill rotWithShape="1">
+                  <a:blip r:embed="rId4"/>
+                  <a:stretch>
+                    <a:fillRect r="-4416"/>
+                  </a:stretch>
+                </a:blipFill>
+              </p:spPr>
+              <p:txBody>
+                <a:bodyPr/>
+                <a:lstStyle/>
+                <a:p>
+                  <a:r>
+                    <a:rPr lang="ru-RU">
+                      <a:noFill/>
+                    </a:rPr>
+                    <a:t> </a:t>
+                  </a:r>
+                </a:p>
+              </p:txBody>
+            </p:sp>
+          </mc:Fallback>
+        </mc:AlternateContent>
+        <mc:AlternateContent xmlns:mc="http://schemas.openxmlformats.org/markup-compatibility/2006">
+          <mc:Choice xmlns:a14="http://schemas.microsoft.com/office/drawing/2010/main" Requires="a14">
+            <p:sp>
+              <p:nvSpPr>
+                <p:cNvPr id="8" name="15 CuadroTexto"/>
+                <p:cNvSpPr txBox="1"/>
+                <p:nvPr/>
+              </p:nvSpPr>
+              <p:spPr>
+                <a:xfrm>
+                  <a:off x="3440921" y="5163535"/>
+                  <a:ext cx="3180486" cy="715517"/>
+                </a:xfrm>
+                <a:prstGeom prst="rect">
+                  <a:avLst/>
+                </a:prstGeom>
+                <a:noFill/>
+              </p:spPr>
+              <p:txBody>
+                <a:bodyPr wrap="none" rtlCol="0">
+                  <a:spAutoFit/>
+                </a:bodyPr>
+                <a:lstStyle/>
+                <a:p>
+                  <a:pPr/>
+                  <a14:m>
+                    <m:oMathPara xmlns:m="http://schemas.openxmlformats.org/officeDocument/2006/math">
+                      <m:oMathParaPr>
+                        <m:jc m:val="centerGroup"/>
+                      </m:oMathParaPr>
+                      <m:oMath xmlns:m="http://schemas.openxmlformats.org/officeDocument/2006/math">
+                        <m:r>
+                          <a:rPr lang="es-ES" sz="2000" b="0" i="1" smtClean="0">
+                            <a:latin typeface="Cambria Math"/>
+                          </a:rPr>
+                          <m:t>𝑃</m:t>
+                        </m:r>
+                        <m:d>
+                          <m:dPr>
+                            <m:ctrlPr>
+                              <a:rPr lang="es-ES" sz="2000" b="0" i="1" smtClean="0">
+                                <a:latin typeface="Cambria Math"/>
+                              </a:rPr>
+                            </m:ctrlPr>
+                          </m:dPr>
+                          <m:e>
+                            <m:r>
+                              <a:rPr lang="es-ES" sz="2000" b="0" i="1" smtClean="0">
+                                <a:latin typeface="Cambria Math"/>
+                              </a:rPr>
+                              <m:t>𝑡</m:t>
+                            </m:r>
+                          </m:e>
+                        </m:d>
+                        <m:r>
+                          <a:rPr lang="es-ES" sz="2000" i="1" smtClean="0">
+                            <a:latin typeface="Cambria Math"/>
+                          </a:rPr>
+                          <m:t>=</m:t>
+                        </m:r>
+                        <m:sSub>
+                          <m:sSubPr>
+                            <m:ctrlPr>
+                              <a:rPr lang="es-ES" sz="2000" i="1" smtClean="0">
+                                <a:latin typeface="Cambria Math"/>
+                              </a:rPr>
+                            </m:ctrlPr>
+                          </m:sSubPr>
+                          <m:e>
+                            <m:r>
+                              <a:rPr lang="es-ES" sz="2000" b="0" i="1" smtClean="0">
+                                <a:latin typeface="Cambria Math"/>
+                              </a:rPr>
+                              <m:t>𝑉</m:t>
+                            </m:r>
+                          </m:e>
+                          <m:sub>
+                            <m:r>
+                              <a:rPr lang="es-ES" sz="2000" b="0" i="1" smtClean="0">
+                                <a:latin typeface="Cambria Math"/>
+                              </a:rPr>
+                              <m:t>0</m:t>
+                            </m:r>
+                          </m:sub>
+                        </m:sSub>
+                        <m:sSup>
+                          <m:sSupPr>
+                            <m:ctrlPr>
+                              <a:rPr lang="es-ES" sz="2000" i="1" smtClean="0">
+                                <a:latin typeface="Cambria Math"/>
+                              </a:rPr>
+                            </m:ctrlPr>
+                          </m:sSupPr>
+                          <m:e>
+                            <m:d>
+                              <m:dPr>
+                                <m:ctrlPr>
+                                  <a:rPr lang="es-ES" sz="2000" i="1" smtClean="0">
+                                    <a:latin typeface="Cambria Math"/>
+                                  </a:rPr>
+                                </m:ctrlPr>
+                              </m:dPr>
+                              <m:e>
+                                <m:f>
+                                  <m:fPr>
+                                    <m:ctrlPr>
+                                      <a:rPr lang="es-ES" sz="2000" i="1" smtClean="0">
+                                        <a:latin typeface="Cambria Math"/>
+                                      </a:rPr>
+                                    </m:ctrlPr>
+                                  </m:fPr>
+                                  <m:num>
+                                    <m:r>
+                                      <a:rPr lang="es-ES" sz="2000" b="0" i="1" smtClean="0">
+                                        <a:latin typeface="Cambria Math"/>
+                                      </a:rPr>
+                                      <m:t>𝑡</m:t>
+                                    </m:r>
+                                  </m:num>
+                                  <m:den>
+                                    <m:r>
+                                      <a:rPr lang="es-ES" sz="2000" i="1" smtClean="0">
+                                        <a:latin typeface="Cambria Math"/>
+                                        <a:ea typeface="Cambria Math"/>
+                                      </a:rPr>
+                                      <m:t>𝜏</m:t>
+                                    </m:r>
+                                  </m:den>
+                                </m:f>
+                              </m:e>
+                            </m:d>
+                          </m:e>
+                          <m:sup>
+                            <m:r>
+                              <a:rPr lang="es-ES" sz="2000" i="1" smtClean="0">
+                                <a:latin typeface="Cambria Math"/>
+                              </a:rPr>
+                              <m:t>2</m:t>
+                            </m:r>
+                          </m:sup>
+                        </m:sSup>
+                        <m:r>
+                          <a:rPr lang="es-ES" sz="2000" b="0" i="1" smtClean="0">
+                            <a:latin typeface="Cambria Math"/>
+                          </a:rPr>
+                          <m:t>   </m:t>
+                        </m:r>
+                        <m:r>
+                          <a:rPr lang="es-ES" sz="2000" b="0" i="1" smtClean="0">
+                            <a:latin typeface="Cambria Math"/>
+                          </a:rPr>
+                          <m:t>𝑡</m:t>
+                        </m:r>
+                        <m:r>
+                          <a:rPr lang="es-ES" sz="2000" b="0" i="1" smtClean="0">
+                            <a:latin typeface="Cambria Math"/>
+                          </a:rPr>
+                          <m:t>∈[−</m:t>
+                        </m:r>
+                        <m:r>
+                          <a:rPr lang="es-ES" sz="2000" b="0" i="1" smtClean="0">
+                            <a:latin typeface="Cambria Math"/>
+                          </a:rPr>
+                          <m:t>𝜏</m:t>
+                        </m:r>
+                        <m:r>
+                          <a:rPr lang="es-ES" sz="2000" b="0" i="1" smtClean="0">
+                            <a:latin typeface="Cambria Math"/>
+                          </a:rPr>
+                          <m:t>, </m:t>
+                        </m:r>
+                        <m:r>
+                          <a:rPr lang="es-ES" sz="2000" b="0" i="1" smtClean="0">
+                            <a:latin typeface="Cambria Math"/>
+                          </a:rPr>
+                          <m:t>𝜏</m:t>
+                        </m:r>
+                        <m:r>
+                          <a:rPr lang="es-ES" sz="2000" b="0" i="1" smtClean="0">
+                            <a:latin typeface="Cambria Math"/>
+                          </a:rPr>
+                          <m:t>]</m:t>
+                        </m:r>
+                      </m:oMath>
+                    </m:oMathPara>
+                  </a14:m>
+                  <a:endParaRPr lang="es-ES" sz="2000" dirty="0"/>
+                </a:p>
+              </p:txBody>
+            </p:sp>
+          </mc:Choice>
+          <mc:Fallback>
+            <p:sp>
+              <p:nvSpPr>
+                <p:cNvPr id="8" name="15 CuadroTexto"/>
+                <p:cNvSpPr txBox="1">
+                  <a:spLocks noRot="1" noChangeAspect="1" noMove="1" noResize="1" noEditPoints="1" noAdjustHandles="1" noChangeArrowheads="1" noChangeShapeType="1" noTextEdit="1"/>
+                </p:cNvSpPr>
+                <p:nvPr/>
+              </p:nvSpPr>
+              <p:spPr>
+                <a:xfrm>
+                  <a:off x="3440921" y="5163535"/>
+                  <a:ext cx="3180486" cy="715517"/>
+                </a:xfrm>
+                <a:prstGeom prst="rect">
+                  <a:avLst/>
+                </a:prstGeom>
+                <a:blipFill rotWithShape="1">
+                  <a:blip r:embed="rId5"/>
+                  <a:stretch>
+                    <a:fillRect r="-2299"/>
+                  </a:stretch>
+                </a:blipFill>
+              </p:spPr>
+              <p:txBody>
+                <a:bodyPr/>
+                <a:lstStyle/>
+                <a:p>
+                  <a:r>
+                    <a:rPr lang="ru-RU">
+                      <a:noFill/>
+                    </a:rPr>
+                    <a:t> </a:t>
+                  </a:r>
+                </a:p>
+              </p:txBody>
+            </p:sp>
+          </mc:Fallback>
+        </mc:AlternateContent>
+        <p:sp>
+          <p:nvSpPr>
+            <p:cNvPr id="9" name="16 CuadroTexto"/>
+            <p:cNvSpPr txBox="1"/>
+            <p:nvPr/>
+          </p:nvSpPr>
+          <p:spPr>
+            <a:xfrm>
+              <a:off x="3667595" y="4513140"/>
+              <a:ext cx="2520280" cy="461665"/>
+            </a:xfrm>
+            <a:prstGeom prst="rect">
+              <a:avLst/>
+            </a:prstGeom>
+            <a:noFill/>
+          </p:spPr>
+          <p:txBody>
+            <a:bodyPr wrap="square" rtlCol="0">
+              <a:spAutoFit/>
+            </a:bodyPr>
+            <a:lstStyle/>
+            <a:p>
+              <a:r>
+                <a:rPr lang="es-ES" sz="2400" b="1" u="sng" dirty="0" smtClean="0"/>
+                <a:t>Señal parabólica:</a:t>
+              </a:r>
+              <a:endParaRPr lang="es-ES" sz="2400" b="1" u="sng" dirty="0"/>
+            </a:p>
+          </p:txBody>
+        </p:sp>
+      </p:grpSp>
       <p:pic>
         <p:nvPicPr>
-          <p:cNvPr id="3075" name="Picture 3" descr="C:\Users\movil\Downloads\12773196_946730005376130_84677749_o.jpg"/>
+          <p:cNvPr id="10" name="Picture 3" descr="C:\Users\movil\Downloads\12773196_946730005376130_84677749_o.jpg"/>
           <p:cNvPicPr>
             <a:picLocks noChangeAspect="1" noChangeArrowheads="1"/>
           </p:cNvPicPr>
           <p:nvPr/>
         </p:nvPicPr>
         <p:blipFill>
-          <a:blip r:embed="rId13" cstate="print">
+          <a:blip r:embed="rId6" cstate="print">
             <a:extLst>
               <a:ext uri="{28A0092B-C50C-407E-A947-70E740481C1C}">
                 <a14:useLocalDpi xmlns:a14="http://schemas.microsoft.com/office/drawing/2010/main" val="0"/>
@@ -7470,8 +8967,8 @@
         </p:blipFill>
         <p:spPr bwMode="auto">
           <a:xfrm>
-            <a:off x="184968" y="4512543"/>
-            <a:ext cx="4091940" cy="2294573"/>
+            <a:off x="154338" y="3356992"/>
+            <a:ext cx="4392488" cy="2564904"/>
           </a:xfrm>
           <a:prstGeom prst="rect">
             <a:avLst/>
@@ -7499,14 +8996,14 @@
       </p:pic>
       <p:pic>
         <p:nvPicPr>
-          <p:cNvPr id="3076" name="Picture 4" descr="C:\Users\movil\Downloads\12810086_946730035376127_178660937_o.jpg"/>
+          <p:cNvPr id="11" name="Picture 4" descr="C:\Users\movil\Downloads\12810086_946730035376127_178660937_o.jpg"/>
           <p:cNvPicPr>
             <a:picLocks noChangeAspect="1" noChangeArrowheads="1"/>
           </p:cNvPicPr>
           <p:nvPr/>
         </p:nvPicPr>
         <p:blipFill>
-          <a:blip r:embed="rId14" cstate="print">
+          <a:blip r:embed="rId7" cstate="print">
             <a:extLst>
               <a:ext uri="{28A0092B-C50C-407E-A947-70E740481C1C}">
                 <a14:useLocalDpi xmlns:a14="http://schemas.microsoft.com/office/drawing/2010/main" val="0"/>
@@ -7520,8 +9017,8 @@
         </p:blipFill>
         <p:spPr bwMode="auto">
           <a:xfrm>
-            <a:off x="5065406" y="4482136"/>
-            <a:ext cx="3440430" cy="2180273"/>
+            <a:off x="4644008" y="3356992"/>
+            <a:ext cx="4164347" cy="2525913"/>
           </a:xfrm>
           <a:prstGeom prst="rect">
             <a:avLst/>
@@ -7550,24 +9047,17 @@
     </p:spTree>
     <p:extLst>
       <p:ext uri="{BB962C8B-B14F-4D97-AF65-F5344CB8AC3E}">
-        <p14:creationId xmlns:p14="http://schemas.microsoft.com/office/powerpoint/2010/main" val="2822417426"/>
+        <p14:creationId xmlns:p14="http://schemas.microsoft.com/office/powerpoint/2010/main" val="2856807538"/>
       </p:ext>
     </p:extLst>
   </p:cSld>
   <p:clrMapOvr>
     <a:masterClrMapping/>
   </p:clrMapOvr>
-  <p:timing>
-    <p:tnLst>
-      <p:par>
-        <p:cTn id="1" dur="indefinite" restart="never" nodeType="tmRoot"/>
-      </p:par>
-    </p:tnLst>
-  </p:timing>
 </p:sld>
 </file>
 
-<file path=ppt/slides/slide3.xml><?xml version="1.0" encoding="utf-8"?>
+<file path=ppt/slides/slide4.xml><?xml version="1.0" encoding="utf-8"?>
 <p:sld xmlns:a="http://schemas.openxmlformats.org/drawingml/2006/main" xmlns:r="http://schemas.openxmlformats.org/officeDocument/2006/relationships" xmlns:p="http://schemas.openxmlformats.org/presentationml/2006/main">
   <p:cSld>
     <p:spTree>
@@ -7622,7 +9112,7 @@
         </p:nvSpPr>
         <p:spPr>
           <a:xfrm>
-            <a:off x="1045717" y="3532935"/>
+            <a:off x="1045717" y="4121100"/>
             <a:ext cx="1584176" cy="369332"/>
           </a:xfrm>
           <a:prstGeom prst="rect">
@@ -7652,7 +9142,7 @@
         </p:nvSpPr>
         <p:spPr>
           <a:xfrm>
-            <a:off x="6372200" y="3532935"/>
+            <a:off x="6372200" y="4153840"/>
             <a:ext cx="1584176" cy="369332"/>
           </a:xfrm>
           <a:prstGeom prst="rect">
@@ -7688,7 +9178,7 @@
             </p:nvSpPr>
             <p:spPr>
               <a:xfrm>
-                <a:off x="6012160" y="3869527"/>
+                <a:off x="6012160" y="4490432"/>
                 <a:ext cx="1488997" cy="610936"/>
               </a:xfrm>
               <a:prstGeom prst="rect">
@@ -7832,7 +9322,7 @@
             </p:nvSpPr>
             <p:spPr>
               <a:xfrm>
-                <a:off x="6012160" y="3869527"/>
+                <a:off x="6012160" y="4490432"/>
                 <a:ext cx="1488997" cy="610936"/>
               </a:xfrm>
               <a:prstGeom prst="rect">
@@ -7841,7 +9331,7 @@
               <a:blipFill rotWithShape="1">
                 <a:blip r:embed="rId2"/>
                 <a:stretch>
-                  <a:fillRect/>
+                  <a:fillRect r="-4490"/>
                 </a:stretch>
               </a:blipFill>
             </p:spPr>
@@ -7850,7 +9340,7 @@
               <a:lstStyle/>
               <a:p>
                 <a:r>
-                  <a:rPr lang="es-ES">
+                  <a:rPr lang="ru-RU">
                     <a:noFill/>
                   </a:rPr>
                   <a:t> </a:t>
@@ -7870,7 +9360,7 @@
             </p:nvSpPr>
             <p:spPr>
               <a:xfrm>
-                <a:off x="3709220" y="3473361"/>
+                <a:off x="3709219" y="3873778"/>
                 <a:ext cx="1531893" cy="664606"/>
               </a:xfrm>
               <a:prstGeom prst="rect">
@@ -8003,7 +9493,7 @@
             </p:nvSpPr>
             <p:spPr>
               <a:xfrm>
-                <a:off x="3709220" y="3473361"/>
+                <a:off x="3709219" y="3873778"/>
                 <a:ext cx="1531893" cy="664606"/>
               </a:xfrm>
               <a:prstGeom prst="rect">
@@ -8012,7 +9502,7 @@
               <a:blipFill rotWithShape="1">
                 <a:blip r:embed="rId3"/>
                 <a:stretch>
-                  <a:fillRect/>
+                  <a:fillRect r="-4365"/>
                 </a:stretch>
               </a:blipFill>
             </p:spPr>
@@ -8021,7 +9511,7 @@
               <a:lstStyle/>
               <a:p>
                 <a:r>
-                  <a:rPr lang="es-ES">
+                  <a:rPr lang="ru-RU">
                     <a:noFill/>
                   </a:rPr>
                   <a:t> </a:t>
@@ -8041,7 +9531,7 @@
             </p:nvSpPr>
             <p:spPr>
               <a:xfrm>
-                <a:off x="737504" y="3845963"/>
+                <a:off x="737504" y="4434128"/>
                 <a:ext cx="2200602" cy="658065"/>
               </a:xfrm>
               <a:prstGeom prst="rect">
@@ -8202,7 +9692,7 @@
             </p:nvSpPr>
             <p:spPr>
               <a:xfrm>
-                <a:off x="737504" y="3845963"/>
+                <a:off x="737504" y="4434128"/>
                 <a:ext cx="2200602" cy="658065"/>
               </a:xfrm>
               <a:prstGeom prst="rect">
@@ -8211,7 +9701,7 @@
               <a:blipFill rotWithShape="1">
                 <a:blip r:embed="rId4"/>
                 <a:stretch>
-                  <a:fillRect/>
+                  <a:fillRect r="-3047"/>
                 </a:stretch>
               </a:blipFill>
             </p:spPr>
@@ -8220,7 +9710,7 @@
               <a:lstStyle/>
               <a:p>
                 <a:r>
-                  <a:rPr lang="es-ES">
+                  <a:rPr lang="ru-RU">
                     <a:noFill/>
                   </a:rPr>
                   <a:t> </a:t>
@@ -8253,8 +9743,8 @@
         </p:blipFill>
         <p:spPr bwMode="auto">
           <a:xfrm>
-            <a:off x="62097" y="915352"/>
-            <a:ext cx="3647123" cy="2513648"/>
+            <a:off x="4649024" y="915352"/>
+            <a:ext cx="4074354" cy="2808102"/>
           </a:xfrm>
           <a:prstGeom prst="rect">
             <a:avLst/>
@@ -8303,8 +9793,8 @@
         </p:blipFill>
         <p:spPr bwMode="auto">
           <a:xfrm>
-            <a:off x="5076056" y="883643"/>
-            <a:ext cx="3747135" cy="2526983"/>
+            <a:off x="38079" y="908683"/>
+            <a:ext cx="4173881" cy="2814771"/>
           </a:xfrm>
           <a:prstGeom prst="rect">
             <a:avLst/>
@@ -8338,7 +9828,7 @@
         </p:nvSpPr>
         <p:spPr>
           <a:xfrm>
-            <a:off x="255463" y="4603713"/>
+            <a:off x="255463" y="5191878"/>
             <a:ext cx="1656184" cy="369332"/>
           </a:xfrm>
           <a:prstGeom prst="rect">
@@ -8370,7 +9860,7 @@
             </p:nvSpPr>
             <p:spPr>
               <a:xfrm>
-                <a:off x="255463" y="4973045"/>
+                <a:off x="255463" y="5561210"/>
                 <a:ext cx="1307473" cy="673774"/>
               </a:xfrm>
               <a:prstGeom prst="rect">
@@ -8384,6 +9874,7 @@
               </a:bodyPr>
               <a:lstStyle/>
               <a:p>
+                <a:pPr/>
                 <a14:m>
                   <m:oMathPara xmlns:m="http://schemas.openxmlformats.org/officeDocument/2006/math">
                     <m:oMathParaPr>
@@ -8476,7 +9967,7 @@
             </p:nvSpPr>
             <p:spPr>
               <a:xfrm>
-                <a:off x="255463" y="4973045"/>
+                <a:off x="255463" y="5561210"/>
                 <a:ext cx="1307473" cy="673774"/>
               </a:xfrm>
               <a:prstGeom prst="rect">
@@ -8485,7 +9976,7 @@
               <a:blipFill rotWithShape="1">
                 <a:blip r:embed="rId7"/>
                 <a:stretch>
-                  <a:fillRect/>
+                  <a:fillRect r="-5607"/>
                 </a:stretch>
               </a:blipFill>
             </p:spPr>
@@ -8494,7 +9985,7 @@
               <a:lstStyle/>
               <a:p>
                 <a:r>
-                  <a:rPr lang="es-ES">
+                  <a:rPr lang="ru-RU">
                     <a:noFill/>
                   </a:rPr>
                   <a:t> </a:t>
@@ -8524,7 +10015,7 @@
 </p:sld>
 </file>
 
-<file path=ppt/slides/slide4.xml><?xml version="1.0" encoding="utf-8"?>
+<file path=ppt/slides/slide5.xml><?xml version="1.0" encoding="utf-8"?>
 <p:sld xmlns:a="http://schemas.openxmlformats.org/drawingml/2006/main" xmlns:r="http://schemas.openxmlformats.org/officeDocument/2006/relationships" xmlns:p="http://schemas.openxmlformats.org/presentationml/2006/main">
   <p:cSld>
     <p:spTree>
@@ -8587,8 +10078,8 @@
           </a:p>
         </p:txBody>
       </p:sp>
-      <mc:AlternateContent xmlns:mc="http://schemas.openxmlformats.org/markup-compatibility/2006">
-        <mc:Choice xmlns:a14="http://schemas.microsoft.com/office/drawing/2010/main" Requires="a14">
+      <mc:AlternateContent xmlns:mc="http://schemas.openxmlformats.org/markup-compatibility/2006" xmlns:a14="http://schemas.microsoft.com/office/drawing/2010/main">
+        <mc:Choice Requires="a14">
           <p:sp>
             <p:nvSpPr>
               <p:cNvPr id="3" name="2 CuadroTexto"/>
@@ -8885,7 +10376,7 @@
             </p:txBody>
           </p:sp>
         </mc:Choice>
-        <mc:Fallback>
+        <mc:Fallback xmlns="">
           <p:sp>
             <p:nvSpPr>
               <p:cNvPr id="3" name="2 CuadroTexto"/>
@@ -9381,7 +10872,7 @@
 </p:sld>
 </file>
 
-<file path=ppt/slides/slide5.xml><?xml version="1.0" encoding="utf-8"?>
+<file path=ppt/slides/slide6.xml><?xml version="1.0" encoding="utf-8"?>
 <p:sld xmlns:a="http://schemas.openxmlformats.org/drawingml/2006/main" xmlns:r="http://schemas.openxmlformats.org/officeDocument/2006/relationships" xmlns:p="http://schemas.openxmlformats.org/presentationml/2006/main">
   <p:cSld>
     <p:spTree>
@@ -9876,8 +11367,8 @@
             </a:extLst>
           </p:spPr>
         </p:pic>
-        <mc:AlternateContent xmlns:mc="http://schemas.openxmlformats.org/markup-compatibility/2006">
-          <mc:Choice xmlns:a14="http://schemas.microsoft.com/office/drawing/2010/main" Requires="a14">
+        <mc:AlternateContent xmlns:mc="http://schemas.openxmlformats.org/markup-compatibility/2006" xmlns:a14="http://schemas.microsoft.com/office/drawing/2010/main">
+          <mc:Choice Requires="a14">
             <p:sp>
               <p:nvSpPr>
                 <p:cNvPr id="4" name="3 CuadroTexto"/>
@@ -10102,7 +11593,7 @@
               </p:txBody>
             </p:sp>
           </mc:Choice>
-          <mc:Fallback>
+          <mc:Fallback xmlns="">
             <p:sp>
               <p:nvSpPr>
                 <p:cNvPr id="4" name="3 CuadroTexto"/>
@@ -10172,8 +11663,8 @@
           </p:txBody>
         </p:sp>
       </p:grpSp>
-      <mc:AlternateContent xmlns:mc="http://schemas.openxmlformats.org/markup-compatibility/2006">
-        <mc:Choice xmlns:a14="http://schemas.microsoft.com/office/drawing/2010/main" Requires="a14">
+      <mc:AlternateContent xmlns:mc="http://schemas.openxmlformats.org/markup-compatibility/2006" xmlns:a14="http://schemas.microsoft.com/office/drawing/2010/main">
+        <mc:Choice Requires="a14">
           <p:sp>
             <p:nvSpPr>
               <p:cNvPr id="6" name="5 CuadroTexto"/>
@@ -10235,7 +11726,7 @@
             </p:txBody>
           </p:sp>
         </mc:Choice>
-        <mc:Fallback>
+        <mc:Fallback xmlns="">
           <p:sp>
             <p:nvSpPr>
               <p:cNvPr id="6" name="5 CuadroTexto"/>
@@ -10294,7 +11785,7 @@
 </p:sld>
 </file>
 
-<file path=ppt/slides/slide6.xml><?xml version="1.0" encoding="utf-8"?>
+<file path=ppt/slides/slide7.xml><?xml version="1.0" encoding="utf-8"?>
 <p:sld xmlns:a="http://schemas.openxmlformats.org/drawingml/2006/main" xmlns:r="http://schemas.openxmlformats.org/officeDocument/2006/relationships" xmlns:p="http://schemas.openxmlformats.org/presentationml/2006/main">
   <p:cSld>
     <p:spTree>
@@ -10455,8 +11946,8 @@
             </a:extLst>
           </p:spPr>
         </p:pic>
-        <mc:AlternateContent xmlns:mc="http://schemas.openxmlformats.org/markup-compatibility/2006">
-          <mc:Choice xmlns:a14="http://schemas.microsoft.com/office/drawing/2010/main" Requires="a14">
+        <mc:AlternateContent xmlns:mc="http://schemas.openxmlformats.org/markup-compatibility/2006" xmlns:a14="http://schemas.microsoft.com/office/drawing/2010/main">
+          <mc:Choice Requires="a14">
             <p:sp>
               <p:nvSpPr>
                 <p:cNvPr id="4" name="3 CuadroTexto"/>
@@ -10611,7 +12102,7 @@
               </p:txBody>
             </p:sp>
           </mc:Choice>
-          <mc:Fallback>
+          <mc:Fallback xmlns="">
             <p:sp>
               <p:nvSpPr>
                 <p:cNvPr id="4" name="3 CuadroTexto"/>
@@ -10685,8 +12176,8 @@
           </p:txBody>
         </p:sp>
       </p:grpSp>
-      <mc:AlternateContent xmlns:mc="http://schemas.openxmlformats.org/markup-compatibility/2006">
-        <mc:Choice xmlns:a14="http://schemas.microsoft.com/office/drawing/2010/main" Requires="a14">
+      <mc:AlternateContent xmlns:mc="http://schemas.openxmlformats.org/markup-compatibility/2006" xmlns:a14="http://schemas.microsoft.com/office/drawing/2010/main">
+        <mc:Choice Requires="a14">
           <p:sp>
             <p:nvSpPr>
               <p:cNvPr id="9" name="8 CuadroTexto"/>
@@ -10872,7 +12363,7 @@
             </p:txBody>
           </p:sp>
         </mc:Choice>
-        <mc:Fallback>
+        <mc:Fallback xmlns="">
           <p:sp>
             <p:nvSpPr>
               <p:cNvPr id="9" name="8 CuadroTexto"/>
@@ -10931,7 +12422,7 @@
 </p:sld>
 </file>
 
-<file path=ppt/slides/slide7.xml><?xml version="1.0" encoding="utf-8"?>
+<file path=ppt/slides/slide8.xml><?xml version="1.0" encoding="utf-8"?>
 <p:sld xmlns:a="http://schemas.openxmlformats.org/drawingml/2006/main" xmlns:r="http://schemas.openxmlformats.org/officeDocument/2006/relationships" xmlns:p="http://schemas.openxmlformats.org/presentationml/2006/main">
   <p:cSld>
     <p:spTree>
@@ -10989,8 +12480,8 @@
           </a:extLst>
         </p:spPr>
       </p:pic>
-      <mc:AlternateContent xmlns:mc="http://schemas.openxmlformats.org/markup-compatibility/2006">
-        <mc:Choice xmlns:a14="http://schemas.microsoft.com/office/drawing/2010/main" Requires="a14">
+      <mc:AlternateContent xmlns:mc="http://schemas.openxmlformats.org/markup-compatibility/2006" xmlns:a14="http://schemas.microsoft.com/office/drawing/2010/main">
+        <mc:Choice Requires="a14">
           <p:sp>
             <p:nvSpPr>
               <p:cNvPr id="3" name="2 CuadroTexto"/>
@@ -11135,7 +12626,7 @@
             </p:txBody>
           </p:sp>
         </mc:Choice>
-        <mc:Fallback>
+        <mc:Fallback xmlns="">
           <p:sp>
             <p:nvSpPr>
               <p:cNvPr id="3" name="2 CuadroTexto"/>
@@ -11456,11 +12947,7 @@
                       <a:pPr algn="ctr"/>
                       <a:r>
                         <a:rPr lang="es-ES" sz="1600" dirty="0" smtClean="0"/>
-                        <a:t>480,00 </a:t>
-                      </a:r>
-                      <a:r>
-                        <a:rPr lang="es-ES" sz="1600" dirty="0" smtClean="0"/>
-                        <a:t>± 0,05</a:t>
+                        <a:t>480,00 ± 0,05</a:t>
                       </a:r>
                       <a:endParaRPr lang="es-ES" sz="1600" dirty="0"/>
                     </a:p>
@@ -11561,7 +13048,7 @@
 </p:sld>
 </file>
 
-<file path=ppt/slides/slide8.xml><?xml version="1.0" encoding="utf-8"?>
+<file path=ppt/slides/slide9.xml><?xml version="1.0" encoding="utf-8"?>
 <p:sld xmlns:a="http://schemas.openxmlformats.org/drawingml/2006/main" xmlns:r="http://schemas.openxmlformats.org/officeDocument/2006/relationships" xmlns:p="http://schemas.openxmlformats.org/presentationml/2006/main">
   <p:cSld>
     <p:spTree>
@@ -11810,8 +13297,8 @@
             </a:p>
           </p:txBody>
         </p:sp>
-        <mc:AlternateContent xmlns:mc="http://schemas.openxmlformats.org/markup-compatibility/2006">
-          <mc:Choice xmlns:a14="http://schemas.microsoft.com/office/drawing/2010/main" Requires="a14">
+        <mc:AlternateContent xmlns:mc="http://schemas.openxmlformats.org/markup-compatibility/2006" xmlns:a14="http://schemas.microsoft.com/office/drawing/2010/main">
+          <mc:Choice Requires="a14">
             <p:sp>
               <p:nvSpPr>
                 <p:cNvPr id="7" name="6 CuadroTexto"/>
@@ -11946,7 +13433,7 @@
               </p:txBody>
             </p:sp>
           </mc:Choice>
-          <mc:Fallback>
+          <mc:Fallback xmlns="">
             <p:sp>
               <p:nvSpPr>
                 <p:cNvPr id="7" name="6 CuadroTexto"/>
@@ -12046,8 +13533,8 @@
             </a:p>
           </p:txBody>
         </p:sp>
-        <mc:AlternateContent xmlns:mc="http://schemas.openxmlformats.org/markup-compatibility/2006">
-          <mc:Choice xmlns:a14="http://schemas.microsoft.com/office/drawing/2010/main" Requires="a14">
+        <mc:AlternateContent xmlns:mc="http://schemas.openxmlformats.org/markup-compatibility/2006" xmlns:a14="http://schemas.microsoft.com/office/drawing/2010/main">
+          <mc:Choice Requires="a14">
             <p:sp>
               <p:nvSpPr>
                 <p:cNvPr id="16" name="15 CuadroTexto"/>
@@ -12197,7 +13684,7 @@
               </p:txBody>
             </p:sp>
           </mc:Choice>
-          <mc:Fallback>
+          <mc:Fallback xmlns="">
             <p:sp>
               <p:nvSpPr>
                 <p:cNvPr id="16" name="15 CuadroTexto"/>
@@ -12241,173 +13728,6 @@
     <p:extLst>
       <p:ext uri="{BB962C8B-B14F-4D97-AF65-F5344CB8AC3E}">
         <p14:creationId xmlns:p14="http://schemas.microsoft.com/office/powerpoint/2010/main" val="2258575359"/>
-      </p:ext>
-    </p:extLst>
-  </p:cSld>
-  <p:clrMapOvr>
-    <a:masterClrMapping/>
-  </p:clrMapOvr>
-  <p:timing>
-    <p:tnLst>
-      <p:par>
-        <p:cTn id="1" dur="indefinite" restart="never" nodeType="tmRoot"/>
-      </p:par>
-    </p:tnLst>
-  </p:timing>
-</p:sld>
-</file>
-
-<file path=ppt/slides/slide9.xml><?xml version="1.0" encoding="utf-8"?>
-<p:sld xmlns:a="http://schemas.openxmlformats.org/drawingml/2006/main" xmlns:r="http://schemas.openxmlformats.org/officeDocument/2006/relationships" xmlns:p="http://schemas.openxmlformats.org/presentationml/2006/main">
-  <p:cSld>
-    <p:spTree>
-      <p:nvGrpSpPr>
-        <p:cNvPr id="1" name=""/>
-        <p:cNvGrpSpPr/>
-        <p:nvPr/>
-      </p:nvGrpSpPr>
-      <p:grpSpPr>
-        <a:xfrm>
-          <a:off x="0" y="0"/>
-          <a:ext cx="0" cy="0"/>
-          <a:chOff x="0" y="0"/>
-          <a:chExt cx="0" cy="0"/>
-        </a:xfrm>
-      </p:grpSpPr>
-      <p:pic>
-        <p:nvPicPr>
-          <p:cNvPr id="5122" name="Picture 2" descr="F:\Practica-Especial - copia\Voltaje_de_Salida.jpg"/>
-          <p:cNvPicPr>
-            <a:picLocks noChangeAspect="1" noChangeArrowheads="1"/>
-          </p:cNvPicPr>
-          <p:nvPr/>
-        </p:nvPicPr>
-        <p:blipFill>
-          <a:blip r:embed="rId2" cstate="print">
-            <a:extLst>
-              <a:ext uri="{28A0092B-C50C-407E-A947-70E740481C1C}">
-                <a14:useLocalDpi xmlns:a14="http://schemas.microsoft.com/office/drawing/2010/main" val="0"/>
-              </a:ext>
-            </a:extLst>
-          </a:blip>
-          <a:srcRect/>
-          <a:stretch>
-            <a:fillRect/>
-          </a:stretch>
-        </p:blipFill>
-        <p:spPr bwMode="auto">
-          <a:xfrm>
-            <a:off x="4549414" y="1324404"/>
-            <a:ext cx="4108704" cy="3535680"/>
-          </a:xfrm>
-          <a:prstGeom prst="rect">
-            <a:avLst/>
-          </a:prstGeom>
-          <a:ln>
-            <a:noFill/>
-          </a:ln>
-          <a:effectLst>
-            <a:outerShdw blurRad="292100" dist="139700" dir="2700000" algn="tl" rotWithShape="0">
-              <a:srgbClr val="333333">
-                <a:alpha val="65000"/>
-              </a:srgbClr>
-            </a:outerShdw>
-          </a:effectLst>
-          <a:extLst>
-            <a:ext uri="{909E8E84-426E-40DD-AFC4-6F175D3DCCD1}">
-              <a14:hiddenFill xmlns:a14="http://schemas.microsoft.com/office/drawing/2010/main">
-                <a:solidFill>
-                  <a:srgbClr val="FFFFFF"/>
-                </a:solidFill>
-              </a14:hiddenFill>
-            </a:ext>
-          </a:extLst>
-        </p:spPr>
-      </p:pic>
-      <p:pic>
-        <p:nvPicPr>
-          <p:cNvPr id="5123" name="Picture 3" descr="F:\Practica-Especial - copia\Salida_vs_Entrada.jpg"/>
-          <p:cNvPicPr>
-            <a:picLocks noChangeAspect="1" noChangeArrowheads="1"/>
-          </p:cNvPicPr>
-          <p:nvPr/>
-        </p:nvPicPr>
-        <p:blipFill>
-          <a:blip r:embed="rId3" cstate="print">
-            <a:extLst>
-              <a:ext uri="{28A0092B-C50C-407E-A947-70E740481C1C}">
-                <a14:useLocalDpi xmlns:a14="http://schemas.microsoft.com/office/drawing/2010/main" val="0"/>
-              </a:ext>
-            </a:extLst>
-          </a:blip>
-          <a:srcRect/>
-          <a:stretch>
-            <a:fillRect/>
-          </a:stretch>
-        </p:blipFill>
-        <p:spPr bwMode="auto">
-          <a:xfrm>
-            <a:off x="107504" y="1340768"/>
-            <a:ext cx="4230624" cy="3486912"/>
-          </a:xfrm>
-          <a:prstGeom prst="rect">
-            <a:avLst/>
-          </a:prstGeom>
-          <a:ln>
-            <a:noFill/>
-          </a:ln>
-          <a:effectLst>
-            <a:outerShdw blurRad="292100" dist="139700" dir="2700000" algn="tl" rotWithShape="0">
-              <a:srgbClr val="333333">
-                <a:alpha val="65000"/>
-              </a:srgbClr>
-            </a:outerShdw>
-          </a:effectLst>
-          <a:extLst>
-            <a:ext uri="{909E8E84-426E-40DD-AFC4-6F175D3DCCD1}">
-              <a14:hiddenFill xmlns:a14="http://schemas.microsoft.com/office/drawing/2010/main">
-                <a:solidFill>
-                  <a:srgbClr val="FFFFFF"/>
-                </a:solidFill>
-              </a14:hiddenFill>
-            </a:ext>
-          </a:extLst>
-        </p:spPr>
-      </p:pic>
-      <p:sp>
-        <p:nvSpPr>
-          <p:cNvPr id="2" name="1 CuadroTexto"/>
-          <p:cNvSpPr txBox="1"/>
-          <p:nvPr/>
-        </p:nvSpPr>
-        <p:spPr>
-          <a:xfrm>
-            <a:off x="1619672" y="5005000"/>
-            <a:ext cx="5760640" cy="369332"/>
-          </a:xfrm>
-          <a:prstGeom prst="rect">
-            <a:avLst/>
-          </a:prstGeom>
-          <a:noFill/>
-        </p:spPr>
-        <p:txBody>
-          <a:bodyPr wrap="square" rtlCol="0">
-            <a:spAutoFit/>
-          </a:bodyPr>
-          <a:lstStyle/>
-          <a:p>
-            <a:r>
-              <a:rPr lang="es-ES" dirty="0" smtClean="0"/>
-              <a:t>Respuesta del circuito sumador para una señal triangular</a:t>
-            </a:r>
-            <a:endParaRPr lang="es-ES" dirty="0"/>
-          </a:p>
-        </p:txBody>
-      </p:sp>
-    </p:spTree>
-    <p:extLst>
-      <p:ext uri="{BB962C8B-B14F-4D97-AF65-F5344CB8AC3E}">
-        <p14:creationId xmlns:p14="http://schemas.microsoft.com/office/powerpoint/2010/main" val="2031422833"/>
       </p:ext>
     </p:extLst>
   </p:cSld>

</xml_diff>